<commit_message>
added write back with ram still has a problem with switching banks. it seems to write and read from same bank
</commit_message>
<xml_diff>
--- a/Presentation/top_diagrams.pptx
+++ b/Presentation/top_diagrams.pptx
@@ -9,15 +9,15 @@
   </p:notesMasterIdLst>
   <p:sldIdLst>
     <p:sldId id="265" r:id="rId2"/>
-    <p:sldId id="266" r:id="rId3"/>
-    <p:sldId id="267" r:id="rId4"/>
-    <p:sldId id="256" r:id="rId5"/>
-    <p:sldId id="261" r:id="rId6"/>
-    <p:sldId id="262" r:id="rId7"/>
-    <p:sldId id="257" r:id="rId8"/>
-    <p:sldId id="258" r:id="rId9"/>
-    <p:sldId id="263" r:id="rId10"/>
-    <p:sldId id="264" r:id="rId11"/>
+    <p:sldId id="267" r:id="rId3"/>
+    <p:sldId id="256" r:id="rId4"/>
+    <p:sldId id="261" r:id="rId5"/>
+    <p:sldId id="262" r:id="rId6"/>
+    <p:sldId id="257" r:id="rId7"/>
+    <p:sldId id="258" r:id="rId8"/>
+    <p:sldId id="263" r:id="rId9"/>
+    <p:sldId id="264" r:id="rId10"/>
+    <p:sldId id="268" r:id="rId11"/>
   </p:sldIdLst>
   <p:sldSz cx="9144000" cy="6858000" type="screen4x3"/>
   <p:notesSz cx="6858000" cy="9144000"/>
@@ -201,7 +201,7 @@
           <a:p>
             <a:fld id="{ADBC4376-C3DE-4B1D-AA9F-C7298BE814A9}" type="datetimeFigureOut">
               <a:rPr lang="he-IL" smtClean="0"/>
-              <a:t>כ"ב/ניסן/תשע"ג</a:t>
+              <a:t>י"ד/אייר/תשע"ג</a:t>
             </a:fld>
             <a:endParaRPr lang="he-IL"/>
           </a:p>
@@ -622,7 +622,7 @@
           <a:p>
             <a:fld id="{BA57CD7A-9456-475D-B4AA-1DE72608A780}" type="slidenum">
               <a:rPr lang="he-IL" smtClean="0"/>
-              <a:t>4</a:t>
+              <a:t>3</a:t>
             </a:fld>
             <a:endParaRPr lang="he-IL"/>
           </a:p>
@@ -703,7 +703,7 @@
           <a:p>
             <a:fld id="{BA57CD7A-9456-475D-B4AA-1DE72608A780}" type="slidenum">
               <a:rPr lang="he-IL" smtClean="0"/>
-              <a:t>7</a:t>
+              <a:t>6</a:t>
             </a:fld>
             <a:endParaRPr lang="he-IL"/>
           </a:p>
@@ -784,7 +784,7 @@
           <a:p>
             <a:fld id="{BA57CD7A-9456-475D-B4AA-1DE72608A780}" type="slidenum">
               <a:rPr lang="he-IL" smtClean="0"/>
-              <a:t>8</a:t>
+              <a:t>7</a:t>
             </a:fld>
             <a:endParaRPr lang="he-IL"/>
           </a:p>
@@ -979,7 +979,7 @@
           <a:p>
             <a:fld id="{AC424652-B047-4066-943C-BED71DEDE269}" type="datetimeFigureOut">
               <a:rPr lang="he-IL" smtClean="0"/>
-              <a:t>כ"ב/ניסן/תשע"ג</a:t>
+              <a:t>י"ד/אייר/תשע"ג</a:t>
             </a:fld>
             <a:endParaRPr lang="he-IL"/>
           </a:p>
@@ -1144,7 +1144,7 @@
           <a:p>
             <a:fld id="{AC424652-B047-4066-943C-BED71DEDE269}" type="datetimeFigureOut">
               <a:rPr lang="he-IL" smtClean="0"/>
-              <a:t>כ"ב/ניסן/תשע"ג</a:t>
+              <a:t>י"ד/אייר/תשע"ג</a:t>
             </a:fld>
             <a:endParaRPr lang="he-IL"/>
           </a:p>
@@ -1319,7 +1319,7 @@
           <a:p>
             <a:fld id="{AC424652-B047-4066-943C-BED71DEDE269}" type="datetimeFigureOut">
               <a:rPr lang="he-IL" smtClean="0"/>
-              <a:t>כ"ב/ניסן/תשע"ג</a:t>
+              <a:t>י"ד/אייר/תשע"ג</a:t>
             </a:fld>
             <a:endParaRPr lang="he-IL"/>
           </a:p>
@@ -1484,7 +1484,7 @@
           <a:p>
             <a:fld id="{AC424652-B047-4066-943C-BED71DEDE269}" type="datetimeFigureOut">
               <a:rPr lang="he-IL" smtClean="0"/>
-              <a:t>כ"ב/ניסן/תשע"ג</a:t>
+              <a:t>י"ד/אייר/תשע"ג</a:t>
             </a:fld>
             <a:endParaRPr lang="he-IL"/>
           </a:p>
@@ -1725,7 +1725,7 @@
           <a:p>
             <a:fld id="{AC424652-B047-4066-943C-BED71DEDE269}" type="datetimeFigureOut">
               <a:rPr lang="he-IL" smtClean="0"/>
-              <a:t>כ"ב/ניסן/תשע"ג</a:t>
+              <a:t>י"ד/אייר/תשע"ג</a:t>
             </a:fld>
             <a:endParaRPr lang="he-IL"/>
           </a:p>
@@ -2008,7 +2008,7 @@
           <a:p>
             <a:fld id="{AC424652-B047-4066-943C-BED71DEDE269}" type="datetimeFigureOut">
               <a:rPr lang="he-IL" smtClean="0"/>
-              <a:t>כ"ב/ניסן/תשע"ג</a:t>
+              <a:t>י"ד/אייר/תשע"ג</a:t>
             </a:fld>
             <a:endParaRPr lang="he-IL"/>
           </a:p>
@@ -2425,7 +2425,7 @@
           <a:p>
             <a:fld id="{AC424652-B047-4066-943C-BED71DEDE269}" type="datetimeFigureOut">
               <a:rPr lang="he-IL" smtClean="0"/>
-              <a:t>כ"ב/ניסן/תשע"ג</a:t>
+              <a:t>י"ד/אייר/תשע"ג</a:t>
             </a:fld>
             <a:endParaRPr lang="he-IL"/>
           </a:p>
@@ -2538,7 +2538,7 @@
           <a:p>
             <a:fld id="{AC424652-B047-4066-943C-BED71DEDE269}" type="datetimeFigureOut">
               <a:rPr lang="he-IL" smtClean="0"/>
-              <a:t>כ"ב/ניסן/תשע"ג</a:t>
+              <a:t>י"ד/אייר/תשע"ג</a:t>
             </a:fld>
             <a:endParaRPr lang="he-IL"/>
           </a:p>
@@ -2628,7 +2628,7 @@
           <a:p>
             <a:fld id="{AC424652-B047-4066-943C-BED71DEDE269}" type="datetimeFigureOut">
               <a:rPr lang="he-IL" smtClean="0"/>
-              <a:t>כ"ב/ניסן/תשע"ג</a:t>
+              <a:t>י"ד/אייר/תשע"ג</a:t>
             </a:fld>
             <a:endParaRPr lang="he-IL"/>
           </a:p>
@@ -2900,7 +2900,7 @@
           <a:p>
             <a:fld id="{AC424652-B047-4066-943C-BED71DEDE269}" type="datetimeFigureOut">
               <a:rPr lang="he-IL" smtClean="0"/>
-              <a:t>כ"ב/ניסן/תשע"ג</a:t>
+              <a:t>י"ד/אייר/תשע"ג</a:t>
             </a:fld>
             <a:endParaRPr lang="he-IL"/>
           </a:p>
@@ -3148,7 +3148,7 @@
           <a:p>
             <a:fld id="{AC424652-B047-4066-943C-BED71DEDE269}" type="datetimeFigureOut">
               <a:rPr lang="he-IL" smtClean="0"/>
-              <a:t>כ"ב/ניסן/תשע"ג</a:t>
+              <a:t>י"ד/אייר/תשע"ג</a:t>
             </a:fld>
             <a:endParaRPr lang="he-IL"/>
           </a:p>
@@ -3356,7 +3356,7 @@
           <a:p>
             <a:fld id="{AC424652-B047-4066-943C-BED71DEDE269}" type="datetimeFigureOut">
               <a:rPr lang="he-IL" smtClean="0"/>
-              <a:t>כ"ב/ניסן/תשע"ג</a:t>
+              <a:t>י"ד/אייר/תשע"ג</a:t>
             </a:fld>
             <a:endParaRPr lang="he-IL"/>
           </a:p>
@@ -8470,474 +8470,6 @@
       </p:grpSpPr>
       <p:pic>
         <p:nvPicPr>
-          <p:cNvPr id="3074" name="Picture 2"/>
-          <p:cNvPicPr>
-            <a:picLocks noChangeAspect="1" noChangeArrowheads="1"/>
-          </p:cNvPicPr>
-          <p:nvPr/>
-        </p:nvPicPr>
-        <p:blipFill>
-          <a:blip r:embed="rId2">
-            <a:extLst>
-              <a:ext uri="{28A0092B-C50C-407E-A947-70E740481C1C}">
-                <a14:useLocalDpi xmlns:a14="http://schemas.microsoft.com/office/drawing/2010/main" val="0"/>
-              </a:ext>
-            </a:extLst>
-          </a:blip>
-          <a:srcRect/>
-          <a:stretch>
-            <a:fillRect/>
-          </a:stretch>
-        </p:blipFill>
-        <p:spPr bwMode="auto">
-          <a:xfrm>
-            <a:off x="64573" y="1086127"/>
-            <a:ext cx="10836696" cy="4791432"/>
-          </a:xfrm>
-          <a:prstGeom prst="rect">
-            <a:avLst/>
-          </a:prstGeom>
-          <a:noFill/>
-          <a:ln>
-            <a:noFill/>
-          </a:ln>
-          <a:extLst>
-            <a:ext uri="{909E8E84-426E-40DD-AFC4-6F175D3DCCD1}">
-              <a14:hiddenFill xmlns:a14="http://schemas.microsoft.com/office/drawing/2010/main">
-                <a:solidFill>
-                  <a:schemeClr val="accent1"/>
-                </a:solidFill>
-              </a14:hiddenFill>
-            </a:ext>
-            <a:ext uri="{91240B29-F687-4F45-9708-019B960494DF}">
-              <a14:hiddenLine xmlns:a14="http://schemas.microsoft.com/office/drawing/2010/main" w="9525">
-                <a:solidFill>
-                  <a:schemeClr val="tx1"/>
-                </a:solidFill>
-                <a:miter lim="800000"/>
-                <a:headEnd/>
-                <a:tailEnd/>
-              </a14:hiddenLine>
-            </a:ext>
-          </a:extLst>
-        </p:spPr>
-      </p:pic>
-      <p:grpSp>
-        <p:nvGrpSpPr>
-          <p:cNvPr id="16" name="Group 15"/>
-          <p:cNvGrpSpPr/>
-          <p:nvPr/>
-        </p:nvGrpSpPr>
-        <p:grpSpPr>
-          <a:xfrm>
-            <a:off x="5148064" y="4571206"/>
-            <a:ext cx="1852787" cy="1258022"/>
-            <a:chOff x="5148064" y="4571206"/>
-            <a:chExt cx="1852787" cy="1258022"/>
-          </a:xfrm>
-        </p:grpSpPr>
-        <p:sp>
-          <p:nvSpPr>
-            <p:cNvPr id="5" name="Rectangle 4"/>
-            <p:cNvSpPr/>
-            <p:nvPr/>
-          </p:nvSpPr>
-          <p:spPr>
-            <a:xfrm>
-              <a:off x="6568803" y="4571206"/>
-              <a:ext cx="432048" cy="288032"/>
-            </a:xfrm>
-            <a:prstGeom prst="rect">
-              <a:avLst/>
-            </a:prstGeom>
-            <a:noFill/>
-          </p:spPr>
-          <p:style>
-            <a:lnRef idx="2">
-              <a:schemeClr val="accent6"/>
-            </a:lnRef>
-            <a:fillRef idx="1">
-              <a:schemeClr val="lt1"/>
-            </a:fillRef>
-            <a:effectRef idx="0">
-              <a:schemeClr val="accent6"/>
-            </a:effectRef>
-            <a:fontRef idx="minor">
-              <a:schemeClr val="dk1"/>
-            </a:fontRef>
-          </p:style>
-          <p:txBody>
-            <a:bodyPr rtlCol="1" anchor="ctr"/>
-            <a:lstStyle/>
-            <a:p>
-              <a:pPr algn="ctr"/>
-              <a:endParaRPr lang="he-IL"/>
-            </a:p>
-          </p:txBody>
-        </p:sp>
-        <p:sp>
-          <p:nvSpPr>
-            <p:cNvPr id="7" name="Rectangle 6"/>
-            <p:cNvSpPr/>
-            <p:nvPr/>
-          </p:nvSpPr>
-          <p:spPr>
-            <a:xfrm>
-              <a:off x="5148064" y="5664538"/>
-              <a:ext cx="1152128" cy="164690"/>
-            </a:xfrm>
-            <a:prstGeom prst="rect">
-              <a:avLst/>
-            </a:prstGeom>
-            <a:noFill/>
-            <a:ln>
-              <a:solidFill>
-                <a:srgbClr val="FFFF00"/>
-              </a:solidFill>
-            </a:ln>
-          </p:spPr>
-          <p:style>
-            <a:lnRef idx="2">
-              <a:schemeClr val="accent6"/>
-            </a:lnRef>
-            <a:fillRef idx="1">
-              <a:schemeClr val="lt1"/>
-            </a:fillRef>
-            <a:effectRef idx="0">
-              <a:schemeClr val="accent6"/>
-            </a:effectRef>
-            <a:fontRef idx="minor">
-              <a:schemeClr val="dk1"/>
-            </a:fontRef>
-          </p:style>
-          <p:txBody>
-            <a:bodyPr rtlCol="1" anchor="ctr"/>
-            <a:lstStyle/>
-            <a:p>
-              <a:pPr algn="ctr"/>
-              <a:endParaRPr lang="he-IL"/>
-            </a:p>
-          </p:txBody>
-        </p:sp>
-        <p:cxnSp>
-          <p:nvCxnSpPr>
-            <p:cNvPr id="9" name="Straight Arrow Connector 8"/>
-            <p:cNvCxnSpPr/>
-            <p:nvPr/>
-          </p:nvCxnSpPr>
-          <p:spPr>
-            <a:xfrm flipV="1">
-              <a:off x="6084168" y="4869160"/>
-              <a:ext cx="504056" cy="795378"/>
-            </a:xfrm>
-            <a:prstGeom prst="straightConnector1">
-              <a:avLst/>
-            </a:prstGeom>
-            <a:ln>
-              <a:tailEnd type="arrow"/>
-            </a:ln>
-          </p:spPr>
-          <p:style>
-            <a:lnRef idx="3">
-              <a:schemeClr val="accent6"/>
-            </a:lnRef>
-            <a:fillRef idx="0">
-              <a:schemeClr val="accent6"/>
-            </a:fillRef>
-            <a:effectRef idx="2">
-              <a:schemeClr val="accent6"/>
-            </a:effectRef>
-            <a:fontRef idx="minor">
-              <a:schemeClr val="tx1"/>
-            </a:fontRef>
-          </p:style>
-        </p:cxnSp>
-        <p:sp>
-          <p:nvSpPr>
-            <p:cNvPr id="11" name="TextBox 10"/>
-            <p:cNvSpPr txBox="1"/>
-            <p:nvPr/>
-          </p:nvSpPr>
-          <p:spPr>
-            <a:xfrm>
-              <a:off x="5956910" y="4897517"/>
-              <a:ext cx="612068" cy="369332"/>
-            </a:xfrm>
-            <a:prstGeom prst="rect">
-              <a:avLst/>
-            </a:prstGeom>
-            <a:noFill/>
-          </p:spPr>
-          <p:txBody>
-            <a:bodyPr wrap="square" rtlCol="1">
-              <a:spAutoFit/>
-            </a:bodyPr>
-            <a:lstStyle/>
-            <a:p>
-              <a:r>
-                <a:rPr lang="en-US" dirty="0" err="1" smtClean="0">
-                  <a:solidFill>
-                    <a:srgbClr val="FFFF00"/>
-                  </a:solidFill>
-                </a:rPr>
-                <a:t>ack</a:t>
-              </a:r>
-              <a:endParaRPr lang="he-IL" dirty="0">
-                <a:solidFill>
-                  <a:srgbClr val="FFFF00"/>
-                </a:solidFill>
-              </a:endParaRPr>
-            </a:p>
-          </p:txBody>
-        </p:sp>
-      </p:grpSp>
-      <p:grpSp>
-        <p:nvGrpSpPr>
-          <p:cNvPr id="15" name="Group 14"/>
-          <p:cNvGrpSpPr/>
-          <p:nvPr/>
-        </p:nvGrpSpPr>
-        <p:grpSpPr>
-          <a:xfrm>
-            <a:off x="6660232" y="4571206"/>
-            <a:ext cx="1811924" cy="1258022"/>
-            <a:chOff x="6660232" y="4571206"/>
-            <a:chExt cx="1811924" cy="1258022"/>
-          </a:xfrm>
-        </p:grpSpPr>
-        <p:sp>
-          <p:nvSpPr>
-            <p:cNvPr id="6" name="Rectangle 5"/>
-            <p:cNvSpPr/>
-            <p:nvPr/>
-          </p:nvSpPr>
-          <p:spPr>
-            <a:xfrm>
-              <a:off x="8040108" y="4571206"/>
-              <a:ext cx="432048" cy="288032"/>
-            </a:xfrm>
-            <a:prstGeom prst="rect">
-              <a:avLst/>
-            </a:prstGeom>
-            <a:noFill/>
-          </p:spPr>
-          <p:style>
-            <a:lnRef idx="2">
-              <a:schemeClr val="accent6"/>
-            </a:lnRef>
-            <a:fillRef idx="1">
-              <a:schemeClr val="lt1"/>
-            </a:fillRef>
-            <a:effectRef idx="0">
-              <a:schemeClr val="accent6"/>
-            </a:effectRef>
-            <a:fontRef idx="minor">
-              <a:schemeClr val="dk1"/>
-            </a:fontRef>
-          </p:style>
-          <p:txBody>
-            <a:bodyPr rtlCol="1" anchor="ctr"/>
-            <a:lstStyle/>
-            <a:p>
-              <a:pPr algn="ctr"/>
-              <a:endParaRPr lang="he-IL"/>
-            </a:p>
-          </p:txBody>
-        </p:sp>
-        <p:sp>
-          <p:nvSpPr>
-            <p:cNvPr id="8" name="Rectangle 7"/>
-            <p:cNvSpPr/>
-            <p:nvPr/>
-          </p:nvSpPr>
-          <p:spPr>
-            <a:xfrm>
-              <a:off x="6660232" y="5623541"/>
-              <a:ext cx="1008112" cy="205687"/>
-            </a:xfrm>
-            <a:prstGeom prst="rect">
-              <a:avLst/>
-            </a:prstGeom>
-            <a:noFill/>
-            <a:ln>
-              <a:solidFill>
-                <a:srgbClr val="FFFF00"/>
-              </a:solidFill>
-            </a:ln>
-          </p:spPr>
-          <p:style>
-            <a:lnRef idx="2">
-              <a:schemeClr val="accent6"/>
-            </a:lnRef>
-            <a:fillRef idx="1">
-              <a:schemeClr val="lt1"/>
-            </a:fillRef>
-            <a:effectRef idx="0">
-              <a:schemeClr val="accent6"/>
-            </a:effectRef>
-            <a:fontRef idx="minor">
-              <a:schemeClr val="dk1"/>
-            </a:fontRef>
-          </p:style>
-          <p:txBody>
-            <a:bodyPr rtlCol="1" anchor="ctr"/>
-            <a:lstStyle/>
-            <a:p>
-              <a:pPr algn="ctr"/>
-              <a:endParaRPr lang="he-IL"/>
-            </a:p>
-          </p:txBody>
-        </p:sp>
-        <p:cxnSp>
-          <p:nvCxnSpPr>
-            <p:cNvPr id="10" name="Straight Arrow Connector 9"/>
-            <p:cNvCxnSpPr/>
-            <p:nvPr/>
-          </p:nvCxnSpPr>
-          <p:spPr>
-            <a:xfrm flipV="1">
-              <a:off x="7380312" y="4869160"/>
-              <a:ext cx="648072" cy="754381"/>
-            </a:xfrm>
-            <a:prstGeom prst="straightConnector1">
-              <a:avLst/>
-            </a:prstGeom>
-            <a:ln>
-              <a:tailEnd type="arrow"/>
-            </a:ln>
-          </p:spPr>
-          <p:style>
-            <a:lnRef idx="3">
-              <a:schemeClr val="accent6"/>
-            </a:lnRef>
-            <a:fillRef idx="0">
-              <a:schemeClr val="accent6"/>
-            </a:fillRef>
-            <a:effectRef idx="2">
-              <a:schemeClr val="accent6"/>
-            </a:effectRef>
-            <a:fontRef idx="minor">
-              <a:schemeClr val="tx1"/>
-            </a:fontRef>
-          </p:style>
-        </p:cxnSp>
-        <p:sp>
-          <p:nvSpPr>
-            <p:cNvPr id="12" name="TextBox 11"/>
-            <p:cNvSpPr txBox="1"/>
-            <p:nvPr/>
-          </p:nvSpPr>
-          <p:spPr>
-            <a:xfrm>
-              <a:off x="7308304" y="4897517"/>
-              <a:ext cx="612068" cy="369332"/>
-            </a:xfrm>
-            <a:prstGeom prst="rect">
-              <a:avLst/>
-            </a:prstGeom>
-            <a:noFill/>
-          </p:spPr>
-          <p:txBody>
-            <a:bodyPr wrap="square" rtlCol="1">
-              <a:spAutoFit/>
-            </a:bodyPr>
-            <a:lstStyle/>
-            <a:p>
-              <a:r>
-                <a:rPr lang="en-US" dirty="0" err="1" smtClean="0">
-                  <a:solidFill>
-                    <a:srgbClr val="FFFF00"/>
-                  </a:solidFill>
-                </a:rPr>
-                <a:t>ack</a:t>
-              </a:r>
-              <a:endParaRPr lang="he-IL" dirty="0">
-                <a:solidFill>
-                  <a:srgbClr val="FFFF00"/>
-                </a:solidFill>
-              </a:endParaRPr>
-            </a:p>
-          </p:txBody>
-        </p:sp>
-      </p:grpSp>
-      <p:sp>
-        <p:nvSpPr>
-          <p:cNvPr id="17" name="Rectangle 16"/>
-          <p:cNvSpPr/>
-          <p:nvPr/>
-        </p:nvSpPr>
-        <p:spPr>
-          <a:xfrm>
-            <a:off x="4644008" y="1988840"/>
-            <a:ext cx="4104456" cy="3888719"/>
-          </a:xfrm>
-          <a:prstGeom prst="rect">
-            <a:avLst/>
-          </a:prstGeom>
-          <a:noFill/>
-          <a:ln>
-            <a:solidFill>
-              <a:srgbClr val="FF0000"/>
-            </a:solidFill>
-          </a:ln>
-        </p:spPr>
-        <p:style>
-          <a:lnRef idx="2">
-            <a:schemeClr val="accent1">
-              <a:shade val="50000"/>
-            </a:schemeClr>
-          </a:lnRef>
-          <a:fillRef idx="1">
-            <a:schemeClr val="accent1"/>
-          </a:fillRef>
-          <a:effectRef idx="0">
-            <a:schemeClr val="accent1"/>
-          </a:effectRef>
-          <a:fontRef idx="minor">
-            <a:schemeClr val="lt1"/>
-          </a:fontRef>
-        </p:style>
-        <p:txBody>
-          <a:bodyPr rtlCol="1" anchor="ctr"/>
-          <a:lstStyle/>
-          <a:p>
-            <a:pPr algn="ctr"/>
-            <a:endParaRPr lang="he-IL"/>
-          </a:p>
-        </p:txBody>
-      </p:sp>
-    </p:spTree>
-    <p:extLst>
-      <p:ext uri="{BB962C8B-B14F-4D97-AF65-F5344CB8AC3E}">
-        <p14:creationId xmlns:p14="http://schemas.microsoft.com/office/powerpoint/2010/main" val="2628898583"/>
-      </p:ext>
-    </p:extLst>
-  </p:cSld>
-  <p:clrMapOvr>
-    <a:masterClrMapping/>
-  </p:clrMapOvr>
-</p:sld>
-</file>
-
-<file path=ppt/slides/slide2.xml><?xml version="1.0" encoding="utf-8"?>
-<p:sld xmlns:a="http://schemas.openxmlformats.org/drawingml/2006/main" xmlns:r="http://schemas.openxmlformats.org/officeDocument/2006/relationships" xmlns:p="http://schemas.openxmlformats.org/presentationml/2006/main">
-  <p:cSld>
-    <p:spTree>
-      <p:nvGrpSpPr>
-        <p:cNvPr id="1" name=""/>
-        <p:cNvGrpSpPr/>
-        <p:nvPr/>
-      </p:nvGrpSpPr>
-      <p:grpSpPr>
-        <a:xfrm>
-          <a:off x="0" y="0"/>
-          <a:ext cx="0" cy="0"/>
-          <a:chOff x="0" y="0"/>
-          <a:chExt cx="0" cy="0"/>
-        </a:xfrm>
-      </p:grpSpPr>
-      <p:pic>
-        <p:nvPicPr>
           <p:cNvPr id="51" name="Picture 50" descr="C:\Program Files\Microsoft Office\MEDIA\CAGCAT10\j0285750.wmf"/>
           <p:cNvPicPr>
             <a:picLocks noChangeAspect="1" noChangeArrowheads="1"/>
@@ -15802,547 +15334,569 @@
       </p:sp>
       <p:grpSp>
         <p:nvGrpSpPr>
-          <p:cNvPr id="7" name="Group 6"/>
+          <p:cNvPr id="231" name="Group 230"/>
           <p:cNvGrpSpPr/>
           <p:nvPr/>
         </p:nvGrpSpPr>
         <p:grpSpPr>
           <a:xfrm>
-            <a:off x="5008980" y="4786322"/>
-            <a:ext cx="3903940" cy="2550100"/>
-            <a:chOff x="5004048" y="5043221"/>
-            <a:chExt cx="3903940" cy="2550100"/>
+            <a:off x="5000629" y="4850959"/>
+            <a:ext cx="4516566" cy="2967240"/>
+            <a:chOff x="5123810" y="5203257"/>
+            <a:chExt cx="4516566" cy="2967240"/>
           </a:xfrm>
         </p:grpSpPr>
-        <p:grpSp>
-          <p:nvGrpSpPr>
-            <p:cNvPr id="231" name="Group 230"/>
-            <p:cNvGrpSpPr/>
+        <p:sp>
+          <p:nvSpPr>
+            <p:cNvPr id="215" name="Rectangle 214"/>
+            <p:cNvSpPr/>
             <p:nvPr/>
-          </p:nvGrpSpPr>
-          <p:grpSpPr>
+          </p:nvSpPr>
+          <p:spPr>
             <a:xfrm>
-              <a:off x="5004048" y="5043221"/>
-              <a:ext cx="3903940" cy="2550100"/>
-              <a:chOff x="5143505" y="5203257"/>
-              <a:chExt cx="3903940" cy="2550100"/>
+              <a:off x="5369839" y="5538779"/>
+              <a:ext cx="4250036" cy="2631718"/>
             </a:xfrm>
-          </p:grpSpPr>
-          <p:sp>
-            <p:nvSpPr>
-              <p:cNvPr id="215" name="Rectangle 214"/>
-              <p:cNvSpPr/>
-              <p:nvPr/>
-            </p:nvSpPr>
-            <p:spPr>
-              <a:xfrm>
-                <a:off x="5369839" y="5538779"/>
-                <a:ext cx="3000396" cy="2214578"/>
-              </a:xfrm>
-              <a:prstGeom prst="rect">
-                <a:avLst/>
-              </a:prstGeom>
+            <a:prstGeom prst="rect">
+              <a:avLst/>
+            </a:prstGeom>
+            <a:solidFill>
+              <a:schemeClr val="accent1">
+                <a:alpha val="19000"/>
+              </a:schemeClr>
+            </a:solidFill>
+          </p:spPr>
+          <p:style>
+            <a:lnRef idx="2">
+              <a:schemeClr val="accent1">
+                <a:shade val="50000"/>
+              </a:schemeClr>
+            </a:lnRef>
+            <a:fillRef idx="1">
+              <a:schemeClr val="accent1"/>
+            </a:fillRef>
+            <a:effectRef idx="0">
+              <a:schemeClr val="accent1"/>
+            </a:effectRef>
+            <a:fontRef idx="minor">
+              <a:schemeClr val="lt1"/>
+            </a:fontRef>
+          </p:style>
+          <p:txBody>
+            <a:bodyPr rtlCol="1" anchor="ctr"/>
+            <a:lstStyle/>
+            <a:p>
+              <a:pPr algn="ctr"/>
+              <a:endParaRPr lang="he-IL"/>
+            </a:p>
+          </p:txBody>
+        </p:sp>
+        <p:sp>
+          <p:nvSpPr>
+            <p:cNvPr id="217" name="TextBox 216"/>
+            <p:cNvSpPr txBox="1"/>
+            <p:nvPr/>
+          </p:nvSpPr>
+          <p:spPr>
+            <a:xfrm rot="16200000">
+              <a:off x="4813352" y="7552261"/>
+              <a:ext cx="928694" cy="307777"/>
+            </a:xfrm>
+            <a:prstGeom prst="rect">
+              <a:avLst/>
+            </a:prstGeom>
+          </p:spPr>
+          <p:style>
+            <a:lnRef idx="0">
+              <a:schemeClr val="dk1"/>
+            </a:lnRef>
+            <a:fillRef idx="3">
+              <a:schemeClr val="dk1"/>
+            </a:fillRef>
+            <a:effectRef idx="3">
+              <a:schemeClr val="dk1"/>
+            </a:effectRef>
+            <a:fontRef idx="minor">
+              <a:schemeClr val="lt1"/>
+            </a:fontRef>
+          </p:style>
+          <p:txBody>
+            <a:bodyPr wrap="square" rtlCol="1">
+              <a:spAutoFit/>
+            </a:bodyPr>
+            <a:lstStyle/>
+            <a:p>
+              <a:pPr algn="ctr"/>
+              <a:r>
+                <a:rPr lang="en-US" sz="1400" b="1" dirty="0" smtClean="0"/>
+                <a:t>WBM</a:t>
+              </a:r>
+              <a:endParaRPr lang="he-IL" sz="1400" b="1" dirty="0"/>
+            </a:p>
+          </p:txBody>
+        </p:sp>
+        <p:sp>
+          <p:nvSpPr>
+            <p:cNvPr id="221" name="Rounded Rectangle 220"/>
+            <p:cNvSpPr/>
+            <p:nvPr/>
+          </p:nvSpPr>
+          <p:spPr>
+            <a:xfrm>
+              <a:off x="8116379" y="5203257"/>
+              <a:ext cx="1523997" cy="500066"/>
+            </a:xfrm>
+            <a:prstGeom prst="roundRect">
+              <a:avLst/>
+            </a:prstGeom>
+          </p:spPr>
+          <p:style>
+            <a:lnRef idx="0">
+              <a:schemeClr val="accent2"/>
+            </a:lnRef>
+            <a:fillRef idx="3">
+              <a:schemeClr val="accent2"/>
+            </a:fillRef>
+            <a:effectRef idx="3">
+              <a:schemeClr val="accent2"/>
+            </a:effectRef>
+            <a:fontRef idx="minor">
+              <a:schemeClr val="lt1"/>
+            </a:fontRef>
+          </p:style>
+          <p:txBody>
+            <a:bodyPr rtlCol="1" anchor="ctr"/>
+            <a:lstStyle/>
+            <a:p>
+              <a:pPr algn="ctr"/>
+              <a:r>
+                <a:rPr lang="en-US" dirty="0" smtClean="0"/>
+                <a:t>Image Manipulation</a:t>
+              </a:r>
+            </a:p>
+          </p:txBody>
+        </p:sp>
+        <p:sp>
+          <p:nvSpPr>
+            <p:cNvPr id="225" name="TextBox 224"/>
+            <p:cNvSpPr txBox="1"/>
+            <p:nvPr/>
+          </p:nvSpPr>
+          <p:spPr>
+            <a:xfrm>
+              <a:off x="5839764" y="5716803"/>
+              <a:ext cx="1087665" cy="584775"/>
+            </a:xfrm>
+            <a:prstGeom prst="rect">
+              <a:avLst/>
+            </a:prstGeom>
+          </p:spPr>
+          <p:style>
+            <a:lnRef idx="0">
+              <a:schemeClr val="accent6"/>
+            </a:lnRef>
+            <a:fillRef idx="3">
+              <a:schemeClr val="accent6"/>
+            </a:fillRef>
+            <a:effectRef idx="3">
+              <a:schemeClr val="accent6"/>
+            </a:effectRef>
+            <a:fontRef idx="minor">
+              <a:schemeClr val="lt1"/>
+            </a:fontRef>
+          </p:style>
+          <p:txBody>
+            <a:bodyPr wrap="square" rtlCol="1">
+              <a:spAutoFit/>
+            </a:bodyPr>
+            <a:lstStyle/>
+            <a:p>
+              <a:pPr algn="ctr" rtl="0"/>
+              <a:r>
+                <a:rPr lang="en-US" sz="1600" dirty="0" err="1" smtClean="0"/>
+                <a:t>Addr</a:t>
+              </a:r>
+              <a:r>
+                <a:rPr lang="en-US" sz="1600" dirty="0" smtClean="0"/>
+                <a:t> Calculator</a:t>
+              </a:r>
+              <a:endParaRPr lang="he-IL" sz="1600" dirty="0"/>
+            </a:p>
+          </p:txBody>
+        </p:sp>
+        <p:sp>
+          <p:nvSpPr>
+            <p:cNvPr id="226" name="TextBox 225"/>
+            <p:cNvSpPr txBox="1"/>
+            <p:nvPr/>
+          </p:nvSpPr>
+          <p:spPr>
+            <a:xfrm>
+              <a:off x="8235363" y="5930472"/>
+              <a:ext cx="1372877" cy="276999"/>
+            </a:xfrm>
+            <a:prstGeom prst="rect">
+              <a:avLst/>
+            </a:prstGeom>
+          </p:spPr>
+          <p:style>
+            <a:lnRef idx="0">
+              <a:schemeClr val="accent3"/>
+            </a:lnRef>
+            <a:fillRef idx="3">
+              <a:schemeClr val="accent3"/>
+            </a:fillRef>
+            <a:effectRef idx="3">
+              <a:schemeClr val="accent3"/>
+            </a:effectRef>
+            <a:fontRef idx="minor">
+              <a:schemeClr val="lt1"/>
+            </a:fontRef>
+          </p:style>
+          <p:txBody>
+            <a:bodyPr wrap="square" rtlCol="1">
+              <a:spAutoFit/>
+            </a:bodyPr>
+            <a:lstStyle/>
+            <a:p>
+              <a:pPr algn="ctr" rtl="0"/>
+              <a:r>
+                <a:rPr lang="en-US" sz="1200" b="1" dirty="0" err="1" smtClean="0">
+                  <a:solidFill>
+                    <a:schemeClr val="tx1"/>
+                  </a:solidFill>
+                </a:rPr>
+                <a:t>Param</a:t>
+              </a:r>
+              <a:r>
+                <a:rPr lang="en-US" sz="1200" b="1" dirty="0" smtClean="0">
+                  <a:solidFill>
+                    <a:schemeClr val="tx1"/>
+                  </a:solidFill>
+                </a:rPr>
+                <a:t> Registers</a:t>
+              </a:r>
+            </a:p>
+          </p:txBody>
+        </p:sp>
+        <p:sp>
+          <p:nvSpPr>
+            <p:cNvPr id="227" name="TextBox 226"/>
+            <p:cNvSpPr txBox="1"/>
+            <p:nvPr/>
+          </p:nvSpPr>
+          <p:spPr>
+            <a:xfrm>
+              <a:off x="6253416" y="5300688"/>
+              <a:ext cx="928694" cy="307777"/>
+            </a:xfrm>
+            <a:prstGeom prst="rect">
+              <a:avLst/>
+            </a:prstGeom>
+            <a:ln/>
+          </p:spPr>
+          <p:style>
+            <a:lnRef idx="0">
+              <a:schemeClr val="accent1"/>
+            </a:lnRef>
+            <a:fillRef idx="3">
+              <a:schemeClr val="accent1"/>
+            </a:fillRef>
+            <a:effectRef idx="3">
+              <a:schemeClr val="accent1"/>
+            </a:effectRef>
+            <a:fontRef idx="minor">
+              <a:schemeClr val="lt1"/>
+            </a:fontRef>
+          </p:style>
+          <p:txBody>
+            <a:bodyPr wrap="square" rtlCol="1">
+              <a:spAutoFit/>
+            </a:bodyPr>
+            <a:lstStyle/>
+            <a:p>
+              <a:pPr algn="ctr"/>
+              <a:r>
+                <a:rPr lang="en-US" sz="1400" dirty="0" smtClean="0"/>
+                <a:t>WBS</a:t>
+              </a:r>
+              <a:endParaRPr lang="he-IL" sz="1400" dirty="0"/>
+            </a:p>
+          </p:txBody>
+        </p:sp>
+      </p:grpSp>
+      <p:cxnSp>
+        <p:nvCxnSpPr>
+          <p:cNvPr id="210" name="Shape 194"/>
+          <p:cNvCxnSpPr>
+            <a:endCxn id="226" idx="1"/>
+          </p:cNvCxnSpPr>
+          <p:nvPr/>
+        </p:nvCxnSpPr>
+        <p:spPr>
+          <a:xfrm>
+            <a:off x="7068828" y="5041853"/>
+            <a:ext cx="1043354" cy="674821"/>
+          </a:xfrm>
+          <a:prstGeom prst="bentConnector3">
+            <a:avLst>
+              <a:gd name="adj1" fmla="val 86517"/>
+            </a:avLst>
+          </a:prstGeom>
+          <a:ln>
+            <a:tailEnd type="arrow"/>
+          </a:ln>
+        </p:spPr>
+        <p:style>
+          <a:lnRef idx="1">
+            <a:schemeClr val="dk1"/>
+          </a:lnRef>
+          <a:fillRef idx="0">
+            <a:schemeClr val="dk1"/>
+          </a:fillRef>
+          <a:effectRef idx="0">
+            <a:schemeClr val="dk1"/>
+          </a:effectRef>
+          <a:fontRef idx="minor">
+            <a:schemeClr val="tx1"/>
+          </a:fontRef>
+        </p:style>
+      </p:cxnSp>
+      <p:sp>
+        <p:nvSpPr>
+          <p:cNvPr id="211" name="TextBox 210"/>
+          <p:cNvSpPr txBox="1"/>
+          <p:nvPr/>
+        </p:nvSpPr>
+        <p:spPr>
+          <a:xfrm rot="16200000">
+            <a:off x="4673844" y="5547068"/>
+            <a:ext cx="928694" cy="307777"/>
+          </a:xfrm>
+          <a:prstGeom prst="rect">
+            <a:avLst/>
+          </a:prstGeom>
+        </p:spPr>
+        <p:style>
+          <a:lnRef idx="0">
+            <a:schemeClr val="dk1"/>
+          </a:lnRef>
+          <a:fillRef idx="3">
+            <a:schemeClr val="dk1"/>
+          </a:fillRef>
+          <a:effectRef idx="3">
+            <a:schemeClr val="dk1"/>
+          </a:effectRef>
+          <a:fontRef idx="minor">
+            <a:schemeClr val="lt1"/>
+          </a:fontRef>
+        </p:style>
+        <p:txBody>
+          <a:bodyPr wrap="square" rtlCol="1">
+            <a:spAutoFit/>
+          </a:bodyPr>
+          <a:lstStyle/>
+          <a:p>
+            <a:pPr algn="ctr"/>
+            <a:r>
+              <a:rPr lang="en-US" sz="1400" b="1" dirty="0" smtClean="0"/>
+              <a:t>WBM</a:t>
+            </a:r>
+            <a:endParaRPr lang="he-IL" sz="1400" b="1" dirty="0"/>
+          </a:p>
+        </p:txBody>
+      </p:sp>
+      <p:cxnSp>
+        <p:nvCxnSpPr>
+          <p:cNvPr id="212" name="Shape 121"/>
+          <p:cNvCxnSpPr>
+            <a:stCxn id="154" idx="0"/>
+            <a:endCxn id="211" idx="3"/>
+          </p:cNvCxnSpPr>
+          <p:nvPr/>
+        </p:nvCxnSpPr>
+        <p:spPr>
+          <a:xfrm>
+            <a:off x="4798456" y="2920208"/>
+            <a:ext cx="339736" cy="2316402"/>
+          </a:xfrm>
+          <a:prstGeom prst="bentConnector4">
+            <a:avLst>
+              <a:gd name="adj1" fmla="val 67288"/>
+              <a:gd name="adj2" fmla="val 60687"/>
+            </a:avLst>
+          </a:prstGeom>
+          <a:ln>
+            <a:headEnd type="arrow"/>
+            <a:tailEnd type="arrow"/>
+          </a:ln>
+        </p:spPr>
+        <p:style>
+          <a:lnRef idx="2">
+            <a:schemeClr val="accent1"/>
+          </a:lnRef>
+          <a:fillRef idx="0">
+            <a:schemeClr val="accent1"/>
+          </a:fillRef>
+          <a:effectRef idx="1">
+            <a:schemeClr val="accent1"/>
+          </a:effectRef>
+          <a:fontRef idx="minor">
+            <a:schemeClr val="tx1"/>
+          </a:fontRef>
+        </p:style>
+      </p:cxnSp>
+      <p:cxnSp>
+        <p:nvCxnSpPr>
+          <p:cNvPr id="213" name="Elbow Connector 212"/>
+          <p:cNvCxnSpPr>
+            <a:stCxn id="227" idx="0"/>
+            <a:endCxn id="89" idx="3"/>
+          </p:cNvCxnSpPr>
+          <p:nvPr/>
+        </p:nvCxnSpPr>
+        <p:spPr>
+          <a:xfrm rot="16200000" flipV="1">
+            <a:off x="2678030" y="1031838"/>
+            <a:ext cx="3192112" cy="4640992"/>
+          </a:xfrm>
+          <a:prstGeom prst="bentConnector2">
+            <a:avLst/>
+          </a:prstGeom>
+          <a:ln>
+            <a:headEnd type="arrow"/>
+            <a:tailEnd type="arrow"/>
+          </a:ln>
+        </p:spPr>
+        <p:style>
+          <a:lnRef idx="2">
+            <a:schemeClr val="dk1"/>
+          </a:lnRef>
+          <a:fillRef idx="0">
+            <a:schemeClr val="dk1"/>
+          </a:fillRef>
+          <a:effectRef idx="1">
+            <a:schemeClr val="dk1"/>
+          </a:effectRef>
+          <a:fontRef idx="minor">
+            <a:schemeClr val="tx1"/>
+          </a:fontRef>
+        </p:style>
+      </p:cxnSp>
+      <p:sp>
+        <p:nvSpPr>
+          <p:cNvPr id="214" name="TextBox 213"/>
+          <p:cNvSpPr txBox="1"/>
+          <p:nvPr/>
+        </p:nvSpPr>
+        <p:spPr>
+          <a:xfrm>
+            <a:off x="9042128" y="5802159"/>
+            <a:ext cx="428627" cy="338554"/>
+          </a:xfrm>
+          <a:prstGeom prst="rect">
+            <a:avLst/>
+          </a:prstGeom>
+        </p:spPr>
+        <p:style>
+          <a:lnRef idx="0">
+            <a:schemeClr val="accent3"/>
+          </a:lnRef>
+          <a:fillRef idx="3">
+            <a:schemeClr val="accent3"/>
+          </a:fillRef>
+          <a:effectRef idx="3">
+            <a:schemeClr val="accent3"/>
+          </a:effectRef>
+          <a:fontRef idx="minor">
+            <a:schemeClr val="lt1"/>
+          </a:fontRef>
+        </p:style>
+        <p:txBody>
+          <a:bodyPr wrap="square" rtlCol="1">
+            <a:spAutoFit/>
+          </a:bodyPr>
+          <a:lstStyle/>
+          <a:p>
+            <a:pPr algn="ctr" rtl="0"/>
+            <a:r>
+              <a:rPr lang="en-US" sz="800" dirty="0" smtClean="0">
+                <a:solidFill>
+                  <a:schemeClr val="tx1"/>
+                </a:solidFill>
+              </a:rPr>
+              <a:t>TYPE</a:t>
+            </a:r>
+          </a:p>
+          <a:p>
+            <a:pPr algn="ctr" rtl="0"/>
+            <a:r>
+              <a:rPr lang="en-US" sz="800" dirty="0" err="1" smtClean="0">
+                <a:solidFill>
+                  <a:schemeClr val="tx1"/>
+                </a:solidFill>
+              </a:rPr>
+              <a:t>Reg</a:t>
+            </a:r>
+            <a:endParaRPr lang="he-IL" sz="800" dirty="0">
               <a:solidFill>
-                <a:schemeClr val="accent1">
-                  <a:alpha val="19000"/>
-                </a:schemeClr>
+                <a:schemeClr val="tx1"/>
               </a:solidFill>
-            </p:spPr>
-            <p:style>
-              <a:lnRef idx="2">
-                <a:schemeClr val="accent1">
-                  <a:shade val="50000"/>
-                </a:schemeClr>
-              </a:lnRef>
-              <a:fillRef idx="1">
-                <a:schemeClr val="accent1"/>
-              </a:fillRef>
-              <a:effectRef idx="0">
-                <a:schemeClr val="accent1"/>
-              </a:effectRef>
-              <a:fontRef idx="minor">
-                <a:schemeClr val="lt1"/>
-              </a:fontRef>
-            </p:style>
-            <p:txBody>
-              <a:bodyPr rtlCol="1" anchor="ctr"/>
-              <a:lstStyle/>
-              <a:p>
-                <a:pPr algn="ctr"/>
-                <a:endParaRPr lang="he-IL"/>
-              </a:p>
-            </p:txBody>
-          </p:sp>
-          <p:sp>
-            <p:nvSpPr>
-              <p:cNvPr id="217" name="TextBox 216"/>
-              <p:cNvSpPr txBox="1"/>
-              <p:nvPr/>
-            </p:nvSpPr>
-            <p:spPr>
-              <a:xfrm rot="16200000">
-                <a:off x="4833047" y="6977329"/>
-                <a:ext cx="928694" cy="307777"/>
-              </a:xfrm>
-              <a:prstGeom prst="rect">
-                <a:avLst/>
-              </a:prstGeom>
-            </p:spPr>
-            <p:style>
-              <a:lnRef idx="0">
-                <a:schemeClr val="dk1"/>
-              </a:lnRef>
-              <a:fillRef idx="3">
-                <a:schemeClr val="dk1"/>
-              </a:fillRef>
-              <a:effectRef idx="3">
-                <a:schemeClr val="dk1"/>
-              </a:effectRef>
-              <a:fontRef idx="minor">
-                <a:schemeClr val="lt1"/>
-              </a:fontRef>
-            </p:style>
-            <p:txBody>
-              <a:bodyPr wrap="square" rtlCol="1">
-                <a:spAutoFit/>
-              </a:bodyPr>
-              <a:lstStyle/>
-              <a:p>
-                <a:pPr algn="ctr"/>
-                <a:r>
-                  <a:rPr lang="en-US" sz="1400" b="1" dirty="0" smtClean="0"/>
-                  <a:t>WBM</a:t>
-                </a:r>
-                <a:endParaRPr lang="he-IL" sz="1400" b="1" dirty="0"/>
-              </a:p>
-            </p:txBody>
-          </p:sp>
-          <p:sp>
-            <p:nvSpPr>
-              <p:cNvPr id="219" name="Oval 218"/>
-              <p:cNvSpPr/>
-              <p:nvPr/>
-            </p:nvSpPr>
-            <p:spPr>
-              <a:xfrm>
-                <a:off x="5174346" y="6666870"/>
-                <a:ext cx="214314" cy="214314"/>
-              </a:xfrm>
-              <a:prstGeom prst="ellipse">
-                <a:avLst/>
-              </a:prstGeom>
-              <a:effectLst>
-                <a:outerShdw blurRad="40000" dist="23000" dir="5400000" rotWithShape="0">
-                  <a:srgbClr val="000000">
-                    <a:alpha val="35000"/>
-                  </a:srgbClr>
-                </a:outerShdw>
-                <a:reflection blurRad="6350" stA="50000" endA="275" endPos="40000" dist="101600" dir="5400000" sy="-100000" algn="bl" rotWithShape="0"/>
-              </a:effectLst>
-              <a:scene3d>
-                <a:camera prst="orthographicFront">
-                  <a:rot lat="0" lon="0" rev="0"/>
-                </a:camera>
-                <a:lightRig rig="threePt" dir="t">
-                  <a:rot lat="0" lon="0" rev="1200000"/>
-                </a:lightRig>
-              </a:scene3d>
-              <a:sp3d>
-                <a:bevelT w="63500" h="25400" prst="coolSlant"/>
-              </a:sp3d>
-            </p:spPr>
-            <p:style>
-              <a:lnRef idx="0">
-                <a:schemeClr val="accent2"/>
-              </a:lnRef>
-              <a:fillRef idx="3">
-                <a:schemeClr val="accent2"/>
-              </a:fillRef>
-              <a:effectRef idx="3">
-                <a:schemeClr val="accent2"/>
-              </a:effectRef>
-              <a:fontRef idx="minor">
-                <a:schemeClr val="lt1"/>
-              </a:fontRef>
-            </p:style>
-            <p:txBody>
-              <a:bodyPr rtlCol="1" anchor="ctr"/>
-              <a:lstStyle/>
-              <a:p>
-                <a:pPr algn="l"/>
-                <a:r>
-                  <a:rPr lang="en-US" sz="1200" dirty="0"/>
-                  <a:t>F</a:t>
-                </a:r>
-                <a:endParaRPr lang="he-IL" sz="1200" dirty="0"/>
-              </a:p>
-            </p:txBody>
-          </p:sp>
-          <p:cxnSp>
-            <p:nvCxnSpPr>
-              <p:cNvPr id="220" name="Elbow Connector 219"/>
-              <p:cNvCxnSpPr/>
-              <p:nvPr/>
-            </p:nvCxnSpPr>
-            <p:spPr>
-              <a:xfrm rot="16200000" flipH="1">
-                <a:off x="5832420" y="6558546"/>
-                <a:ext cx="672240" cy="331962"/>
-              </a:xfrm>
-              <a:prstGeom prst="bentConnector3">
-                <a:avLst>
-                  <a:gd name="adj1" fmla="val 50000"/>
-                </a:avLst>
-              </a:prstGeom>
-              <a:ln>
-                <a:tailEnd type="arrow"/>
-              </a:ln>
-            </p:spPr>
-            <p:style>
-              <a:lnRef idx="2">
-                <a:schemeClr val="accent4"/>
-              </a:lnRef>
-              <a:fillRef idx="0">
-                <a:schemeClr val="accent4"/>
-              </a:fillRef>
-              <a:effectRef idx="1">
-                <a:schemeClr val="accent4"/>
-              </a:effectRef>
-              <a:fontRef idx="minor">
-                <a:schemeClr val="tx1"/>
-              </a:fontRef>
-            </p:style>
-          </p:cxnSp>
-          <p:sp>
-            <p:nvSpPr>
-              <p:cNvPr id="221" name="Rounded Rectangle 220"/>
-              <p:cNvSpPr/>
-              <p:nvPr/>
-            </p:nvSpPr>
-            <p:spPr>
-              <a:xfrm>
-                <a:off x="7523448" y="5203257"/>
-                <a:ext cx="1523997" cy="500066"/>
-              </a:xfrm>
-              <a:prstGeom prst="roundRect">
-                <a:avLst/>
-              </a:prstGeom>
-            </p:spPr>
-            <p:style>
-              <a:lnRef idx="0">
-                <a:schemeClr val="accent2"/>
-              </a:lnRef>
-              <a:fillRef idx="3">
-                <a:schemeClr val="accent2"/>
-              </a:fillRef>
-              <a:effectRef idx="3">
-                <a:schemeClr val="accent2"/>
-              </a:effectRef>
-              <a:fontRef idx="minor">
-                <a:schemeClr val="lt1"/>
-              </a:fontRef>
-            </p:style>
-            <p:txBody>
-              <a:bodyPr rtlCol="1" anchor="ctr"/>
-              <a:lstStyle/>
-              <a:p>
-                <a:pPr algn="ctr"/>
-                <a:r>
-                  <a:rPr lang="en-US" dirty="0" smtClean="0"/>
-                  <a:t>Image Manipulation</a:t>
-                </a:r>
-              </a:p>
-            </p:txBody>
-          </p:sp>
-          <p:cxnSp>
-            <p:nvCxnSpPr>
-              <p:cNvPr id="223" name="Elbow Connector 222"/>
-              <p:cNvCxnSpPr>
-                <a:endCxn id="225" idx="0"/>
-              </p:cNvCxnSpPr>
-              <p:nvPr/>
-            </p:nvCxnSpPr>
-            <p:spPr>
-              <a:xfrm>
-                <a:off x="6684257" y="6370489"/>
-                <a:ext cx="994087" cy="510695"/>
-              </a:xfrm>
-              <a:prstGeom prst="bentConnector2">
-                <a:avLst/>
-              </a:prstGeom>
-              <a:ln>
-                <a:tailEnd type="arrow"/>
-              </a:ln>
-            </p:spPr>
-            <p:style>
-              <a:lnRef idx="2">
-                <a:schemeClr val="accent4"/>
-              </a:lnRef>
-              <a:fillRef idx="0">
-                <a:schemeClr val="accent4"/>
-              </a:fillRef>
-              <a:effectRef idx="1">
-                <a:schemeClr val="accent4"/>
-              </a:effectRef>
-              <a:fontRef idx="minor">
-                <a:schemeClr val="tx1"/>
-              </a:fontRef>
-            </p:style>
-          </p:cxnSp>
-          <p:sp>
-            <p:nvSpPr>
-              <p:cNvPr id="224" name="TextBox 223"/>
-              <p:cNvSpPr txBox="1"/>
-              <p:nvPr/>
-            </p:nvSpPr>
-            <p:spPr>
-              <a:xfrm>
-                <a:off x="5939662" y="7060645"/>
-                <a:ext cx="1026337" cy="338554"/>
-              </a:xfrm>
-              <a:prstGeom prst="rect">
-                <a:avLst/>
-              </a:prstGeom>
-            </p:spPr>
-            <p:style>
-              <a:lnRef idx="0">
-                <a:schemeClr val="accent6"/>
-              </a:lnRef>
-              <a:fillRef idx="3">
-                <a:schemeClr val="accent6"/>
-              </a:fillRef>
-              <a:effectRef idx="3">
-                <a:schemeClr val="accent6"/>
-              </a:effectRef>
-              <a:fontRef idx="minor">
-                <a:schemeClr val="lt1"/>
-              </a:fontRef>
-            </p:style>
-            <p:txBody>
-              <a:bodyPr wrap="square" rtlCol="1">
-                <a:spAutoFit/>
-              </a:bodyPr>
-              <a:lstStyle/>
-              <a:p>
-                <a:pPr algn="ctr" rtl="0"/>
-                <a:r>
-                  <a:rPr lang="en-US" sz="1600" dirty="0" err="1" smtClean="0"/>
-                  <a:t>Biliniar</a:t>
-                </a:r>
-                <a:endParaRPr lang="he-IL" sz="1600" dirty="0"/>
-              </a:p>
-            </p:txBody>
-          </p:sp>
-          <p:sp>
-            <p:nvSpPr>
-              <p:cNvPr id="225" name="TextBox 224"/>
-              <p:cNvSpPr txBox="1"/>
-              <p:nvPr/>
-            </p:nvSpPr>
-            <p:spPr>
-              <a:xfrm>
-                <a:off x="7134511" y="6881184"/>
-                <a:ext cx="1087665" cy="584775"/>
-              </a:xfrm>
-              <a:prstGeom prst="rect">
-                <a:avLst/>
-              </a:prstGeom>
-            </p:spPr>
-            <p:style>
-              <a:lnRef idx="0">
-                <a:schemeClr val="accent6"/>
-              </a:lnRef>
-              <a:fillRef idx="3">
-                <a:schemeClr val="accent6"/>
-              </a:fillRef>
-              <a:effectRef idx="3">
-                <a:schemeClr val="accent6"/>
-              </a:effectRef>
-              <a:fontRef idx="minor">
-                <a:schemeClr val="lt1"/>
-              </a:fontRef>
-            </p:style>
-            <p:txBody>
-              <a:bodyPr wrap="square" rtlCol="1">
-                <a:spAutoFit/>
-              </a:bodyPr>
-              <a:lstStyle/>
-              <a:p>
-                <a:pPr algn="ctr" rtl="0"/>
-                <a:r>
-                  <a:rPr lang="en-US" sz="1600" dirty="0" err="1" smtClean="0"/>
-                  <a:t>Addr</a:t>
-                </a:r>
-                <a:r>
-                  <a:rPr lang="en-US" sz="1600" dirty="0" smtClean="0"/>
-                  <a:t> Calculator</a:t>
-                </a:r>
-                <a:endParaRPr lang="he-IL" sz="1600" dirty="0"/>
-              </a:p>
-            </p:txBody>
-          </p:sp>
-          <p:sp>
-            <p:nvSpPr>
-              <p:cNvPr id="226" name="TextBox 225"/>
-              <p:cNvSpPr txBox="1"/>
-              <p:nvPr/>
-            </p:nvSpPr>
-            <p:spPr>
-              <a:xfrm>
-                <a:off x="7252011" y="5957520"/>
-                <a:ext cx="1372877" cy="276999"/>
-              </a:xfrm>
-              <a:prstGeom prst="rect">
-                <a:avLst/>
-              </a:prstGeom>
-            </p:spPr>
-            <p:style>
-              <a:lnRef idx="0">
-                <a:schemeClr val="accent3"/>
-              </a:lnRef>
-              <a:fillRef idx="3">
-                <a:schemeClr val="accent3"/>
-              </a:fillRef>
-              <a:effectRef idx="3">
-                <a:schemeClr val="accent3"/>
-              </a:effectRef>
-              <a:fontRef idx="minor">
-                <a:schemeClr val="lt1"/>
-              </a:fontRef>
-            </p:style>
-            <p:txBody>
-              <a:bodyPr wrap="square" rtlCol="1">
-                <a:spAutoFit/>
-              </a:bodyPr>
-              <a:lstStyle/>
-              <a:p>
-                <a:pPr algn="ctr" rtl="0"/>
-                <a:r>
-                  <a:rPr lang="en-US" sz="1200" b="1" dirty="0" err="1" smtClean="0">
-                    <a:solidFill>
-                      <a:schemeClr val="tx1"/>
-                    </a:solidFill>
-                  </a:rPr>
-                  <a:t>Param</a:t>
-                </a:r>
-                <a:r>
-                  <a:rPr lang="en-US" sz="1200" b="1" dirty="0" smtClean="0">
-                    <a:solidFill>
-                      <a:schemeClr val="tx1"/>
-                    </a:solidFill>
-                  </a:rPr>
-                  <a:t> Registers</a:t>
-                </a:r>
-              </a:p>
-            </p:txBody>
-          </p:sp>
-          <p:sp>
-            <p:nvSpPr>
-              <p:cNvPr id="227" name="TextBox 226"/>
-              <p:cNvSpPr txBox="1"/>
-              <p:nvPr/>
-            </p:nvSpPr>
-            <p:spPr>
-              <a:xfrm>
-                <a:off x="6253416" y="5300688"/>
-                <a:ext cx="928694" cy="307777"/>
-              </a:xfrm>
-              <a:prstGeom prst="rect">
-                <a:avLst/>
-              </a:prstGeom>
-              <a:ln/>
-            </p:spPr>
-            <p:style>
-              <a:lnRef idx="0">
-                <a:schemeClr val="accent1"/>
-              </a:lnRef>
-              <a:fillRef idx="3">
-                <a:schemeClr val="accent1"/>
-              </a:fillRef>
-              <a:effectRef idx="3">
-                <a:schemeClr val="accent1"/>
-              </a:effectRef>
-              <a:fontRef idx="minor">
-                <a:schemeClr val="lt1"/>
-              </a:fontRef>
-            </p:style>
-            <p:txBody>
-              <a:bodyPr wrap="square" rtlCol="1">
-                <a:spAutoFit/>
-              </a:bodyPr>
-              <a:lstStyle/>
-              <a:p>
-                <a:pPr algn="ctr"/>
-                <a:r>
-                  <a:rPr lang="en-US" sz="1400" dirty="0" smtClean="0"/>
-                  <a:t>WBS</a:t>
-                </a:r>
-                <a:endParaRPr lang="he-IL" sz="1400" dirty="0"/>
-              </a:p>
-            </p:txBody>
-          </p:sp>
-          <p:sp>
-            <p:nvSpPr>
-              <p:cNvPr id="228" name="Oval 227"/>
-              <p:cNvSpPr/>
-              <p:nvPr/>
-            </p:nvSpPr>
-            <p:spPr>
-              <a:xfrm>
-                <a:off x="6968503" y="5394151"/>
-                <a:ext cx="214314" cy="214314"/>
-              </a:xfrm>
-              <a:prstGeom prst="ellipse">
-                <a:avLst/>
-              </a:prstGeom>
-              <a:effectLst>
-                <a:outerShdw blurRad="40000" dist="23000" dir="5400000" rotWithShape="0">
-                  <a:srgbClr val="000000">
-                    <a:alpha val="35000"/>
-                  </a:srgbClr>
-                </a:outerShdw>
-                <a:reflection blurRad="6350" stA="50000" endA="275" endPos="40000" dist="101600" dir="5400000" sy="-100000" algn="bl" rotWithShape="0"/>
-              </a:effectLst>
-              <a:scene3d>
-                <a:camera prst="orthographicFront">
-                  <a:rot lat="0" lon="0" rev="0"/>
-                </a:camera>
-                <a:lightRig rig="threePt" dir="t">
-                  <a:rot lat="0" lon="0" rev="1200000"/>
-                </a:lightRig>
-              </a:scene3d>
-              <a:sp3d>
-                <a:bevelT w="63500" h="25400" prst="coolSlant"/>
-              </a:sp3d>
-            </p:spPr>
-            <p:style>
-              <a:lnRef idx="0">
-                <a:schemeClr val="accent2"/>
-              </a:lnRef>
-              <a:fillRef idx="3">
-                <a:schemeClr val="accent2"/>
-              </a:fillRef>
-              <a:effectRef idx="3">
-                <a:schemeClr val="accent2"/>
-              </a:effectRef>
-              <a:fontRef idx="minor">
-                <a:schemeClr val="lt1"/>
-              </a:fontRef>
-            </p:style>
-            <p:txBody>
-              <a:bodyPr rtlCol="1" anchor="ctr"/>
-              <a:lstStyle/>
-              <a:p>
-                <a:pPr algn="l"/>
-                <a:r>
-                  <a:rPr lang="he-IL" sz="1200" dirty="0" smtClean="0"/>
-                  <a:t>6</a:t>
-                </a:r>
-                <a:endParaRPr lang="he-IL" sz="1200" dirty="0"/>
-              </a:p>
-            </p:txBody>
-          </p:sp>
-        </p:grpSp>
+            </a:endParaRPr>
+          </a:p>
+        </p:txBody>
+      </p:sp>
+      <p:cxnSp>
+        <p:nvCxnSpPr>
+          <p:cNvPr id="216" name="Shape 194"/>
+          <p:cNvCxnSpPr>
+            <a:endCxn id="214" idx="1"/>
+          </p:cNvCxnSpPr>
+          <p:nvPr/>
+        </p:nvCxnSpPr>
+        <p:spPr>
+          <a:xfrm>
+            <a:off x="7023925" y="5072202"/>
+            <a:ext cx="2018203" cy="899234"/>
+          </a:xfrm>
+          <a:prstGeom prst="bentConnector3">
+            <a:avLst>
+              <a:gd name="adj1" fmla="val 42071"/>
+            </a:avLst>
+          </a:prstGeom>
+          <a:ln>
+            <a:tailEnd type="arrow"/>
+          </a:ln>
+        </p:spPr>
+        <p:style>
+          <a:lnRef idx="1">
+            <a:schemeClr val="dk1"/>
+          </a:lnRef>
+          <a:fillRef idx="0">
+            <a:schemeClr val="dk1"/>
+          </a:fillRef>
+          <a:effectRef idx="0">
+            <a:schemeClr val="dk1"/>
+          </a:effectRef>
+          <a:fontRef idx="minor">
+            <a:schemeClr val="tx1"/>
+          </a:fontRef>
+        </p:style>
+      </p:cxnSp>
+      <p:grpSp>
+        <p:nvGrpSpPr>
+          <p:cNvPr id="9" name="Group 8"/>
+          <p:cNvGrpSpPr/>
+          <p:nvPr/>
+        </p:nvGrpSpPr>
+        <p:grpSpPr>
+          <a:xfrm>
+            <a:off x="5580112" y="6669360"/>
+            <a:ext cx="2160240" cy="842857"/>
+            <a:chOff x="2555776" y="5610479"/>
+            <a:chExt cx="2160240" cy="842857"/>
+          </a:xfrm>
+        </p:grpSpPr>
         <p:sp>
           <p:nvSpPr>
             <p:cNvPr id="181" name="TextBox 180"/>
@@ -16351,8 +15905,8 @@
           </p:nvSpPr>
           <p:spPr>
             <a:xfrm>
-              <a:off x="5381048" y="5643597"/>
-              <a:ext cx="1163752" cy="584775"/>
+              <a:off x="2555776" y="5610479"/>
+              <a:ext cx="2153948" cy="830997"/>
             </a:xfrm>
             <a:prstGeom prst="rect">
               <a:avLst/>
@@ -16385,77 +15939,413 @@
               </a:r>
               <a:r>
                 <a:rPr lang="en-US" sz="1600" dirty="0" smtClean="0"/>
-                <a:t> Manger</a:t>
+                <a:t> </a:t>
               </a:r>
+              <a:r>
+                <a:rPr lang="en-US" sz="1600" dirty="0" smtClean="0"/>
+                <a:t>Manger</a:t>
+              </a:r>
+              <a:br>
+                <a:rPr lang="en-US" sz="1600" dirty="0" smtClean="0"/>
+              </a:br>
+              <a:endParaRPr lang="en-US" sz="1600" dirty="0" smtClean="0"/>
+            </a:p>
+            <a:p>
+              <a:pPr algn="ctr" rtl="0"/>
               <a:endParaRPr lang="he-IL" sz="1600" dirty="0"/>
             </a:p>
           </p:txBody>
         </p:sp>
-        <p:cxnSp>
-          <p:nvCxnSpPr>
-            <p:cNvPr id="182" name="Elbow Connector 181"/>
-            <p:cNvCxnSpPr>
-              <a:endCxn id="217" idx="2"/>
-            </p:cNvCxnSpPr>
+        <p:sp>
+          <p:nvSpPr>
+            <p:cNvPr id="222" name="Rounded Rectangle 221"/>
+            <p:cNvSpPr/>
             <p:nvPr/>
-          </p:nvCxnSpPr>
+          </p:nvSpPr>
           <p:spPr>
-            <a:xfrm rot="5400000">
-              <a:off x="5082333" y="6439947"/>
-              <a:ext cx="760729" cy="301741"/>
+            <a:xfrm>
+              <a:off x="4288712" y="6239022"/>
+              <a:ext cx="427304" cy="214314"/>
             </a:xfrm>
-            <a:prstGeom prst="bentConnector4">
-              <a:avLst>
-                <a:gd name="adj1" fmla="val 39885"/>
-                <a:gd name="adj2" fmla="val 268"/>
-              </a:avLst>
+            <a:prstGeom prst="roundRect">
+              <a:avLst/>
             </a:prstGeom>
-            <a:ln>
-              <a:tailEnd type="arrow"/>
-            </a:ln>
           </p:spPr>
           <p:style>
             <a:lnRef idx="2">
-              <a:schemeClr val="accent4"/>
+              <a:schemeClr val="dk1"/>
             </a:lnRef>
-            <a:fillRef idx="0">
-              <a:schemeClr val="accent4"/>
+            <a:fillRef idx="1">
+              <a:schemeClr val="lt1"/>
+            </a:fillRef>
+            <a:effectRef idx="0">
+              <a:schemeClr val="dk1"/>
+            </a:effectRef>
+            <a:fontRef idx="minor">
+              <a:schemeClr val="dk1"/>
+            </a:fontRef>
+          </p:style>
+          <p:txBody>
+            <a:bodyPr rtlCol="1" anchor="ctr"/>
+            <a:lstStyle/>
+            <a:p>
+              <a:pPr algn="ctr"/>
+              <a:r>
+                <a:rPr lang="en-US" sz="800" dirty="0" smtClean="0"/>
+                <a:t>RAM</a:t>
+              </a:r>
+              <a:endParaRPr lang="he-IL" sz="800" dirty="0"/>
+            </a:p>
+          </p:txBody>
+        </p:sp>
+        <p:sp>
+          <p:nvSpPr>
+            <p:cNvPr id="230" name="TextBox 229"/>
+            <p:cNvSpPr txBox="1"/>
+            <p:nvPr/>
+          </p:nvSpPr>
+          <p:spPr>
+            <a:xfrm>
+              <a:off x="2786448" y="5975702"/>
+              <a:ext cx="728084" cy="261610"/>
+            </a:xfrm>
+            <a:prstGeom prst="rect">
+              <a:avLst/>
+            </a:prstGeom>
+          </p:spPr>
+          <p:style>
+            <a:lnRef idx="1">
+              <a:schemeClr val="dk1"/>
+            </a:lnRef>
+            <a:fillRef idx="2">
+              <a:schemeClr val="dk1"/>
             </a:fillRef>
             <a:effectRef idx="1">
-              <a:schemeClr val="accent4"/>
+              <a:schemeClr val="dk1"/>
             </a:effectRef>
             <a:fontRef idx="minor">
-              <a:schemeClr val="tx1"/>
+              <a:schemeClr val="dk1"/>
             </a:fontRef>
           </p:style>
-        </p:cxnSp>
+          <p:txBody>
+            <a:bodyPr wrap="none" rtlCol="1">
+              <a:spAutoFit/>
+            </a:bodyPr>
+            <a:lstStyle/>
+            <a:p>
+              <a:r>
+                <a:rPr lang="en-US" sz="1100" dirty="0" err="1" smtClean="0"/>
+                <a:t>ReadProc</a:t>
+              </a:r>
+              <a:endParaRPr lang="he-IL" sz="1100" dirty="0"/>
+            </a:p>
+          </p:txBody>
+        </p:sp>
+        <p:sp>
+          <p:nvSpPr>
+            <p:cNvPr id="232" name="TextBox 231"/>
+            <p:cNvSpPr txBox="1"/>
+            <p:nvPr/>
+          </p:nvSpPr>
+          <p:spPr>
+            <a:xfrm>
+              <a:off x="3762367" y="5975702"/>
+              <a:ext cx="763351" cy="261610"/>
+            </a:xfrm>
+            <a:prstGeom prst="rect">
+              <a:avLst/>
+            </a:prstGeom>
+          </p:spPr>
+          <p:style>
+            <a:lnRef idx="1">
+              <a:schemeClr val="dk1"/>
+            </a:lnRef>
+            <a:fillRef idx="2">
+              <a:schemeClr val="dk1"/>
+            </a:fillRef>
+            <a:effectRef idx="1">
+              <a:schemeClr val="dk1"/>
+            </a:effectRef>
+            <a:fontRef idx="minor">
+              <a:schemeClr val="dk1"/>
+            </a:fontRef>
+          </p:style>
+          <p:txBody>
+            <a:bodyPr wrap="none" rtlCol="1">
+              <a:spAutoFit/>
+            </a:bodyPr>
+            <a:lstStyle/>
+            <a:p>
+              <a:r>
+                <a:rPr lang="en-US" sz="1100" dirty="0" err="1" smtClean="0"/>
+                <a:t>WriteProc</a:t>
+              </a:r>
+              <a:endParaRPr lang="he-IL" sz="1100" dirty="0"/>
+            </a:p>
+          </p:txBody>
+        </p:sp>
       </p:grpSp>
       <p:cxnSp>
         <p:nvCxnSpPr>
-          <p:cNvPr id="210" name="Shape 194"/>
-          <p:cNvCxnSpPr/>
+          <p:cNvPr id="233" name="Elbow Connector 232"/>
+          <p:cNvCxnSpPr>
+            <a:stCxn id="230" idx="1"/>
+            <a:endCxn id="211" idx="2"/>
+          </p:cNvCxnSpPr>
           <p:nvPr/>
         </p:nvCxnSpPr>
         <p:spPr>
-          <a:xfrm rot="16200000" flipH="1">
-            <a:off x="6606586" y="5168184"/>
-            <a:ext cx="487555" cy="534248"/>
-          </a:xfrm>
-          <a:prstGeom prst="bentConnector2">
-            <a:avLst/>
+          <a:xfrm rot="10800000">
+            <a:off x="5292080" y="5700958"/>
+            <a:ext cx="518704" cy="1464431"/>
+          </a:xfrm>
+          <a:prstGeom prst="bentConnector3">
+            <a:avLst>
+              <a:gd name="adj1" fmla="val 50000"/>
+            </a:avLst>
           </a:prstGeom>
           <a:ln>
             <a:tailEnd type="arrow"/>
           </a:ln>
         </p:spPr>
         <p:style>
-          <a:lnRef idx="1">
-            <a:schemeClr val="dk1"/>
+          <a:lnRef idx="2">
+            <a:schemeClr val="accent4"/>
           </a:lnRef>
           <a:fillRef idx="0">
-            <a:schemeClr val="dk1"/>
-          </a:fillRef>
-          <a:effectRef idx="0">
+            <a:schemeClr val="accent4"/>
+          </a:fillRef>
+          <a:effectRef idx="1">
+            <a:schemeClr val="accent4"/>
+          </a:effectRef>
+          <a:fontRef idx="minor">
+            <a:schemeClr val="tx1"/>
+          </a:fontRef>
+        </p:style>
+      </p:cxnSp>
+      <p:sp>
+        <p:nvSpPr>
+          <p:cNvPr id="235" name="TextBox 234"/>
+          <p:cNvSpPr txBox="1"/>
+          <p:nvPr/>
+        </p:nvSpPr>
+        <p:spPr>
+          <a:xfrm>
+            <a:off x="6892652" y="5996027"/>
+            <a:ext cx="1026337" cy="338554"/>
+          </a:xfrm>
+          <a:prstGeom prst="rect">
+            <a:avLst/>
+          </a:prstGeom>
+        </p:spPr>
+        <p:style>
+          <a:lnRef idx="0">
+            <a:schemeClr val="accent6"/>
+          </a:lnRef>
+          <a:fillRef idx="3">
+            <a:schemeClr val="accent6"/>
+          </a:fillRef>
+          <a:effectRef idx="3">
+            <a:schemeClr val="accent6"/>
+          </a:effectRef>
+          <a:fontRef idx="minor">
+            <a:schemeClr val="lt1"/>
+          </a:fontRef>
+        </p:style>
+        <p:txBody>
+          <a:bodyPr wrap="square" rtlCol="1">
+            <a:spAutoFit/>
+          </a:bodyPr>
+          <a:lstStyle/>
+          <a:p>
+            <a:pPr algn="ctr" rtl="0"/>
+            <a:r>
+              <a:rPr lang="en-US" sz="1600" dirty="0" err="1" smtClean="0"/>
+              <a:t>Biliniar</a:t>
+            </a:r>
+            <a:endParaRPr lang="he-IL" sz="1600" dirty="0"/>
+          </a:p>
+        </p:txBody>
+      </p:sp>
+      <p:cxnSp>
+        <p:nvCxnSpPr>
+          <p:cNvPr id="239" name="Elbow Connector 238"/>
+          <p:cNvCxnSpPr>
+            <a:stCxn id="181" idx="0"/>
+            <a:endCxn id="225" idx="2"/>
+          </p:cNvCxnSpPr>
+          <p:nvPr/>
+        </p:nvCxnSpPr>
+        <p:spPr>
+          <a:xfrm rot="16200000" flipV="1">
+            <a:off x="6098711" y="6110985"/>
+            <a:ext cx="720080" cy="396670"/>
+          </a:xfrm>
+          <a:prstGeom prst="bentConnector3">
+            <a:avLst>
+              <a:gd name="adj1" fmla="val 50000"/>
+            </a:avLst>
+          </a:prstGeom>
+          <a:ln>
+            <a:tailEnd type="arrow"/>
+          </a:ln>
+        </p:spPr>
+        <p:style>
+          <a:lnRef idx="2">
+            <a:schemeClr val="accent4"/>
+          </a:lnRef>
+          <a:fillRef idx="0">
+            <a:schemeClr val="accent4"/>
+          </a:fillRef>
+          <a:effectRef idx="1">
+            <a:schemeClr val="accent4"/>
+          </a:effectRef>
+          <a:fontRef idx="minor">
+            <a:schemeClr val="tx1"/>
+          </a:fontRef>
+        </p:style>
+      </p:cxnSp>
+      <p:cxnSp>
+        <p:nvCxnSpPr>
+          <p:cNvPr id="240" name="Elbow Connector 239"/>
+          <p:cNvCxnSpPr>
+            <a:endCxn id="235" idx="1"/>
+          </p:cNvCxnSpPr>
+          <p:nvPr/>
+        </p:nvCxnSpPr>
+        <p:spPr>
+          <a:xfrm rot="5400000" flipH="1" flipV="1">
+            <a:off x="6538233" y="6289811"/>
+            <a:ext cx="478926" cy="229912"/>
+          </a:xfrm>
+          <a:prstGeom prst="bentConnector2">
+            <a:avLst/>
+          </a:prstGeom>
+          <a:ln>
+            <a:tailEnd type="arrow"/>
+          </a:ln>
+        </p:spPr>
+        <p:style>
+          <a:lnRef idx="2">
+            <a:schemeClr val="accent4"/>
+          </a:lnRef>
+          <a:fillRef idx="0">
+            <a:schemeClr val="accent4"/>
+          </a:fillRef>
+          <a:effectRef idx="1">
+            <a:schemeClr val="accent4"/>
+          </a:effectRef>
+          <a:fontRef idx="minor">
+            <a:schemeClr val="tx1"/>
+          </a:fontRef>
+        </p:style>
+      </p:cxnSp>
+      <p:cxnSp>
+        <p:nvCxnSpPr>
+          <p:cNvPr id="241" name="Elbow Connector 240"/>
+          <p:cNvCxnSpPr>
+            <a:stCxn id="235" idx="3"/>
+            <a:endCxn id="222" idx="3"/>
+          </p:cNvCxnSpPr>
+          <p:nvPr/>
+        </p:nvCxnSpPr>
+        <p:spPr>
+          <a:xfrm flipH="1">
+            <a:off x="7740352" y="6165304"/>
+            <a:ext cx="178637" cy="1239756"/>
+          </a:xfrm>
+          <a:prstGeom prst="bentConnector3">
+            <a:avLst>
+              <a:gd name="adj1" fmla="val -127969"/>
+            </a:avLst>
+          </a:prstGeom>
+          <a:ln>
+            <a:tailEnd type="arrow"/>
+          </a:ln>
+        </p:spPr>
+        <p:style>
+          <a:lnRef idx="2">
+            <a:schemeClr val="accent4"/>
+          </a:lnRef>
+          <a:fillRef idx="0">
+            <a:schemeClr val="accent4"/>
+          </a:fillRef>
+          <a:effectRef idx="1">
+            <a:schemeClr val="accent4"/>
+          </a:effectRef>
+          <a:fontRef idx="minor">
+            <a:schemeClr val="tx1"/>
+          </a:fontRef>
+        </p:style>
+      </p:cxnSp>
+      <p:cxnSp>
+        <p:nvCxnSpPr>
+          <p:cNvPr id="242" name="Elbow Connector 241"/>
+          <p:cNvCxnSpPr>
+            <a:stCxn id="232" idx="2"/>
+            <a:endCxn id="217" idx="2"/>
+          </p:cNvCxnSpPr>
+          <p:nvPr/>
+        </p:nvCxnSpPr>
+        <p:spPr>
+          <a:xfrm rot="5400000">
+            <a:off x="6209564" y="6395036"/>
+            <a:ext cx="57659" cy="1859972"/>
+          </a:xfrm>
+          <a:prstGeom prst="bentConnector2">
+            <a:avLst/>
+          </a:prstGeom>
+          <a:ln>
+            <a:tailEnd type="arrow"/>
+          </a:ln>
+        </p:spPr>
+        <p:style>
+          <a:lnRef idx="2">
+            <a:schemeClr val="accent4"/>
+          </a:lnRef>
+          <a:fillRef idx="0">
+            <a:schemeClr val="accent4"/>
+          </a:fillRef>
+          <a:effectRef idx="1">
+            <a:schemeClr val="accent4"/>
+          </a:effectRef>
+          <a:fontRef idx="minor">
+            <a:schemeClr val="tx1"/>
+          </a:fontRef>
+        </p:style>
+      </p:cxnSp>
+      <p:cxnSp>
+        <p:nvCxnSpPr>
+          <p:cNvPr id="243" name="Elbow Connector 242"/>
+          <p:cNvCxnSpPr>
+            <a:stCxn id="217" idx="0"/>
+            <a:endCxn id="89" idx="1"/>
+          </p:cNvCxnSpPr>
+          <p:nvPr/>
+        </p:nvCxnSpPr>
+        <p:spPr>
+          <a:xfrm rot="10800000">
+            <a:off x="791990" y="1756278"/>
+            <a:ext cx="4208640" cy="5597574"/>
+          </a:xfrm>
+          <a:prstGeom prst="bentConnector3">
+            <a:avLst>
+              <a:gd name="adj1" fmla="val 132235"/>
+            </a:avLst>
+          </a:prstGeom>
+          <a:ln>
+            <a:headEnd type="arrow"/>
+            <a:tailEnd type="arrow"/>
+          </a:ln>
+        </p:spPr>
+        <p:style>
+          <a:lnRef idx="2">
+            <a:schemeClr val="dk1"/>
+          </a:lnRef>
+          <a:fillRef idx="0">
+            <a:schemeClr val="dk1"/>
+          </a:fillRef>
+          <a:effectRef idx="1">
             <a:schemeClr val="dk1"/>
           </a:effectRef>
           <a:fontRef idx="minor">
@@ -16466,7 +16356,7 @@
     </p:spTree>
     <p:extLst>
       <p:ext uri="{BB962C8B-B14F-4D97-AF65-F5344CB8AC3E}">
-        <p14:creationId xmlns:p14="http://schemas.microsoft.com/office/powerpoint/2010/main" val="3424470355"/>
+        <p14:creationId xmlns:p14="http://schemas.microsoft.com/office/powerpoint/2010/main" val="1906871029"/>
       </p:ext>
     </p:extLst>
   </p:cSld>
@@ -16476,7 +16366,7 @@
 </p:sld>
 </file>
 
-<file path=ppt/slides/slide3.xml><?xml version="1.0" encoding="utf-8"?>
+<file path=ppt/slides/slide2.xml><?xml version="1.0" encoding="utf-8"?>
 <p:sld xmlns:a="http://schemas.openxmlformats.org/drawingml/2006/main" xmlns:r="http://schemas.openxmlformats.org/officeDocument/2006/relationships" xmlns:p="http://schemas.openxmlformats.org/presentationml/2006/main">
   <p:cSld>
     <p:spTree>
@@ -18442,6 +18332,588 @@
 </p:sld>
 </file>
 
+<file path=ppt/slides/slide3.xml><?xml version="1.0" encoding="utf-8"?>
+<p:sld xmlns:a="http://schemas.openxmlformats.org/drawingml/2006/main" xmlns:r="http://schemas.openxmlformats.org/officeDocument/2006/relationships" xmlns:p="http://schemas.openxmlformats.org/presentationml/2006/main">
+  <p:cSld>
+    <p:spTree>
+      <p:nvGrpSpPr>
+        <p:cNvPr id="1" name=""/>
+        <p:cNvGrpSpPr/>
+        <p:nvPr/>
+      </p:nvGrpSpPr>
+      <p:grpSpPr>
+        <a:xfrm>
+          <a:off x="0" y="0"/>
+          <a:ext cx="0" cy="0"/>
+          <a:chOff x="0" y="0"/>
+          <a:chExt cx="0" cy="0"/>
+        </a:xfrm>
+      </p:grpSpPr>
+      <p:sp>
+        <p:nvSpPr>
+          <p:cNvPr id="25" name="Rectangle 24"/>
+          <p:cNvSpPr/>
+          <p:nvPr/>
+        </p:nvSpPr>
+        <p:spPr>
+          <a:xfrm rot="19691068">
+            <a:off x="1032534" y="1752691"/>
+            <a:ext cx="2428892" cy="1357322"/>
+          </a:xfrm>
+          <a:prstGeom prst="rect">
+            <a:avLst/>
+          </a:prstGeom>
+          <a:noFill/>
+          <a:ln>
+            <a:solidFill>
+              <a:schemeClr val="accent6">
+                <a:lumMod val="60000"/>
+                <a:lumOff val="40000"/>
+              </a:schemeClr>
+            </a:solidFill>
+            <a:prstDash val="sysDash"/>
+          </a:ln>
+        </p:spPr>
+        <p:style>
+          <a:lnRef idx="2">
+            <a:schemeClr val="accent1">
+              <a:shade val="50000"/>
+            </a:schemeClr>
+          </a:lnRef>
+          <a:fillRef idx="1">
+            <a:schemeClr val="accent1"/>
+          </a:fillRef>
+          <a:effectRef idx="0">
+            <a:schemeClr val="accent1"/>
+          </a:effectRef>
+          <a:fontRef idx="minor">
+            <a:schemeClr val="lt1"/>
+          </a:fontRef>
+        </p:style>
+        <p:txBody>
+          <a:bodyPr rtlCol="1" anchor="ctr"/>
+          <a:lstStyle/>
+          <a:p>
+            <a:pPr algn="ctr"/>
+            <a:endParaRPr lang="he-IL" b="1"/>
+          </a:p>
+        </p:txBody>
+      </p:sp>
+      <p:sp>
+        <p:nvSpPr>
+          <p:cNvPr id="4" name="Rectangle 3"/>
+          <p:cNvSpPr/>
+          <p:nvPr/>
+        </p:nvSpPr>
+        <p:spPr>
+          <a:xfrm>
+            <a:off x="4357686" y="2071678"/>
+            <a:ext cx="2428892" cy="1357322"/>
+          </a:xfrm>
+          <a:prstGeom prst="rect">
+            <a:avLst/>
+          </a:prstGeom>
+          <a:noFill/>
+        </p:spPr>
+        <p:style>
+          <a:lnRef idx="2">
+            <a:schemeClr val="accent1">
+              <a:shade val="50000"/>
+            </a:schemeClr>
+          </a:lnRef>
+          <a:fillRef idx="1">
+            <a:schemeClr val="accent1"/>
+          </a:fillRef>
+          <a:effectRef idx="0">
+            <a:schemeClr val="accent1"/>
+          </a:effectRef>
+          <a:fontRef idx="minor">
+            <a:schemeClr val="lt1"/>
+          </a:fontRef>
+        </p:style>
+        <p:txBody>
+          <a:bodyPr rtlCol="1" anchor="ctr"/>
+          <a:lstStyle/>
+          <a:p>
+            <a:pPr algn="ctr"/>
+            <a:endParaRPr lang="he-IL" b="1"/>
+          </a:p>
+        </p:txBody>
+      </p:sp>
+      <p:sp>
+        <p:nvSpPr>
+          <p:cNvPr id="5" name="Rectangle 4"/>
+          <p:cNvSpPr/>
+          <p:nvPr/>
+        </p:nvSpPr>
+        <p:spPr>
+          <a:xfrm>
+            <a:off x="1214414" y="2071678"/>
+            <a:ext cx="2428892" cy="1357322"/>
+          </a:xfrm>
+          <a:prstGeom prst="rect">
+            <a:avLst/>
+          </a:prstGeom>
+          <a:noFill/>
+        </p:spPr>
+        <p:style>
+          <a:lnRef idx="2">
+            <a:schemeClr val="accent1">
+              <a:shade val="50000"/>
+            </a:schemeClr>
+          </a:lnRef>
+          <a:fillRef idx="1">
+            <a:schemeClr val="accent1"/>
+          </a:fillRef>
+          <a:effectRef idx="0">
+            <a:schemeClr val="accent1"/>
+          </a:effectRef>
+          <a:fontRef idx="minor">
+            <a:schemeClr val="lt1"/>
+          </a:fontRef>
+        </p:style>
+        <p:txBody>
+          <a:bodyPr rtlCol="1" anchor="ctr"/>
+          <a:lstStyle/>
+          <a:p>
+            <a:pPr algn="ctr"/>
+            <a:endParaRPr lang="he-IL" b="1"/>
+          </a:p>
+        </p:txBody>
+      </p:sp>
+      <p:sp>
+        <p:nvSpPr>
+          <p:cNvPr id="6" name="TextBox 5"/>
+          <p:cNvSpPr txBox="1"/>
+          <p:nvPr/>
+        </p:nvSpPr>
+        <p:spPr>
+          <a:xfrm>
+            <a:off x="4429124" y="3429000"/>
+            <a:ext cx="2071702" cy="369332"/>
+          </a:xfrm>
+          <a:prstGeom prst="rect">
+            <a:avLst/>
+          </a:prstGeom>
+          <a:noFill/>
+        </p:spPr>
+        <p:txBody>
+          <a:bodyPr wrap="square" rtlCol="1">
+            <a:spAutoFit/>
+          </a:bodyPr>
+          <a:lstStyle/>
+          <a:p>
+            <a:r>
+              <a:rPr lang="en-US" b="1" dirty="0" smtClean="0"/>
+              <a:t>Output image</a:t>
+            </a:r>
+            <a:endParaRPr lang="he-IL" b="1" dirty="0"/>
+          </a:p>
+        </p:txBody>
+      </p:sp>
+      <p:sp>
+        <p:nvSpPr>
+          <p:cNvPr id="7" name="TextBox 6"/>
+          <p:cNvSpPr txBox="1"/>
+          <p:nvPr/>
+        </p:nvSpPr>
+        <p:spPr>
+          <a:xfrm>
+            <a:off x="1142976" y="3429000"/>
+            <a:ext cx="2071702" cy="369332"/>
+          </a:xfrm>
+          <a:prstGeom prst="rect">
+            <a:avLst/>
+          </a:prstGeom>
+          <a:noFill/>
+        </p:spPr>
+        <p:txBody>
+          <a:bodyPr wrap="square" rtlCol="1">
+            <a:spAutoFit/>
+          </a:bodyPr>
+          <a:lstStyle/>
+          <a:p>
+            <a:r>
+              <a:rPr lang="en-US" b="1" dirty="0" err="1" smtClean="0"/>
+              <a:t>Intput</a:t>
+            </a:r>
+            <a:r>
+              <a:rPr lang="en-US" b="1" dirty="0" smtClean="0"/>
+              <a:t> image</a:t>
+            </a:r>
+            <a:endParaRPr lang="he-IL" b="1" dirty="0"/>
+          </a:p>
+        </p:txBody>
+      </p:sp>
+      <p:sp>
+        <p:nvSpPr>
+          <p:cNvPr id="8" name="Oval 7"/>
+          <p:cNvSpPr/>
+          <p:nvPr/>
+        </p:nvSpPr>
+        <p:spPr>
+          <a:xfrm>
+            <a:off x="4500562" y="2214554"/>
+            <a:ext cx="142876" cy="142876"/>
+          </a:xfrm>
+          <a:prstGeom prst="ellipse">
+            <a:avLst/>
+          </a:prstGeom>
+        </p:spPr>
+        <p:style>
+          <a:lnRef idx="2">
+            <a:schemeClr val="accent1">
+              <a:shade val="50000"/>
+            </a:schemeClr>
+          </a:lnRef>
+          <a:fillRef idx="1">
+            <a:schemeClr val="accent1"/>
+          </a:fillRef>
+          <a:effectRef idx="0">
+            <a:schemeClr val="accent1"/>
+          </a:effectRef>
+          <a:fontRef idx="minor">
+            <a:schemeClr val="lt1"/>
+          </a:fontRef>
+        </p:style>
+        <p:txBody>
+          <a:bodyPr rtlCol="1" anchor="ctr"/>
+          <a:lstStyle/>
+          <a:p>
+            <a:pPr algn="ctr"/>
+            <a:endParaRPr lang="he-IL" b="1"/>
+          </a:p>
+        </p:txBody>
+      </p:sp>
+      <p:sp>
+        <p:nvSpPr>
+          <p:cNvPr id="9" name="Oval 8"/>
+          <p:cNvSpPr/>
+          <p:nvPr/>
+        </p:nvSpPr>
+        <p:spPr>
+          <a:xfrm>
+            <a:off x="4714876" y="2214554"/>
+            <a:ext cx="142876" cy="142876"/>
+          </a:xfrm>
+          <a:prstGeom prst="ellipse">
+            <a:avLst/>
+          </a:prstGeom>
+        </p:spPr>
+        <p:style>
+          <a:lnRef idx="2">
+            <a:schemeClr val="accent1">
+              <a:shade val="50000"/>
+            </a:schemeClr>
+          </a:lnRef>
+          <a:fillRef idx="1">
+            <a:schemeClr val="accent1"/>
+          </a:fillRef>
+          <a:effectRef idx="0">
+            <a:schemeClr val="accent1"/>
+          </a:effectRef>
+          <a:fontRef idx="minor">
+            <a:schemeClr val="lt1"/>
+          </a:fontRef>
+        </p:style>
+        <p:txBody>
+          <a:bodyPr rtlCol="1" anchor="ctr"/>
+          <a:lstStyle/>
+          <a:p>
+            <a:pPr algn="ctr"/>
+            <a:endParaRPr lang="he-IL" b="1"/>
+          </a:p>
+        </p:txBody>
+      </p:sp>
+      <p:sp>
+        <p:nvSpPr>
+          <p:cNvPr id="10" name="Oval 9"/>
+          <p:cNvSpPr/>
+          <p:nvPr/>
+        </p:nvSpPr>
+        <p:spPr>
+          <a:xfrm>
+            <a:off x="4929190" y="2214554"/>
+            <a:ext cx="142876" cy="142876"/>
+          </a:xfrm>
+          <a:prstGeom prst="ellipse">
+            <a:avLst/>
+          </a:prstGeom>
+        </p:spPr>
+        <p:style>
+          <a:lnRef idx="2">
+            <a:schemeClr val="accent1">
+              <a:shade val="50000"/>
+            </a:schemeClr>
+          </a:lnRef>
+          <a:fillRef idx="1">
+            <a:schemeClr val="accent1"/>
+          </a:fillRef>
+          <a:effectRef idx="0">
+            <a:schemeClr val="accent1"/>
+          </a:effectRef>
+          <a:fontRef idx="minor">
+            <a:schemeClr val="lt1"/>
+          </a:fontRef>
+        </p:style>
+        <p:txBody>
+          <a:bodyPr rtlCol="1" anchor="ctr"/>
+          <a:lstStyle/>
+          <a:p>
+            <a:pPr algn="ctr"/>
+            <a:endParaRPr lang="he-IL" b="1"/>
+          </a:p>
+        </p:txBody>
+      </p:sp>
+      <p:sp>
+        <p:nvSpPr>
+          <p:cNvPr id="11" name="Oval 10"/>
+          <p:cNvSpPr/>
+          <p:nvPr/>
+        </p:nvSpPr>
+        <p:spPr>
+          <a:xfrm>
+            <a:off x="5143504" y="2214554"/>
+            <a:ext cx="142876" cy="142876"/>
+          </a:xfrm>
+          <a:prstGeom prst="ellipse">
+            <a:avLst/>
+          </a:prstGeom>
+        </p:spPr>
+        <p:style>
+          <a:lnRef idx="2">
+            <a:schemeClr val="accent1">
+              <a:shade val="50000"/>
+            </a:schemeClr>
+          </a:lnRef>
+          <a:fillRef idx="1">
+            <a:schemeClr val="accent1"/>
+          </a:fillRef>
+          <a:effectRef idx="0">
+            <a:schemeClr val="accent1"/>
+          </a:effectRef>
+          <a:fontRef idx="minor">
+            <a:schemeClr val="lt1"/>
+          </a:fontRef>
+        </p:style>
+        <p:txBody>
+          <a:bodyPr rtlCol="1" anchor="ctr"/>
+          <a:lstStyle/>
+          <a:p>
+            <a:pPr algn="ctr"/>
+            <a:endParaRPr lang="he-IL" b="1"/>
+          </a:p>
+        </p:txBody>
+      </p:sp>
+      <p:sp>
+        <p:nvSpPr>
+          <p:cNvPr id="12" name="Oval 11"/>
+          <p:cNvSpPr/>
+          <p:nvPr/>
+        </p:nvSpPr>
+        <p:spPr>
+          <a:xfrm>
+            <a:off x="1000100" y="2571744"/>
+            <a:ext cx="142876" cy="142876"/>
+          </a:xfrm>
+          <a:prstGeom prst="ellipse">
+            <a:avLst/>
+          </a:prstGeom>
+        </p:spPr>
+        <p:style>
+          <a:lnRef idx="2">
+            <a:schemeClr val="accent1">
+              <a:shade val="50000"/>
+            </a:schemeClr>
+          </a:lnRef>
+          <a:fillRef idx="1">
+            <a:schemeClr val="accent1"/>
+          </a:fillRef>
+          <a:effectRef idx="0">
+            <a:schemeClr val="accent1"/>
+          </a:effectRef>
+          <a:fontRef idx="minor">
+            <a:schemeClr val="lt1"/>
+          </a:fontRef>
+        </p:style>
+        <p:txBody>
+          <a:bodyPr rtlCol="1" anchor="ctr"/>
+          <a:lstStyle/>
+          <a:p>
+            <a:pPr algn="ctr"/>
+            <a:endParaRPr lang="he-IL" b="1"/>
+          </a:p>
+        </p:txBody>
+      </p:sp>
+      <p:sp>
+        <p:nvSpPr>
+          <p:cNvPr id="13" name="Oval 12"/>
+          <p:cNvSpPr/>
+          <p:nvPr/>
+        </p:nvSpPr>
+        <p:spPr>
+          <a:xfrm>
+            <a:off x="1285852" y="2357430"/>
+            <a:ext cx="142876" cy="142876"/>
+          </a:xfrm>
+          <a:prstGeom prst="ellipse">
+            <a:avLst/>
+          </a:prstGeom>
+        </p:spPr>
+        <p:style>
+          <a:lnRef idx="2">
+            <a:schemeClr val="accent1">
+              <a:shade val="50000"/>
+            </a:schemeClr>
+          </a:lnRef>
+          <a:fillRef idx="1">
+            <a:schemeClr val="accent1"/>
+          </a:fillRef>
+          <a:effectRef idx="0">
+            <a:schemeClr val="accent1"/>
+          </a:effectRef>
+          <a:fontRef idx="minor">
+            <a:schemeClr val="lt1"/>
+          </a:fontRef>
+        </p:style>
+        <p:txBody>
+          <a:bodyPr rtlCol="1" anchor="ctr"/>
+          <a:lstStyle/>
+          <a:p>
+            <a:pPr algn="ctr"/>
+            <a:endParaRPr lang="he-IL" b="1"/>
+          </a:p>
+        </p:txBody>
+      </p:sp>
+      <p:sp>
+        <p:nvSpPr>
+          <p:cNvPr id="14" name="Oval 13"/>
+          <p:cNvSpPr/>
+          <p:nvPr/>
+        </p:nvSpPr>
+        <p:spPr>
+          <a:xfrm>
+            <a:off x="1571604" y="2143116"/>
+            <a:ext cx="142876" cy="142876"/>
+          </a:xfrm>
+          <a:prstGeom prst="ellipse">
+            <a:avLst/>
+          </a:prstGeom>
+        </p:spPr>
+        <p:style>
+          <a:lnRef idx="2">
+            <a:schemeClr val="accent1">
+              <a:shade val="50000"/>
+            </a:schemeClr>
+          </a:lnRef>
+          <a:fillRef idx="1">
+            <a:schemeClr val="accent1"/>
+          </a:fillRef>
+          <a:effectRef idx="0">
+            <a:schemeClr val="accent1"/>
+          </a:effectRef>
+          <a:fontRef idx="minor">
+            <a:schemeClr val="lt1"/>
+          </a:fontRef>
+        </p:style>
+        <p:txBody>
+          <a:bodyPr rtlCol="1" anchor="ctr"/>
+          <a:lstStyle/>
+          <a:p>
+            <a:pPr algn="ctr"/>
+            <a:endParaRPr lang="he-IL" b="1"/>
+          </a:p>
+        </p:txBody>
+      </p:sp>
+      <p:sp>
+        <p:nvSpPr>
+          <p:cNvPr id="15" name="Oval 14"/>
+          <p:cNvSpPr/>
+          <p:nvPr/>
+        </p:nvSpPr>
+        <p:spPr>
+          <a:xfrm>
+            <a:off x="1857356" y="1928802"/>
+            <a:ext cx="142876" cy="142876"/>
+          </a:xfrm>
+          <a:prstGeom prst="ellipse">
+            <a:avLst/>
+          </a:prstGeom>
+        </p:spPr>
+        <p:style>
+          <a:lnRef idx="2">
+            <a:schemeClr val="accent1">
+              <a:shade val="50000"/>
+            </a:schemeClr>
+          </a:lnRef>
+          <a:fillRef idx="1">
+            <a:schemeClr val="accent1"/>
+          </a:fillRef>
+          <a:effectRef idx="0">
+            <a:schemeClr val="accent1"/>
+          </a:effectRef>
+          <a:fontRef idx="minor">
+            <a:schemeClr val="lt1"/>
+          </a:fontRef>
+        </p:style>
+        <p:txBody>
+          <a:bodyPr rtlCol="1" anchor="ctr"/>
+          <a:lstStyle/>
+          <a:p>
+            <a:pPr algn="ctr"/>
+            <a:endParaRPr lang="he-IL" b="1"/>
+          </a:p>
+        </p:txBody>
+      </p:sp>
+      <p:cxnSp>
+        <p:nvCxnSpPr>
+          <p:cNvPr id="19" name="Shape 18"/>
+          <p:cNvCxnSpPr>
+            <a:stCxn id="8" idx="0"/>
+            <a:endCxn id="12" idx="0"/>
+          </p:cNvCxnSpPr>
+          <p:nvPr/>
+        </p:nvCxnSpPr>
+        <p:spPr>
+          <a:xfrm rot="16200000" flipH="1" flipV="1">
+            <a:off x="2643174" y="642918"/>
+            <a:ext cx="357190" cy="3500462"/>
+          </a:xfrm>
+          <a:prstGeom prst="curvedConnector3">
+            <a:avLst>
+              <a:gd name="adj1" fmla="val -323819"/>
+            </a:avLst>
+          </a:prstGeom>
+          <a:ln w="57150" cmpd="sng">
+            <a:solidFill>
+              <a:srgbClr val="C00000"/>
+            </a:solidFill>
+            <a:tailEnd type="arrow"/>
+          </a:ln>
+        </p:spPr>
+        <p:style>
+          <a:lnRef idx="1">
+            <a:schemeClr val="accent1"/>
+          </a:lnRef>
+          <a:fillRef idx="0">
+            <a:schemeClr val="accent1"/>
+          </a:fillRef>
+          <a:effectRef idx="0">
+            <a:schemeClr val="accent1"/>
+          </a:effectRef>
+          <a:fontRef idx="minor">
+            <a:schemeClr val="tx1"/>
+          </a:fontRef>
+        </p:style>
+      </p:cxnSp>
+    </p:spTree>
+  </p:cSld>
+  <p:clrMapOvr>
+    <a:masterClrMapping/>
+  </p:clrMapOvr>
+</p:sld>
+</file>
+
 <file path=ppt/slides/slide4.xml><?xml version="1.0" encoding="utf-8"?>
 <p:sld xmlns:a="http://schemas.openxmlformats.org/drawingml/2006/main" xmlns:r="http://schemas.openxmlformats.org/officeDocument/2006/relationships" xmlns:p="http://schemas.openxmlformats.org/presentationml/2006/main">
   <p:cSld>
@@ -18461,7 +18933,7 @@
       </p:grpSpPr>
       <p:sp>
         <p:nvSpPr>
-          <p:cNvPr id="25" name="Rectangle 24"/>
+          <p:cNvPr id="4" name="Rectangle 3"/>
           <p:cNvSpPr/>
           <p:nvPr/>
         </p:nvSpPr>
@@ -18511,7 +18983,7 @@
       </p:sp>
       <p:sp>
         <p:nvSpPr>
-          <p:cNvPr id="4" name="Rectangle 3"/>
+          <p:cNvPr id="5" name="Rectangle 4"/>
           <p:cNvSpPr/>
           <p:nvPr/>
         </p:nvSpPr>
@@ -18552,7 +19024,7 @@
       </p:sp>
       <p:sp>
         <p:nvSpPr>
-          <p:cNvPr id="5" name="Rectangle 4"/>
+          <p:cNvPr id="6" name="Rectangle 5"/>
           <p:cNvSpPr/>
           <p:nvPr/>
         </p:nvSpPr>
@@ -18593,7 +19065,7 @@
       </p:sp>
       <p:sp>
         <p:nvSpPr>
-          <p:cNvPr id="6" name="TextBox 5"/>
+          <p:cNvPr id="7" name="TextBox 6"/>
           <p:cNvSpPr txBox="1"/>
           <p:nvPr/>
         </p:nvSpPr>
@@ -18623,7 +19095,7 @@
       </p:sp>
       <p:sp>
         <p:nvSpPr>
-          <p:cNvPr id="7" name="TextBox 6"/>
+          <p:cNvPr id="8" name="TextBox 7"/>
           <p:cNvSpPr txBox="1"/>
           <p:nvPr/>
         </p:nvSpPr>
@@ -18657,7 +19129,7 @@
       </p:sp>
       <p:sp>
         <p:nvSpPr>
-          <p:cNvPr id="8" name="Oval 7"/>
+          <p:cNvPr id="9" name="Oval 8"/>
           <p:cNvSpPr/>
           <p:nvPr/>
         </p:nvSpPr>
@@ -18697,13 +19169,13 @@
       </p:sp>
       <p:sp>
         <p:nvSpPr>
-          <p:cNvPr id="9" name="Oval 8"/>
+          <p:cNvPr id="13" name="Oval 12"/>
           <p:cNvSpPr/>
           <p:nvPr/>
         </p:nvSpPr>
         <p:spPr>
           <a:xfrm>
-            <a:off x="4714876" y="2214554"/>
+            <a:off x="1000100" y="2571744"/>
             <a:ext cx="142876" cy="142876"/>
           </a:xfrm>
           <a:prstGeom prst="ellipse">
@@ -18737,13 +19209,13 @@
       </p:sp>
       <p:sp>
         <p:nvSpPr>
-          <p:cNvPr id="10" name="Oval 9"/>
+          <p:cNvPr id="14" name="Oval 13"/>
           <p:cNvSpPr/>
           <p:nvPr/>
         </p:nvSpPr>
         <p:spPr>
           <a:xfrm>
-            <a:off x="4929190" y="2214554"/>
+            <a:off x="1166766" y="2428868"/>
             <a:ext cx="142876" cy="142876"/>
           </a:xfrm>
           <a:prstGeom prst="ellipse">
@@ -18777,13 +19249,13 @@
       </p:sp>
       <p:sp>
         <p:nvSpPr>
-          <p:cNvPr id="11" name="Oval 10"/>
+          <p:cNvPr id="15" name="Oval 14"/>
           <p:cNvSpPr/>
           <p:nvPr/>
         </p:nvSpPr>
         <p:spPr>
           <a:xfrm>
-            <a:off x="5143504" y="2214554"/>
+            <a:off x="1146105" y="2750339"/>
             <a:ext cx="142876" cy="142876"/>
           </a:xfrm>
           <a:prstGeom prst="ellipse">
@@ -18817,13 +19289,13 @@
       </p:sp>
       <p:sp>
         <p:nvSpPr>
-          <p:cNvPr id="12" name="Oval 11"/>
+          <p:cNvPr id="16" name="Oval 15"/>
           <p:cNvSpPr/>
           <p:nvPr/>
         </p:nvSpPr>
         <p:spPr>
           <a:xfrm>
-            <a:off x="1000100" y="2571744"/>
+            <a:off x="1309642" y="2612220"/>
             <a:ext cx="142876" cy="142876"/>
           </a:xfrm>
           <a:prstGeom prst="ellipse">
@@ -18855,132 +19327,12 @@
           </a:p>
         </p:txBody>
       </p:sp>
-      <p:sp>
-        <p:nvSpPr>
-          <p:cNvPr id="13" name="Oval 12"/>
-          <p:cNvSpPr/>
-          <p:nvPr/>
-        </p:nvSpPr>
-        <p:spPr>
-          <a:xfrm>
-            <a:off x="1285852" y="2357430"/>
-            <a:ext cx="142876" cy="142876"/>
-          </a:xfrm>
-          <a:prstGeom prst="ellipse">
-            <a:avLst/>
-          </a:prstGeom>
-        </p:spPr>
-        <p:style>
-          <a:lnRef idx="2">
-            <a:schemeClr val="accent1">
-              <a:shade val="50000"/>
-            </a:schemeClr>
-          </a:lnRef>
-          <a:fillRef idx="1">
-            <a:schemeClr val="accent1"/>
-          </a:fillRef>
-          <a:effectRef idx="0">
-            <a:schemeClr val="accent1"/>
-          </a:effectRef>
-          <a:fontRef idx="minor">
-            <a:schemeClr val="lt1"/>
-          </a:fontRef>
-        </p:style>
-        <p:txBody>
-          <a:bodyPr rtlCol="1" anchor="ctr"/>
-          <a:lstStyle/>
-          <a:p>
-            <a:pPr algn="ctr"/>
-            <a:endParaRPr lang="he-IL" b="1"/>
-          </a:p>
-        </p:txBody>
-      </p:sp>
-      <p:sp>
-        <p:nvSpPr>
-          <p:cNvPr id="14" name="Oval 13"/>
-          <p:cNvSpPr/>
-          <p:nvPr/>
-        </p:nvSpPr>
-        <p:spPr>
-          <a:xfrm>
-            <a:off x="1571604" y="2143116"/>
-            <a:ext cx="142876" cy="142876"/>
-          </a:xfrm>
-          <a:prstGeom prst="ellipse">
-            <a:avLst/>
-          </a:prstGeom>
-        </p:spPr>
-        <p:style>
-          <a:lnRef idx="2">
-            <a:schemeClr val="accent1">
-              <a:shade val="50000"/>
-            </a:schemeClr>
-          </a:lnRef>
-          <a:fillRef idx="1">
-            <a:schemeClr val="accent1"/>
-          </a:fillRef>
-          <a:effectRef idx="0">
-            <a:schemeClr val="accent1"/>
-          </a:effectRef>
-          <a:fontRef idx="minor">
-            <a:schemeClr val="lt1"/>
-          </a:fontRef>
-        </p:style>
-        <p:txBody>
-          <a:bodyPr rtlCol="1" anchor="ctr"/>
-          <a:lstStyle/>
-          <a:p>
-            <a:pPr algn="ctr"/>
-            <a:endParaRPr lang="he-IL" b="1"/>
-          </a:p>
-        </p:txBody>
-      </p:sp>
-      <p:sp>
-        <p:nvSpPr>
-          <p:cNvPr id="15" name="Oval 14"/>
-          <p:cNvSpPr/>
-          <p:nvPr/>
-        </p:nvSpPr>
-        <p:spPr>
-          <a:xfrm>
-            <a:off x="1857356" y="1928802"/>
-            <a:ext cx="142876" cy="142876"/>
-          </a:xfrm>
-          <a:prstGeom prst="ellipse">
-            <a:avLst/>
-          </a:prstGeom>
-        </p:spPr>
-        <p:style>
-          <a:lnRef idx="2">
-            <a:schemeClr val="accent1">
-              <a:shade val="50000"/>
-            </a:schemeClr>
-          </a:lnRef>
-          <a:fillRef idx="1">
-            <a:schemeClr val="accent1"/>
-          </a:fillRef>
-          <a:effectRef idx="0">
-            <a:schemeClr val="accent1"/>
-          </a:effectRef>
-          <a:fontRef idx="minor">
-            <a:schemeClr val="lt1"/>
-          </a:fontRef>
-        </p:style>
-        <p:txBody>
-          <a:bodyPr rtlCol="1" anchor="ctr"/>
-          <a:lstStyle/>
-          <a:p>
-            <a:pPr algn="ctr"/>
-            <a:endParaRPr lang="he-IL" b="1"/>
-          </a:p>
-        </p:txBody>
-      </p:sp>
       <p:cxnSp>
         <p:nvCxnSpPr>
-          <p:cNvPr id="19" name="Shape 18"/>
+          <p:cNvPr id="17" name="Shape 18"/>
           <p:cNvCxnSpPr>
-            <a:stCxn id="8" idx="0"/>
-            <a:endCxn id="12" idx="0"/>
+            <a:stCxn id="9" idx="0"/>
+            <a:endCxn id="13" idx="0"/>
           </p:cNvCxnSpPr>
           <p:nvPr/>
         </p:nvCxnSpPr>
@@ -19017,6 +19369,11 @@
         </p:style>
       </p:cxnSp>
     </p:spTree>
+    <p:extLst>
+      <p:ext uri="{BB962C8B-B14F-4D97-AF65-F5344CB8AC3E}">
+        <p14:creationId xmlns:p14="http://schemas.microsoft.com/office/powerpoint/2010/main" val="3519057672"/>
+      </p:ext>
+    </p:extLst>
   </p:cSld>
   <p:clrMapOvr>
     <a:masterClrMapping/>
@@ -19048,38 +19405,68 @@
           <p:nvPr/>
         </p:nvSpPr>
         <p:spPr>
-          <a:xfrm rot="19691068">
-            <a:off x="1032534" y="1752691"/>
-            <a:ext cx="2428892" cy="1357322"/>
+          <a:xfrm>
+            <a:off x="3059832" y="980728"/>
+            <a:ext cx="3096344" cy="1944216"/>
           </a:xfrm>
           <a:prstGeom prst="rect">
             <a:avLst/>
           </a:prstGeom>
-          <a:noFill/>
-          <a:ln>
-            <a:solidFill>
-              <a:schemeClr val="accent6">
-                <a:lumMod val="60000"/>
-                <a:lumOff val="40000"/>
-              </a:schemeClr>
-            </a:solidFill>
-            <a:prstDash val="sysDash"/>
-          </a:ln>
         </p:spPr>
         <p:style>
           <a:lnRef idx="2">
-            <a:schemeClr val="accent1">
-              <a:shade val="50000"/>
-            </a:schemeClr>
+            <a:schemeClr val="accent1"/>
           </a:lnRef>
           <a:fillRef idx="1">
-            <a:schemeClr val="accent1"/>
+            <a:schemeClr val="lt1"/>
           </a:fillRef>
           <a:effectRef idx="0">
             <a:schemeClr val="accent1"/>
           </a:effectRef>
           <a:fontRef idx="minor">
+            <a:schemeClr val="dk1"/>
+          </a:fontRef>
+        </p:style>
+        <p:txBody>
+          <a:bodyPr rtlCol="1" anchor="ctr"/>
+          <a:lstStyle/>
+          <a:p>
+            <a:pPr algn="ctr"/>
+            <a:r>
+              <a:rPr lang="en-US" dirty="0" smtClean="0"/>
+              <a:t>Address Calculator</a:t>
+            </a:r>
+            <a:endParaRPr lang="he-IL" dirty="0"/>
+          </a:p>
+        </p:txBody>
+      </p:sp>
+      <p:sp>
+        <p:nvSpPr>
+          <p:cNvPr id="7" name="Right Arrow 6"/>
+          <p:cNvSpPr/>
+          <p:nvPr/>
+        </p:nvSpPr>
+        <p:spPr>
+          <a:xfrm>
+            <a:off x="1187624" y="1484784"/>
+            <a:ext cx="1872208" cy="468052"/>
+          </a:xfrm>
+          <a:prstGeom prst="rightArrow">
+            <a:avLst/>
+          </a:prstGeom>
+        </p:spPr>
+        <p:style>
+          <a:lnRef idx="2">
+            <a:schemeClr val="dk1"/>
+          </a:lnRef>
+          <a:fillRef idx="1">
             <a:schemeClr val="lt1"/>
+          </a:fillRef>
+          <a:effectRef idx="0">
+            <a:schemeClr val="dk1"/>
+          </a:effectRef>
+          <a:fontRef idx="minor">
+            <a:schemeClr val="dk1"/>
           </a:fontRef>
         </p:style>
         <p:txBody>
@@ -19087,40 +19474,41 @@
           <a:lstStyle/>
           <a:p>
             <a:pPr algn="ctr"/>
-            <a:endParaRPr lang="he-IL" b="1"/>
-          </a:p>
-        </p:txBody>
-      </p:sp>
-      <p:sp>
-        <p:nvSpPr>
-          <p:cNvPr id="5" name="Rectangle 4"/>
+            <a:r>
+              <a:rPr lang="en-US" dirty="0" smtClean="0"/>
+              <a:t>input</a:t>
+            </a:r>
+            <a:endParaRPr lang="he-IL" dirty="0"/>
+          </a:p>
+        </p:txBody>
+      </p:sp>
+      <p:sp>
+        <p:nvSpPr>
+          <p:cNvPr id="8" name="Right Arrow 7"/>
           <p:cNvSpPr/>
           <p:nvPr/>
         </p:nvSpPr>
         <p:spPr>
           <a:xfrm>
-            <a:off x="4357686" y="2071678"/>
-            <a:ext cx="2428892" cy="1357322"/>
-          </a:xfrm>
-          <a:prstGeom prst="rect">
-            <a:avLst/>
-          </a:prstGeom>
-          <a:noFill/>
+            <a:off x="6156176" y="1521768"/>
+            <a:ext cx="1872208" cy="468052"/>
+          </a:xfrm>
+          <a:prstGeom prst="rightArrow">
+            <a:avLst/>
+          </a:prstGeom>
         </p:spPr>
         <p:style>
           <a:lnRef idx="2">
-            <a:schemeClr val="accent1">
-              <a:shade val="50000"/>
-            </a:schemeClr>
+            <a:schemeClr val="dk1"/>
           </a:lnRef>
           <a:fillRef idx="1">
-            <a:schemeClr val="accent1"/>
+            <a:schemeClr val="lt1"/>
           </a:fillRef>
           <a:effectRef idx="0">
-            <a:schemeClr val="accent1"/>
-          </a:effectRef>
-          <a:fontRef idx="minor">
-            <a:schemeClr val="lt1"/>
+            <a:schemeClr val="dk1"/>
+          </a:effectRef>
+          <a:fontRef idx="minor">
+            <a:schemeClr val="dk1"/>
           </a:fontRef>
         </p:style>
         <p:txBody>
@@ -19128,61 +19516,24 @@
           <a:lstStyle/>
           <a:p>
             <a:pPr algn="ctr"/>
-            <a:endParaRPr lang="he-IL" b="1"/>
-          </a:p>
-        </p:txBody>
-      </p:sp>
-      <p:sp>
-        <p:nvSpPr>
-          <p:cNvPr id="6" name="Rectangle 5"/>
-          <p:cNvSpPr/>
-          <p:nvPr/>
-        </p:nvSpPr>
-        <p:spPr>
-          <a:xfrm>
-            <a:off x="1214414" y="2071678"/>
-            <a:ext cx="2428892" cy="1357322"/>
-          </a:xfrm>
-          <a:prstGeom prst="rect">
-            <a:avLst/>
-          </a:prstGeom>
-          <a:noFill/>
-        </p:spPr>
-        <p:style>
-          <a:lnRef idx="2">
-            <a:schemeClr val="accent1">
-              <a:shade val="50000"/>
-            </a:schemeClr>
-          </a:lnRef>
-          <a:fillRef idx="1">
-            <a:schemeClr val="accent1"/>
-          </a:fillRef>
-          <a:effectRef idx="0">
-            <a:schemeClr val="accent1"/>
-          </a:effectRef>
-          <a:fontRef idx="minor">
-            <a:schemeClr val="lt1"/>
-          </a:fontRef>
-        </p:style>
-        <p:txBody>
-          <a:bodyPr rtlCol="1" anchor="ctr"/>
-          <a:lstStyle/>
-          <a:p>
-            <a:pPr algn="ctr"/>
-            <a:endParaRPr lang="he-IL" b="1"/>
-          </a:p>
-        </p:txBody>
-      </p:sp>
-      <p:sp>
-        <p:nvSpPr>
-          <p:cNvPr id="7" name="TextBox 6"/>
+            <a:r>
+              <a:rPr lang="en-US" dirty="0" smtClean="0"/>
+              <a:t>output</a:t>
+            </a:r>
+            <a:endParaRPr lang="he-IL" dirty="0"/>
+          </a:p>
+        </p:txBody>
+      </p:sp>
+      <p:sp>
+        <p:nvSpPr>
+          <p:cNvPr id="9" name="TextBox 8"/>
           <p:cNvSpPr txBox="1"/>
           <p:nvPr/>
         </p:nvSpPr>
         <p:spPr>
           <a:xfrm>
-            <a:off x="4429124" y="3429000"/>
-            <a:ext cx="2071702" cy="369332"/>
+            <a:off x="971600" y="1952836"/>
+            <a:ext cx="1728192" cy="646331"/>
           </a:xfrm>
           <a:prstGeom prst="rect">
             <a:avLst/>
@@ -19196,23 +19547,31 @@
           <a:lstStyle/>
           <a:p>
             <a:r>
-              <a:rPr lang="en-US" b="1" dirty="0" smtClean="0"/>
-              <a:t>Output image</a:t>
-            </a:r>
-            <a:endParaRPr lang="he-IL" b="1" dirty="0"/>
-          </a:p>
-        </p:txBody>
-      </p:sp>
-      <p:sp>
-        <p:nvSpPr>
-          <p:cNvPr id="8" name="TextBox 7"/>
+              <a:rPr lang="en-US" dirty="0" smtClean="0"/>
+              <a:t>Coordinate(</a:t>
+            </a:r>
+            <a:r>
+              <a:rPr lang="en-US" dirty="0" err="1" smtClean="0"/>
+              <a:t>x,y</a:t>
+            </a:r>
+            <a:r>
+              <a:rPr lang="en-US" dirty="0" smtClean="0"/>
+              <a:t>) in output image</a:t>
+            </a:r>
+            <a:endParaRPr lang="he-IL" dirty="0"/>
+          </a:p>
+        </p:txBody>
+      </p:sp>
+      <p:sp>
+        <p:nvSpPr>
+          <p:cNvPr id="10" name="TextBox 9"/>
           <p:cNvSpPr txBox="1"/>
           <p:nvPr/>
         </p:nvSpPr>
         <p:spPr>
           <a:xfrm>
-            <a:off x="1142976" y="3429000"/>
-            <a:ext cx="2071702" cy="369332"/>
+            <a:off x="6228184" y="1952836"/>
+            <a:ext cx="2088232" cy="646331"/>
           </a:xfrm>
           <a:prstGeom prst="rect">
             <a:avLst/>
@@ -19225,263 +19584,27 @@
           </a:bodyPr>
           <a:lstStyle/>
           <a:p>
-            <a:r>
-              <a:rPr lang="en-US" b="1" dirty="0" err="1" smtClean="0"/>
-              <a:t>Intput</a:t>
-            </a:r>
-            <a:r>
-              <a:rPr lang="en-US" b="1" dirty="0" smtClean="0"/>
-              <a:t> image</a:t>
-            </a:r>
-            <a:endParaRPr lang="he-IL" b="1" dirty="0"/>
-          </a:p>
-        </p:txBody>
-      </p:sp>
-      <p:sp>
-        <p:nvSpPr>
-          <p:cNvPr id="9" name="Oval 8"/>
-          <p:cNvSpPr/>
-          <p:nvPr/>
-        </p:nvSpPr>
-        <p:spPr>
-          <a:xfrm>
-            <a:off x="4500562" y="2214554"/>
-            <a:ext cx="142876" cy="142876"/>
-          </a:xfrm>
-          <a:prstGeom prst="ellipse">
-            <a:avLst/>
-          </a:prstGeom>
-        </p:spPr>
-        <p:style>
-          <a:lnRef idx="2">
-            <a:schemeClr val="accent1">
-              <a:shade val="50000"/>
-            </a:schemeClr>
-          </a:lnRef>
-          <a:fillRef idx="1">
-            <a:schemeClr val="accent1"/>
-          </a:fillRef>
-          <a:effectRef idx="0">
-            <a:schemeClr val="accent1"/>
-          </a:effectRef>
-          <a:fontRef idx="minor">
-            <a:schemeClr val="lt1"/>
-          </a:fontRef>
-        </p:style>
-        <p:txBody>
-          <a:bodyPr rtlCol="1" anchor="ctr"/>
-          <a:lstStyle/>
-          <a:p>
-            <a:pPr algn="ctr"/>
-            <a:endParaRPr lang="he-IL" b="1"/>
-          </a:p>
-        </p:txBody>
-      </p:sp>
-      <p:sp>
-        <p:nvSpPr>
-          <p:cNvPr id="13" name="Oval 12"/>
-          <p:cNvSpPr/>
-          <p:nvPr/>
-        </p:nvSpPr>
-        <p:spPr>
-          <a:xfrm>
-            <a:off x="1000100" y="2571744"/>
-            <a:ext cx="142876" cy="142876"/>
-          </a:xfrm>
-          <a:prstGeom prst="ellipse">
-            <a:avLst/>
-          </a:prstGeom>
-        </p:spPr>
-        <p:style>
-          <a:lnRef idx="2">
-            <a:schemeClr val="accent1">
-              <a:shade val="50000"/>
-            </a:schemeClr>
-          </a:lnRef>
-          <a:fillRef idx="1">
-            <a:schemeClr val="accent1"/>
-          </a:fillRef>
-          <a:effectRef idx="0">
-            <a:schemeClr val="accent1"/>
-          </a:effectRef>
-          <a:fontRef idx="minor">
-            <a:schemeClr val="lt1"/>
-          </a:fontRef>
-        </p:style>
-        <p:txBody>
-          <a:bodyPr rtlCol="1" anchor="ctr"/>
-          <a:lstStyle/>
-          <a:p>
-            <a:pPr algn="ctr"/>
-            <a:endParaRPr lang="he-IL" b="1"/>
-          </a:p>
-        </p:txBody>
-      </p:sp>
-      <p:sp>
-        <p:nvSpPr>
-          <p:cNvPr id="14" name="Oval 13"/>
-          <p:cNvSpPr/>
-          <p:nvPr/>
-        </p:nvSpPr>
-        <p:spPr>
-          <a:xfrm>
-            <a:off x="1166766" y="2428868"/>
-            <a:ext cx="142876" cy="142876"/>
-          </a:xfrm>
-          <a:prstGeom prst="ellipse">
-            <a:avLst/>
-          </a:prstGeom>
-        </p:spPr>
-        <p:style>
-          <a:lnRef idx="2">
-            <a:schemeClr val="accent1">
-              <a:shade val="50000"/>
-            </a:schemeClr>
-          </a:lnRef>
-          <a:fillRef idx="1">
-            <a:schemeClr val="accent1"/>
-          </a:fillRef>
-          <a:effectRef idx="0">
-            <a:schemeClr val="accent1"/>
-          </a:effectRef>
-          <a:fontRef idx="minor">
-            <a:schemeClr val="lt1"/>
-          </a:fontRef>
-        </p:style>
-        <p:txBody>
-          <a:bodyPr rtlCol="1" anchor="ctr"/>
-          <a:lstStyle/>
-          <a:p>
-            <a:pPr algn="ctr"/>
-            <a:endParaRPr lang="he-IL" b="1"/>
-          </a:p>
-        </p:txBody>
-      </p:sp>
-      <p:sp>
-        <p:nvSpPr>
-          <p:cNvPr id="15" name="Oval 14"/>
-          <p:cNvSpPr/>
-          <p:nvPr/>
-        </p:nvSpPr>
-        <p:spPr>
-          <a:xfrm>
-            <a:off x="1146105" y="2750339"/>
-            <a:ext cx="142876" cy="142876"/>
-          </a:xfrm>
-          <a:prstGeom prst="ellipse">
-            <a:avLst/>
-          </a:prstGeom>
-        </p:spPr>
-        <p:style>
-          <a:lnRef idx="2">
-            <a:schemeClr val="accent1">
-              <a:shade val="50000"/>
-            </a:schemeClr>
-          </a:lnRef>
-          <a:fillRef idx="1">
-            <a:schemeClr val="accent1"/>
-          </a:fillRef>
-          <a:effectRef idx="0">
-            <a:schemeClr val="accent1"/>
-          </a:effectRef>
-          <a:fontRef idx="minor">
-            <a:schemeClr val="lt1"/>
-          </a:fontRef>
-        </p:style>
-        <p:txBody>
-          <a:bodyPr rtlCol="1" anchor="ctr"/>
-          <a:lstStyle/>
-          <a:p>
-            <a:pPr algn="ctr"/>
-            <a:endParaRPr lang="he-IL" b="1"/>
-          </a:p>
-        </p:txBody>
-      </p:sp>
-      <p:sp>
-        <p:nvSpPr>
-          <p:cNvPr id="16" name="Oval 15"/>
-          <p:cNvSpPr/>
-          <p:nvPr/>
-        </p:nvSpPr>
-        <p:spPr>
-          <a:xfrm>
-            <a:off x="1309642" y="2612220"/>
-            <a:ext cx="142876" cy="142876"/>
-          </a:xfrm>
-          <a:prstGeom prst="ellipse">
-            <a:avLst/>
-          </a:prstGeom>
-        </p:spPr>
-        <p:style>
-          <a:lnRef idx="2">
-            <a:schemeClr val="accent1">
-              <a:shade val="50000"/>
-            </a:schemeClr>
-          </a:lnRef>
-          <a:fillRef idx="1">
-            <a:schemeClr val="accent1"/>
-          </a:fillRef>
-          <a:effectRef idx="0">
-            <a:schemeClr val="accent1"/>
-          </a:effectRef>
-          <a:fontRef idx="minor">
-            <a:schemeClr val="lt1"/>
-          </a:fontRef>
-        </p:style>
-        <p:txBody>
-          <a:bodyPr rtlCol="1" anchor="ctr"/>
-          <a:lstStyle/>
-          <a:p>
-            <a:pPr algn="ctr"/>
-            <a:endParaRPr lang="he-IL" b="1"/>
-          </a:p>
-        </p:txBody>
-      </p:sp>
-      <p:cxnSp>
-        <p:nvCxnSpPr>
-          <p:cNvPr id="17" name="Shape 18"/>
-          <p:cNvCxnSpPr>
-            <a:stCxn id="9" idx="0"/>
-            <a:endCxn id="13" idx="0"/>
-          </p:cNvCxnSpPr>
-          <p:nvPr/>
-        </p:nvCxnSpPr>
-        <p:spPr>
-          <a:xfrm rot="16200000" flipH="1" flipV="1">
-            <a:off x="2643174" y="642918"/>
-            <a:ext cx="357190" cy="3500462"/>
-          </a:xfrm>
-          <a:prstGeom prst="curvedConnector3">
-            <a:avLst>
-              <a:gd name="adj1" fmla="val -323819"/>
-            </a:avLst>
-          </a:prstGeom>
-          <a:ln w="57150" cmpd="sng">
-            <a:solidFill>
-              <a:srgbClr val="C00000"/>
-            </a:solidFill>
-            <a:tailEnd type="arrow"/>
-          </a:ln>
-        </p:spPr>
-        <p:style>
-          <a:lnRef idx="1">
-            <a:schemeClr val="accent1"/>
-          </a:lnRef>
-          <a:fillRef idx="0">
-            <a:schemeClr val="accent1"/>
-          </a:fillRef>
-          <a:effectRef idx="0">
-            <a:schemeClr val="accent1"/>
-          </a:effectRef>
-          <a:fontRef idx="minor">
-            <a:schemeClr val="tx1"/>
-          </a:fontRef>
-        </p:style>
-      </p:cxnSp>
+            <a:pPr algn="l"/>
+            <a:r>
+              <a:rPr lang="en-US" dirty="0" smtClean="0"/>
+              <a:t>4 addresses (</a:t>
+            </a:r>
+            <a:r>
+              <a:rPr lang="en-US" dirty="0" err="1" smtClean="0"/>
+              <a:t>SDram</a:t>
+            </a:r>
+            <a:r>
+              <a:rPr lang="en-US" dirty="0" smtClean="0"/>
+              <a:t>) of input image</a:t>
+            </a:r>
+            <a:endParaRPr lang="he-IL" dirty="0"/>
+          </a:p>
+        </p:txBody>
+      </p:sp>
     </p:spTree>
     <p:extLst>
       <p:ext uri="{BB962C8B-B14F-4D97-AF65-F5344CB8AC3E}">
-        <p14:creationId xmlns:p14="http://schemas.microsoft.com/office/powerpoint/2010/main" val="3519057672"/>
+        <p14:creationId xmlns:p14="http://schemas.microsoft.com/office/powerpoint/2010/main" val="3840405132"/>
       </p:ext>
     </p:extLst>
   </p:cSld>
@@ -19508,33 +19631,62 @@
           <a:chExt cx="0" cy="0"/>
         </a:xfrm>
       </p:grpSpPr>
-      <p:sp>
-        <p:nvSpPr>
-          <p:cNvPr id="4" name="Rectangle 3"/>
+      <p:pic>
+        <p:nvPicPr>
+          <p:cNvPr id="6" name="Picture 5" descr="Lena.jpg"/>
+          <p:cNvPicPr>
+            <a:picLocks noChangeAspect="1"/>
+          </p:cNvPicPr>
+          <p:nvPr/>
+        </p:nvPicPr>
+        <p:blipFill>
+          <a:blip r:embed="rId3"/>
+          <a:stretch>
+            <a:fillRect/>
+          </a:stretch>
+        </p:blipFill>
+        <p:spPr>
+          <a:xfrm>
+            <a:off x="642910" y="2071678"/>
+            <a:ext cx="2322506" cy="2322506"/>
+          </a:xfrm>
+          <a:prstGeom prst="rect">
+            <a:avLst/>
+          </a:prstGeom>
+        </p:spPr>
+      </p:pic>
+      <p:sp>
+        <p:nvSpPr>
+          <p:cNvPr id="7" name="Oval 6"/>
           <p:cNvSpPr/>
           <p:nvPr/>
         </p:nvSpPr>
         <p:spPr>
           <a:xfrm>
-            <a:off x="3059832" y="980728"/>
-            <a:ext cx="3096344" cy="1944216"/>
-          </a:xfrm>
-          <a:prstGeom prst="rect">
-            <a:avLst/>
-          </a:prstGeom>
+            <a:off x="1428728" y="2428868"/>
+            <a:ext cx="142876" cy="142876"/>
+          </a:xfrm>
+          <a:prstGeom prst="ellipse">
+            <a:avLst/>
+          </a:prstGeom>
+          <a:solidFill>
+            <a:srgbClr val="FF0000"/>
+          </a:solidFill>
         </p:spPr>
         <p:style>
           <a:lnRef idx="2">
+            <a:schemeClr val="accent1">
+              <a:shade val="50000"/>
+            </a:schemeClr>
+          </a:lnRef>
+          <a:fillRef idx="1">
             <a:schemeClr val="accent1"/>
-          </a:lnRef>
-          <a:fillRef idx="1">
-            <a:schemeClr val="lt1"/>
           </a:fillRef>
           <a:effectRef idx="0">
             <a:schemeClr val="accent1"/>
           </a:effectRef>
           <a:fontRef idx="minor">
-            <a:schemeClr val="dk1"/>
+            <a:schemeClr val="lt1"/>
           </a:fontRef>
         </p:style>
         <p:txBody>
@@ -19542,108 +19694,60 @@
           <a:lstStyle/>
           <a:p>
             <a:pPr algn="ctr"/>
-            <a:r>
-              <a:rPr lang="en-US" dirty="0" smtClean="0"/>
-              <a:t>Address Calculator</a:t>
-            </a:r>
-            <a:endParaRPr lang="he-IL" dirty="0"/>
-          </a:p>
-        </p:txBody>
-      </p:sp>
-      <p:sp>
-        <p:nvSpPr>
-          <p:cNvPr id="7" name="Right Arrow 6"/>
-          <p:cNvSpPr/>
-          <p:nvPr/>
-        </p:nvSpPr>
-        <p:spPr>
-          <a:xfrm>
-            <a:off x="1187624" y="1484784"/>
-            <a:ext cx="1872208" cy="468052"/>
-          </a:xfrm>
-          <a:prstGeom prst="rightArrow">
-            <a:avLst/>
-          </a:prstGeom>
-        </p:spPr>
-        <p:style>
-          <a:lnRef idx="2">
-            <a:schemeClr val="dk1"/>
-          </a:lnRef>
-          <a:fillRef idx="1">
-            <a:schemeClr val="lt1"/>
+            <a:endParaRPr lang="he-IL"/>
+          </a:p>
+        </p:txBody>
+      </p:sp>
+      <p:cxnSp>
+        <p:nvCxnSpPr>
+          <p:cNvPr id="9" name="Curved Connector 8"/>
+          <p:cNvCxnSpPr>
+            <a:endCxn id="7" idx="0"/>
+          </p:cNvCxnSpPr>
+          <p:nvPr/>
+        </p:nvCxnSpPr>
+        <p:spPr>
+          <a:xfrm rot="5400000">
+            <a:off x="1357290" y="1357298"/>
+            <a:ext cx="1214446" cy="928694"/>
+          </a:xfrm>
+          <a:prstGeom prst="curvedConnector3">
+            <a:avLst>
+              <a:gd name="adj1" fmla="val 10667"/>
+            </a:avLst>
+          </a:prstGeom>
+          <a:ln w="57150">
+            <a:solidFill>
+              <a:srgbClr val="FFC000"/>
+            </a:solidFill>
+            <a:tailEnd type="arrow"/>
+          </a:ln>
+        </p:spPr>
+        <p:style>
+          <a:lnRef idx="1">
+            <a:schemeClr val="accent1"/>
+          </a:lnRef>
+          <a:fillRef idx="0">
+            <a:schemeClr val="accent1"/>
           </a:fillRef>
           <a:effectRef idx="0">
-            <a:schemeClr val="dk1"/>
-          </a:effectRef>
-          <a:fontRef idx="minor">
-            <a:schemeClr val="dk1"/>
-          </a:fontRef>
-        </p:style>
-        <p:txBody>
-          <a:bodyPr rtlCol="1" anchor="ctr"/>
-          <a:lstStyle/>
-          <a:p>
-            <a:pPr algn="ctr"/>
-            <a:r>
-              <a:rPr lang="en-US" dirty="0" smtClean="0"/>
-              <a:t>input</a:t>
-            </a:r>
-            <a:endParaRPr lang="he-IL" dirty="0"/>
-          </a:p>
-        </p:txBody>
-      </p:sp>
-      <p:sp>
-        <p:nvSpPr>
-          <p:cNvPr id="8" name="Right Arrow 7"/>
-          <p:cNvSpPr/>
-          <p:nvPr/>
-        </p:nvSpPr>
-        <p:spPr>
-          <a:xfrm>
-            <a:off x="6156176" y="1521768"/>
-            <a:ext cx="1872208" cy="468052"/>
-          </a:xfrm>
-          <a:prstGeom prst="rightArrow">
-            <a:avLst/>
-          </a:prstGeom>
-        </p:spPr>
-        <p:style>
-          <a:lnRef idx="2">
-            <a:schemeClr val="dk1"/>
-          </a:lnRef>
-          <a:fillRef idx="1">
-            <a:schemeClr val="lt1"/>
-          </a:fillRef>
-          <a:effectRef idx="0">
-            <a:schemeClr val="dk1"/>
-          </a:effectRef>
-          <a:fontRef idx="minor">
-            <a:schemeClr val="dk1"/>
-          </a:fontRef>
-        </p:style>
-        <p:txBody>
-          <a:bodyPr rtlCol="1" anchor="ctr"/>
-          <a:lstStyle/>
-          <a:p>
-            <a:pPr algn="ctr"/>
-            <a:r>
-              <a:rPr lang="en-US" dirty="0" smtClean="0"/>
-              <a:t>output</a:t>
-            </a:r>
-            <a:endParaRPr lang="he-IL" dirty="0"/>
-          </a:p>
-        </p:txBody>
-      </p:sp>
-      <p:sp>
-        <p:nvSpPr>
-          <p:cNvPr id="9" name="TextBox 8"/>
+            <a:schemeClr val="accent1"/>
+          </a:effectRef>
+          <a:fontRef idx="minor">
+            <a:schemeClr val="tx1"/>
+          </a:fontRef>
+        </p:style>
+      </p:cxnSp>
+      <p:sp>
+        <p:nvSpPr>
+          <p:cNvPr id="11" name="TextBox 10"/>
           <p:cNvSpPr txBox="1"/>
           <p:nvPr/>
         </p:nvSpPr>
         <p:spPr>
           <a:xfrm>
-            <a:off x="971600" y="1952836"/>
-            <a:ext cx="1728192" cy="646331"/>
+            <a:off x="1571604" y="857232"/>
+            <a:ext cx="1785950" cy="369332"/>
           </a:xfrm>
           <a:prstGeom prst="rect">
             <a:avLst/>
@@ -19658,15 +19762,15 @@
           <a:p>
             <a:r>
               <a:rPr lang="en-US" dirty="0" smtClean="0"/>
-              <a:t>Coordinate(</a:t>
+              <a:t>(</a:t>
             </a:r>
             <a:r>
               <a:rPr lang="en-US" dirty="0" err="1" smtClean="0"/>
-              <a:t>x,y</a:t>
+              <a:t>x_start,y_start</a:t>
             </a:r>
             <a:r>
               <a:rPr lang="en-US" dirty="0" smtClean="0"/>
-              <a:t>) in output image</a:t>
+              <a:t>)</a:t>
             </a:r>
             <a:endParaRPr lang="he-IL" dirty="0"/>
           </a:p>
@@ -19674,14 +19778,14 @@
       </p:sp>
       <p:sp>
         <p:nvSpPr>
-          <p:cNvPr id="10" name="TextBox 9"/>
+          <p:cNvPr id="12" name="TextBox 11"/>
           <p:cNvSpPr txBox="1"/>
           <p:nvPr/>
         </p:nvSpPr>
         <p:spPr>
           <a:xfrm>
-            <a:off x="6228184" y="1952836"/>
-            <a:ext cx="2088232" cy="646331"/>
+            <a:off x="785786" y="4357694"/>
+            <a:ext cx="1643074" cy="369332"/>
           </a:xfrm>
           <a:prstGeom prst="rect">
             <a:avLst/>
@@ -19694,29 +19798,70 @@
           </a:bodyPr>
           <a:lstStyle/>
           <a:p>
-            <a:pPr algn="l"/>
             <a:r>
               <a:rPr lang="en-US" dirty="0" smtClean="0"/>
-              <a:t>4 addresses (</a:t>
-            </a:r>
-            <a:r>
-              <a:rPr lang="en-US" dirty="0" err="1" smtClean="0"/>
-              <a:t>SDram</a:t>
-            </a:r>
+              <a:t>Input image</a:t>
+            </a:r>
+            <a:endParaRPr lang="he-IL" dirty="0"/>
+          </a:p>
+        </p:txBody>
+      </p:sp>
+      <p:pic>
+        <p:nvPicPr>
+          <p:cNvPr id="13" name="Picture 12" descr="Lena.jpg"/>
+          <p:cNvPicPr>
+            <a:picLocks noChangeAspect="1"/>
+          </p:cNvPicPr>
+          <p:nvPr/>
+        </p:nvPicPr>
+        <p:blipFill>
+          <a:blip r:embed="rId3"/>
+          <a:srcRect l="36911" t="15380"/>
+          <a:stretch>
+            <a:fillRect/>
+          </a:stretch>
+        </p:blipFill>
+        <p:spPr>
+          <a:xfrm>
+            <a:off x="3857620" y="2428868"/>
+            <a:ext cx="1465250" cy="1965316"/>
+          </a:xfrm>
+          <a:prstGeom prst="rect">
+            <a:avLst/>
+          </a:prstGeom>
+        </p:spPr>
+      </p:pic>
+      <p:sp>
+        <p:nvSpPr>
+          <p:cNvPr id="16" name="TextBox 15"/>
+          <p:cNvSpPr txBox="1"/>
+          <p:nvPr/>
+        </p:nvSpPr>
+        <p:spPr>
+          <a:xfrm>
+            <a:off x="3786182" y="4357694"/>
+            <a:ext cx="1643074" cy="369332"/>
+          </a:xfrm>
+          <a:prstGeom prst="rect">
+            <a:avLst/>
+          </a:prstGeom>
+          <a:noFill/>
+        </p:spPr>
+        <p:txBody>
+          <a:bodyPr wrap="square" rtlCol="1">
+            <a:spAutoFit/>
+          </a:bodyPr>
+          <a:lstStyle/>
+          <a:p>
             <a:r>
               <a:rPr lang="en-US" dirty="0" smtClean="0"/>
-              <a:t>) of input image</a:t>
+              <a:t>Output image</a:t>
             </a:r>
             <a:endParaRPr lang="he-IL" dirty="0"/>
           </a:p>
         </p:txBody>
       </p:sp>
     </p:spTree>
-    <p:extLst>
-      <p:ext uri="{BB962C8B-B14F-4D97-AF65-F5344CB8AC3E}">
-        <p14:creationId xmlns:p14="http://schemas.microsoft.com/office/powerpoint/2010/main" val="3840405132"/>
-      </p:ext>
-    </p:extLst>
   </p:cSld>
   <p:clrMapOvr>
     <a:masterClrMapping/>
@@ -19725,261 +19870,6 @@
 </file>
 
 <file path=ppt/slides/slide7.xml><?xml version="1.0" encoding="utf-8"?>
-<p:sld xmlns:a="http://schemas.openxmlformats.org/drawingml/2006/main" xmlns:r="http://schemas.openxmlformats.org/officeDocument/2006/relationships" xmlns:p="http://schemas.openxmlformats.org/presentationml/2006/main">
-  <p:cSld>
-    <p:spTree>
-      <p:nvGrpSpPr>
-        <p:cNvPr id="1" name=""/>
-        <p:cNvGrpSpPr/>
-        <p:nvPr/>
-      </p:nvGrpSpPr>
-      <p:grpSpPr>
-        <a:xfrm>
-          <a:off x="0" y="0"/>
-          <a:ext cx="0" cy="0"/>
-          <a:chOff x="0" y="0"/>
-          <a:chExt cx="0" cy="0"/>
-        </a:xfrm>
-      </p:grpSpPr>
-      <p:pic>
-        <p:nvPicPr>
-          <p:cNvPr id="6" name="Picture 5" descr="Lena.jpg"/>
-          <p:cNvPicPr>
-            <a:picLocks noChangeAspect="1"/>
-          </p:cNvPicPr>
-          <p:nvPr/>
-        </p:nvPicPr>
-        <p:blipFill>
-          <a:blip r:embed="rId3"/>
-          <a:stretch>
-            <a:fillRect/>
-          </a:stretch>
-        </p:blipFill>
-        <p:spPr>
-          <a:xfrm>
-            <a:off x="642910" y="2071678"/>
-            <a:ext cx="2322506" cy="2322506"/>
-          </a:xfrm>
-          <a:prstGeom prst="rect">
-            <a:avLst/>
-          </a:prstGeom>
-        </p:spPr>
-      </p:pic>
-      <p:sp>
-        <p:nvSpPr>
-          <p:cNvPr id="7" name="Oval 6"/>
-          <p:cNvSpPr/>
-          <p:nvPr/>
-        </p:nvSpPr>
-        <p:spPr>
-          <a:xfrm>
-            <a:off x="1428728" y="2428868"/>
-            <a:ext cx="142876" cy="142876"/>
-          </a:xfrm>
-          <a:prstGeom prst="ellipse">
-            <a:avLst/>
-          </a:prstGeom>
-          <a:solidFill>
-            <a:srgbClr val="FF0000"/>
-          </a:solidFill>
-        </p:spPr>
-        <p:style>
-          <a:lnRef idx="2">
-            <a:schemeClr val="accent1">
-              <a:shade val="50000"/>
-            </a:schemeClr>
-          </a:lnRef>
-          <a:fillRef idx="1">
-            <a:schemeClr val="accent1"/>
-          </a:fillRef>
-          <a:effectRef idx="0">
-            <a:schemeClr val="accent1"/>
-          </a:effectRef>
-          <a:fontRef idx="minor">
-            <a:schemeClr val="lt1"/>
-          </a:fontRef>
-        </p:style>
-        <p:txBody>
-          <a:bodyPr rtlCol="1" anchor="ctr"/>
-          <a:lstStyle/>
-          <a:p>
-            <a:pPr algn="ctr"/>
-            <a:endParaRPr lang="he-IL"/>
-          </a:p>
-        </p:txBody>
-      </p:sp>
-      <p:cxnSp>
-        <p:nvCxnSpPr>
-          <p:cNvPr id="9" name="Curved Connector 8"/>
-          <p:cNvCxnSpPr>
-            <a:endCxn id="7" idx="0"/>
-          </p:cNvCxnSpPr>
-          <p:nvPr/>
-        </p:nvCxnSpPr>
-        <p:spPr>
-          <a:xfrm rot="5400000">
-            <a:off x="1357290" y="1357298"/>
-            <a:ext cx="1214446" cy="928694"/>
-          </a:xfrm>
-          <a:prstGeom prst="curvedConnector3">
-            <a:avLst>
-              <a:gd name="adj1" fmla="val 10667"/>
-            </a:avLst>
-          </a:prstGeom>
-          <a:ln w="57150">
-            <a:solidFill>
-              <a:srgbClr val="FFC000"/>
-            </a:solidFill>
-            <a:tailEnd type="arrow"/>
-          </a:ln>
-        </p:spPr>
-        <p:style>
-          <a:lnRef idx="1">
-            <a:schemeClr val="accent1"/>
-          </a:lnRef>
-          <a:fillRef idx="0">
-            <a:schemeClr val="accent1"/>
-          </a:fillRef>
-          <a:effectRef idx="0">
-            <a:schemeClr val="accent1"/>
-          </a:effectRef>
-          <a:fontRef idx="minor">
-            <a:schemeClr val="tx1"/>
-          </a:fontRef>
-        </p:style>
-      </p:cxnSp>
-      <p:sp>
-        <p:nvSpPr>
-          <p:cNvPr id="11" name="TextBox 10"/>
-          <p:cNvSpPr txBox="1"/>
-          <p:nvPr/>
-        </p:nvSpPr>
-        <p:spPr>
-          <a:xfrm>
-            <a:off x="1571604" y="857232"/>
-            <a:ext cx="1785950" cy="369332"/>
-          </a:xfrm>
-          <a:prstGeom prst="rect">
-            <a:avLst/>
-          </a:prstGeom>
-          <a:noFill/>
-        </p:spPr>
-        <p:txBody>
-          <a:bodyPr wrap="square" rtlCol="1">
-            <a:spAutoFit/>
-          </a:bodyPr>
-          <a:lstStyle/>
-          <a:p>
-            <a:r>
-              <a:rPr lang="en-US" dirty="0" smtClean="0"/>
-              <a:t>(</a:t>
-            </a:r>
-            <a:r>
-              <a:rPr lang="en-US" dirty="0" err="1" smtClean="0"/>
-              <a:t>x_start,y_start</a:t>
-            </a:r>
-            <a:r>
-              <a:rPr lang="en-US" dirty="0" smtClean="0"/>
-              <a:t>)</a:t>
-            </a:r>
-            <a:endParaRPr lang="he-IL" dirty="0"/>
-          </a:p>
-        </p:txBody>
-      </p:sp>
-      <p:sp>
-        <p:nvSpPr>
-          <p:cNvPr id="12" name="TextBox 11"/>
-          <p:cNvSpPr txBox="1"/>
-          <p:nvPr/>
-        </p:nvSpPr>
-        <p:spPr>
-          <a:xfrm>
-            <a:off x="785786" y="4357694"/>
-            <a:ext cx="1643074" cy="369332"/>
-          </a:xfrm>
-          <a:prstGeom prst="rect">
-            <a:avLst/>
-          </a:prstGeom>
-          <a:noFill/>
-        </p:spPr>
-        <p:txBody>
-          <a:bodyPr wrap="square" rtlCol="1">
-            <a:spAutoFit/>
-          </a:bodyPr>
-          <a:lstStyle/>
-          <a:p>
-            <a:r>
-              <a:rPr lang="en-US" dirty="0" smtClean="0"/>
-              <a:t>Input image</a:t>
-            </a:r>
-            <a:endParaRPr lang="he-IL" dirty="0"/>
-          </a:p>
-        </p:txBody>
-      </p:sp>
-      <p:pic>
-        <p:nvPicPr>
-          <p:cNvPr id="13" name="Picture 12" descr="Lena.jpg"/>
-          <p:cNvPicPr>
-            <a:picLocks noChangeAspect="1"/>
-          </p:cNvPicPr>
-          <p:nvPr/>
-        </p:nvPicPr>
-        <p:blipFill>
-          <a:blip r:embed="rId3"/>
-          <a:srcRect l="36911" t="15380"/>
-          <a:stretch>
-            <a:fillRect/>
-          </a:stretch>
-        </p:blipFill>
-        <p:spPr>
-          <a:xfrm>
-            <a:off x="3857620" y="2428868"/>
-            <a:ext cx="1465250" cy="1965316"/>
-          </a:xfrm>
-          <a:prstGeom prst="rect">
-            <a:avLst/>
-          </a:prstGeom>
-        </p:spPr>
-      </p:pic>
-      <p:sp>
-        <p:nvSpPr>
-          <p:cNvPr id="16" name="TextBox 15"/>
-          <p:cNvSpPr txBox="1"/>
-          <p:nvPr/>
-        </p:nvSpPr>
-        <p:spPr>
-          <a:xfrm>
-            <a:off x="3786182" y="4357694"/>
-            <a:ext cx="1643074" cy="369332"/>
-          </a:xfrm>
-          <a:prstGeom prst="rect">
-            <a:avLst/>
-          </a:prstGeom>
-          <a:noFill/>
-        </p:spPr>
-        <p:txBody>
-          <a:bodyPr wrap="square" rtlCol="1">
-            <a:spAutoFit/>
-          </a:bodyPr>
-          <a:lstStyle/>
-          <a:p>
-            <a:r>
-              <a:rPr lang="en-US" dirty="0" smtClean="0"/>
-              <a:t>Output image</a:t>
-            </a:r>
-            <a:endParaRPr lang="he-IL" dirty="0"/>
-          </a:p>
-        </p:txBody>
-      </p:sp>
-    </p:spTree>
-  </p:cSld>
-  <p:clrMapOvr>
-    <a:masterClrMapping/>
-  </p:clrMapOvr>
-</p:sld>
-</file>
-
-<file path=ppt/slides/slide8.xml><?xml version="1.0" encoding="utf-8"?>
 <p:sld xmlns:a="http://schemas.openxmlformats.org/drawingml/2006/main" xmlns:r="http://schemas.openxmlformats.org/officeDocument/2006/relationships" xmlns:p="http://schemas.openxmlformats.org/presentationml/2006/main">
   <p:cSld>
     <p:spTree>
@@ -20659,7 +20549,7 @@
               <a:graphicData uri="http://schemas.openxmlformats.org/presentationml/2006/ole">
                 <mc:AlternateContent xmlns:mc="http://schemas.openxmlformats.org/markup-compatibility/2006">
                   <mc:Choice xmlns:v="urn:schemas-microsoft-com:vml" Requires="v">
-                    <p:oleObj spid="_x0000_s1128" name="Equation" r:id="rId6" imgW="622080" imgH="253800" progId="Equation.DSMT4">
+                    <p:oleObj spid="_x0000_s1146" name="Equation" r:id="rId6" imgW="622080" imgH="253800" progId="Equation.DSMT4">
                       <p:embed/>
                     </p:oleObj>
                   </mc:Choice>
@@ -20758,7 +20648,7 @@
               <a:graphicData uri="http://schemas.openxmlformats.org/presentationml/2006/ole">
                 <mc:AlternateContent xmlns:mc="http://schemas.openxmlformats.org/markup-compatibility/2006">
                   <mc:Choice xmlns:v="urn:schemas-microsoft-com:vml" Requires="v">
-                    <p:oleObj spid="_x0000_s1129" name="Equation" r:id="rId8" imgW="622080" imgH="253800" progId="Equation.DSMT4">
+                    <p:oleObj spid="_x0000_s1147" name="Equation" r:id="rId8" imgW="622080" imgH="253800" progId="Equation.DSMT4">
                       <p:embed/>
                     </p:oleObj>
                   </mc:Choice>
@@ -20857,7 +20747,7 @@
               <a:graphicData uri="http://schemas.openxmlformats.org/presentationml/2006/ole">
                 <mc:AlternateContent xmlns:mc="http://schemas.openxmlformats.org/markup-compatibility/2006">
                   <mc:Choice xmlns:v="urn:schemas-microsoft-com:vml" Requires="v">
-                    <p:oleObj spid="_x0000_s1130" name="Equation" r:id="rId10" imgW="622080" imgH="253800" progId="Equation.DSMT4">
+                    <p:oleObj spid="_x0000_s1148" name="Equation" r:id="rId10" imgW="622080" imgH="253800" progId="Equation.DSMT4">
                       <p:embed/>
                     </p:oleObj>
                   </mc:Choice>
@@ -20956,7 +20846,7 @@
               <a:graphicData uri="http://schemas.openxmlformats.org/presentationml/2006/ole">
                 <mc:AlternateContent xmlns:mc="http://schemas.openxmlformats.org/markup-compatibility/2006">
                   <mc:Choice xmlns:v="urn:schemas-microsoft-com:vml" Requires="v">
-                    <p:oleObj spid="_x0000_s1131" name="Equation" r:id="rId12" imgW="622080" imgH="253800" progId="Equation.DSMT4">
+                    <p:oleObj spid="_x0000_s1149" name="Equation" r:id="rId12" imgW="622080" imgH="253800" progId="Equation.DSMT4">
                       <p:embed/>
                     </p:oleObj>
                   </mc:Choice>
@@ -21352,7 +21242,7 @@
               <a:graphicData uri="http://schemas.openxmlformats.org/presentationml/2006/ole">
                 <mc:AlternateContent xmlns:mc="http://schemas.openxmlformats.org/markup-compatibility/2006">
                   <mc:Choice xmlns:v="urn:schemas-microsoft-com:vml" Requires="v">
-                    <p:oleObj spid="_x0000_s1132" name="Equation" r:id="rId14" imgW="291960" imgH="190440" progId="Equation.DSMT4">
+                    <p:oleObj spid="_x0000_s1150" name="Equation" r:id="rId14" imgW="291960" imgH="190440" progId="Equation.DSMT4">
                       <p:embed/>
                     </p:oleObj>
                   </mc:Choice>
@@ -21489,7 +21379,7 @@
               <a:graphicData uri="http://schemas.openxmlformats.org/presentationml/2006/ole">
                 <mc:AlternateContent xmlns:mc="http://schemas.openxmlformats.org/markup-compatibility/2006">
                   <mc:Choice xmlns:v="urn:schemas-microsoft-com:vml" Requires="v">
-                    <p:oleObj spid="_x0000_s1133" name="Equation" r:id="rId16" imgW="317160" imgH="190440" progId="Equation.DSMT4">
+                    <p:oleObj spid="_x0000_s1151" name="Equation" r:id="rId16" imgW="317160" imgH="190440" progId="Equation.DSMT4">
                       <p:embed/>
                     </p:oleObj>
                   </mc:Choice>
@@ -21984,7 +21874,7 @@
 </p:sld>
 </file>
 
-<file path=ppt/slides/slide9.xml><?xml version="1.0" encoding="utf-8"?>
+<file path=ppt/slides/slide8.xml><?xml version="1.0" encoding="utf-8"?>
 <p:sld xmlns:a="http://schemas.openxmlformats.org/drawingml/2006/main" xmlns:r="http://schemas.openxmlformats.org/officeDocument/2006/relationships" xmlns:p="http://schemas.openxmlformats.org/presentationml/2006/main">
   <p:cSld>
     <p:spTree>
@@ -22089,7 +21979,7 @@
               <a:graphicData uri="http://schemas.openxmlformats.org/presentationml/2006/ole">
                 <mc:AlternateContent xmlns:mc="http://schemas.openxmlformats.org/markup-compatibility/2006">
                   <mc:Choice xmlns:v="urn:schemas-microsoft-com:vml" Requires="v">
-                    <p:oleObj spid="_x0000_s2086" name="Equation" r:id="rId3" imgW="583920" imgH="203040" progId="Equation.DSMT4">
+                    <p:oleObj spid="_x0000_s2104" name="Equation" r:id="rId3" imgW="583920" imgH="203040" progId="Equation.DSMT4">
                       <p:embed/>
                     </p:oleObj>
                   </mc:Choice>
@@ -22182,7 +22072,7 @@
               <a:graphicData uri="http://schemas.openxmlformats.org/presentationml/2006/ole">
                 <mc:AlternateContent xmlns:mc="http://schemas.openxmlformats.org/markup-compatibility/2006">
                   <mc:Choice xmlns:v="urn:schemas-microsoft-com:vml" Requires="v">
-                    <p:oleObj spid="_x0000_s2087" name="Equation" r:id="rId5" imgW="672840" imgH="203040" progId="Equation.DSMT4">
+                    <p:oleObj spid="_x0000_s2105" name="Equation" r:id="rId5" imgW="672840" imgH="203040" progId="Equation.DSMT4">
                       <p:embed/>
                     </p:oleObj>
                   </mc:Choice>
@@ -22275,7 +22165,7 @@
               <a:graphicData uri="http://schemas.openxmlformats.org/presentationml/2006/ole">
                 <mc:AlternateContent xmlns:mc="http://schemas.openxmlformats.org/markup-compatibility/2006">
                   <mc:Choice xmlns:v="urn:schemas-microsoft-com:vml" Requires="v">
-                    <p:oleObj spid="_x0000_s2088" name="Equation" r:id="rId7" imgW="787320" imgH="177480" progId="Equation.DSMT4">
+                    <p:oleObj spid="_x0000_s2106" name="Equation" r:id="rId7" imgW="787320" imgH="177480" progId="Equation.DSMT4">
                       <p:embed/>
                     </p:oleObj>
                   </mc:Choice>
@@ -22368,7 +22258,7 @@
               <a:graphicData uri="http://schemas.openxmlformats.org/presentationml/2006/ole">
                 <mc:AlternateContent xmlns:mc="http://schemas.openxmlformats.org/markup-compatibility/2006">
                   <mc:Choice xmlns:v="urn:schemas-microsoft-com:vml" Requires="v">
-                    <p:oleObj spid="_x0000_s2089" name="Equation" r:id="rId9" imgW="876240" imgH="203040" progId="Equation.DSMT4">
+                    <p:oleObj spid="_x0000_s2107" name="Equation" r:id="rId9" imgW="876240" imgH="203040" progId="Equation.DSMT4">
                       <p:embed/>
                     </p:oleObj>
                   </mc:Choice>
@@ -22758,7 +22648,7 @@
               <a:graphicData uri="http://schemas.openxmlformats.org/presentationml/2006/ole">
                 <mc:AlternateContent xmlns:mc="http://schemas.openxmlformats.org/markup-compatibility/2006">
                   <mc:Choice xmlns:v="urn:schemas-microsoft-com:vml" Requires="v">
-                    <p:oleObj spid="_x0000_s2090" name="Equation" r:id="rId11" imgW="444240" imgH="190440" progId="Equation.DSMT4">
+                    <p:oleObj spid="_x0000_s2108" name="Equation" r:id="rId11" imgW="444240" imgH="190440" progId="Equation.DSMT4">
                       <p:embed/>
                     </p:oleObj>
                   </mc:Choice>
@@ -22889,7 +22779,7 @@
               <a:graphicData uri="http://schemas.openxmlformats.org/presentationml/2006/ole">
                 <mc:AlternateContent xmlns:mc="http://schemas.openxmlformats.org/markup-compatibility/2006">
                   <mc:Choice xmlns:v="urn:schemas-microsoft-com:vml" Requires="v">
-                    <p:oleObj spid="_x0000_s2091" name="Equation" r:id="rId13" imgW="393480" imgH="203040" progId="Equation.DSMT4">
+                    <p:oleObj spid="_x0000_s2109" name="Equation" r:id="rId13" imgW="393480" imgH="203040" progId="Equation.DSMT4">
                       <p:embed/>
                     </p:oleObj>
                   </mc:Choice>
@@ -23122,6 +23012,474 @@
     <p:extLst>
       <p:ext uri="{BB962C8B-B14F-4D97-AF65-F5344CB8AC3E}">
         <p14:creationId xmlns:p14="http://schemas.microsoft.com/office/powerpoint/2010/main" val="1140553981"/>
+      </p:ext>
+    </p:extLst>
+  </p:cSld>
+  <p:clrMapOvr>
+    <a:masterClrMapping/>
+  </p:clrMapOvr>
+</p:sld>
+</file>
+
+<file path=ppt/slides/slide9.xml><?xml version="1.0" encoding="utf-8"?>
+<p:sld xmlns:a="http://schemas.openxmlformats.org/drawingml/2006/main" xmlns:r="http://schemas.openxmlformats.org/officeDocument/2006/relationships" xmlns:p="http://schemas.openxmlformats.org/presentationml/2006/main">
+  <p:cSld>
+    <p:spTree>
+      <p:nvGrpSpPr>
+        <p:cNvPr id="1" name=""/>
+        <p:cNvGrpSpPr/>
+        <p:nvPr/>
+      </p:nvGrpSpPr>
+      <p:grpSpPr>
+        <a:xfrm>
+          <a:off x="0" y="0"/>
+          <a:ext cx="0" cy="0"/>
+          <a:chOff x="0" y="0"/>
+          <a:chExt cx="0" cy="0"/>
+        </a:xfrm>
+      </p:grpSpPr>
+      <p:pic>
+        <p:nvPicPr>
+          <p:cNvPr id="3074" name="Picture 2"/>
+          <p:cNvPicPr>
+            <a:picLocks noChangeAspect="1" noChangeArrowheads="1"/>
+          </p:cNvPicPr>
+          <p:nvPr/>
+        </p:nvPicPr>
+        <p:blipFill>
+          <a:blip r:embed="rId2">
+            <a:extLst>
+              <a:ext uri="{28A0092B-C50C-407E-A947-70E740481C1C}">
+                <a14:useLocalDpi xmlns:a14="http://schemas.microsoft.com/office/drawing/2010/main" val="0"/>
+              </a:ext>
+            </a:extLst>
+          </a:blip>
+          <a:srcRect/>
+          <a:stretch>
+            <a:fillRect/>
+          </a:stretch>
+        </p:blipFill>
+        <p:spPr bwMode="auto">
+          <a:xfrm>
+            <a:off x="64573" y="1086127"/>
+            <a:ext cx="10836696" cy="4791432"/>
+          </a:xfrm>
+          <a:prstGeom prst="rect">
+            <a:avLst/>
+          </a:prstGeom>
+          <a:noFill/>
+          <a:ln>
+            <a:noFill/>
+          </a:ln>
+          <a:extLst>
+            <a:ext uri="{909E8E84-426E-40DD-AFC4-6F175D3DCCD1}">
+              <a14:hiddenFill xmlns:a14="http://schemas.microsoft.com/office/drawing/2010/main">
+                <a:solidFill>
+                  <a:schemeClr val="accent1"/>
+                </a:solidFill>
+              </a14:hiddenFill>
+            </a:ext>
+            <a:ext uri="{91240B29-F687-4F45-9708-019B960494DF}">
+              <a14:hiddenLine xmlns:a14="http://schemas.microsoft.com/office/drawing/2010/main" w="9525">
+                <a:solidFill>
+                  <a:schemeClr val="tx1"/>
+                </a:solidFill>
+                <a:miter lim="800000"/>
+                <a:headEnd/>
+                <a:tailEnd/>
+              </a14:hiddenLine>
+            </a:ext>
+          </a:extLst>
+        </p:spPr>
+      </p:pic>
+      <p:grpSp>
+        <p:nvGrpSpPr>
+          <p:cNvPr id="16" name="Group 15"/>
+          <p:cNvGrpSpPr/>
+          <p:nvPr/>
+        </p:nvGrpSpPr>
+        <p:grpSpPr>
+          <a:xfrm>
+            <a:off x="5148064" y="4571206"/>
+            <a:ext cx="1852787" cy="1258022"/>
+            <a:chOff x="5148064" y="4571206"/>
+            <a:chExt cx="1852787" cy="1258022"/>
+          </a:xfrm>
+        </p:grpSpPr>
+        <p:sp>
+          <p:nvSpPr>
+            <p:cNvPr id="5" name="Rectangle 4"/>
+            <p:cNvSpPr/>
+            <p:nvPr/>
+          </p:nvSpPr>
+          <p:spPr>
+            <a:xfrm>
+              <a:off x="6568803" y="4571206"/>
+              <a:ext cx="432048" cy="288032"/>
+            </a:xfrm>
+            <a:prstGeom prst="rect">
+              <a:avLst/>
+            </a:prstGeom>
+            <a:noFill/>
+          </p:spPr>
+          <p:style>
+            <a:lnRef idx="2">
+              <a:schemeClr val="accent6"/>
+            </a:lnRef>
+            <a:fillRef idx="1">
+              <a:schemeClr val="lt1"/>
+            </a:fillRef>
+            <a:effectRef idx="0">
+              <a:schemeClr val="accent6"/>
+            </a:effectRef>
+            <a:fontRef idx="minor">
+              <a:schemeClr val="dk1"/>
+            </a:fontRef>
+          </p:style>
+          <p:txBody>
+            <a:bodyPr rtlCol="1" anchor="ctr"/>
+            <a:lstStyle/>
+            <a:p>
+              <a:pPr algn="ctr"/>
+              <a:endParaRPr lang="he-IL"/>
+            </a:p>
+          </p:txBody>
+        </p:sp>
+        <p:sp>
+          <p:nvSpPr>
+            <p:cNvPr id="7" name="Rectangle 6"/>
+            <p:cNvSpPr/>
+            <p:nvPr/>
+          </p:nvSpPr>
+          <p:spPr>
+            <a:xfrm>
+              <a:off x="5148064" y="5664538"/>
+              <a:ext cx="1152128" cy="164690"/>
+            </a:xfrm>
+            <a:prstGeom prst="rect">
+              <a:avLst/>
+            </a:prstGeom>
+            <a:noFill/>
+            <a:ln>
+              <a:solidFill>
+                <a:srgbClr val="FFFF00"/>
+              </a:solidFill>
+            </a:ln>
+          </p:spPr>
+          <p:style>
+            <a:lnRef idx="2">
+              <a:schemeClr val="accent6"/>
+            </a:lnRef>
+            <a:fillRef idx="1">
+              <a:schemeClr val="lt1"/>
+            </a:fillRef>
+            <a:effectRef idx="0">
+              <a:schemeClr val="accent6"/>
+            </a:effectRef>
+            <a:fontRef idx="minor">
+              <a:schemeClr val="dk1"/>
+            </a:fontRef>
+          </p:style>
+          <p:txBody>
+            <a:bodyPr rtlCol="1" anchor="ctr"/>
+            <a:lstStyle/>
+            <a:p>
+              <a:pPr algn="ctr"/>
+              <a:endParaRPr lang="he-IL"/>
+            </a:p>
+          </p:txBody>
+        </p:sp>
+        <p:cxnSp>
+          <p:nvCxnSpPr>
+            <p:cNvPr id="9" name="Straight Arrow Connector 8"/>
+            <p:cNvCxnSpPr/>
+            <p:nvPr/>
+          </p:nvCxnSpPr>
+          <p:spPr>
+            <a:xfrm flipV="1">
+              <a:off x="6084168" y="4869160"/>
+              <a:ext cx="504056" cy="795378"/>
+            </a:xfrm>
+            <a:prstGeom prst="straightConnector1">
+              <a:avLst/>
+            </a:prstGeom>
+            <a:ln>
+              <a:tailEnd type="arrow"/>
+            </a:ln>
+          </p:spPr>
+          <p:style>
+            <a:lnRef idx="3">
+              <a:schemeClr val="accent6"/>
+            </a:lnRef>
+            <a:fillRef idx="0">
+              <a:schemeClr val="accent6"/>
+            </a:fillRef>
+            <a:effectRef idx="2">
+              <a:schemeClr val="accent6"/>
+            </a:effectRef>
+            <a:fontRef idx="minor">
+              <a:schemeClr val="tx1"/>
+            </a:fontRef>
+          </p:style>
+        </p:cxnSp>
+        <p:sp>
+          <p:nvSpPr>
+            <p:cNvPr id="11" name="TextBox 10"/>
+            <p:cNvSpPr txBox="1"/>
+            <p:nvPr/>
+          </p:nvSpPr>
+          <p:spPr>
+            <a:xfrm>
+              <a:off x="5956910" y="4897517"/>
+              <a:ext cx="612068" cy="369332"/>
+            </a:xfrm>
+            <a:prstGeom prst="rect">
+              <a:avLst/>
+            </a:prstGeom>
+            <a:noFill/>
+          </p:spPr>
+          <p:txBody>
+            <a:bodyPr wrap="square" rtlCol="1">
+              <a:spAutoFit/>
+            </a:bodyPr>
+            <a:lstStyle/>
+            <a:p>
+              <a:r>
+                <a:rPr lang="en-US" dirty="0" err="1" smtClean="0">
+                  <a:solidFill>
+                    <a:srgbClr val="FFFF00"/>
+                  </a:solidFill>
+                </a:rPr>
+                <a:t>ack</a:t>
+              </a:r>
+              <a:endParaRPr lang="he-IL" dirty="0">
+                <a:solidFill>
+                  <a:srgbClr val="FFFF00"/>
+                </a:solidFill>
+              </a:endParaRPr>
+            </a:p>
+          </p:txBody>
+        </p:sp>
+      </p:grpSp>
+      <p:grpSp>
+        <p:nvGrpSpPr>
+          <p:cNvPr id="15" name="Group 14"/>
+          <p:cNvGrpSpPr/>
+          <p:nvPr/>
+        </p:nvGrpSpPr>
+        <p:grpSpPr>
+          <a:xfrm>
+            <a:off x="6660232" y="4571206"/>
+            <a:ext cx="1811924" cy="1258022"/>
+            <a:chOff x="6660232" y="4571206"/>
+            <a:chExt cx="1811924" cy="1258022"/>
+          </a:xfrm>
+        </p:grpSpPr>
+        <p:sp>
+          <p:nvSpPr>
+            <p:cNvPr id="6" name="Rectangle 5"/>
+            <p:cNvSpPr/>
+            <p:nvPr/>
+          </p:nvSpPr>
+          <p:spPr>
+            <a:xfrm>
+              <a:off x="8040108" y="4571206"/>
+              <a:ext cx="432048" cy="288032"/>
+            </a:xfrm>
+            <a:prstGeom prst="rect">
+              <a:avLst/>
+            </a:prstGeom>
+            <a:noFill/>
+          </p:spPr>
+          <p:style>
+            <a:lnRef idx="2">
+              <a:schemeClr val="accent6"/>
+            </a:lnRef>
+            <a:fillRef idx="1">
+              <a:schemeClr val="lt1"/>
+            </a:fillRef>
+            <a:effectRef idx="0">
+              <a:schemeClr val="accent6"/>
+            </a:effectRef>
+            <a:fontRef idx="minor">
+              <a:schemeClr val="dk1"/>
+            </a:fontRef>
+          </p:style>
+          <p:txBody>
+            <a:bodyPr rtlCol="1" anchor="ctr"/>
+            <a:lstStyle/>
+            <a:p>
+              <a:pPr algn="ctr"/>
+              <a:endParaRPr lang="he-IL"/>
+            </a:p>
+          </p:txBody>
+        </p:sp>
+        <p:sp>
+          <p:nvSpPr>
+            <p:cNvPr id="8" name="Rectangle 7"/>
+            <p:cNvSpPr/>
+            <p:nvPr/>
+          </p:nvSpPr>
+          <p:spPr>
+            <a:xfrm>
+              <a:off x="6660232" y="5623541"/>
+              <a:ext cx="1008112" cy="205687"/>
+            </a:xfrm>
+            <a:prstGeom prst="rect">
+              <a:avLst/>
+            </a:prstGeom>
+            <a:noFill/>
+            <a:ln>
+              <a:solidFill>
+                <a:srgbClr val="FFFF00"/>
+              </a:solidFill>
+            </a:ln>
+          </p:spPr>
+          <p:style>
+            <a:lnRef idx="2">
+              <a:schemeClr val="accent6"/>
+            </a:lnRef>
+            <a:fillRef idx="1">
+              <a:schemeClr val="lt1"/>
+            </a:fillRef>
+            <a:effectRef idx="0">
+              <a:schemeClr val="accent6"/>
+            </a:effectRef>
+            <a:fontRef idx="minor">
+              <a:schemeClr val="dk1"/>
+            </a:fontRef>
+          </p:style>
+          <p:txBody>
+            <a:bodyPr rtlCol="1" anchor="ctr"/>
+            <a:lstStyle/>
+            <a:p>
+              <a:pPr algn="ctr"/>
+              <a:endParaRPr lang="he-IL"/>
+            </a:p>
+          </p:txBody>
+        </p:sp>
+        <p:cxnSp>
+          <p:nvCxnSpPr>
+            <p:cNvPr id="10" name="Straight Arrow Connector 9"/>
+            <p:cNvCxnSpPr/>
+            <p:nvPr/>
+          </p:nvCxnSpPr>
+          <p:spPr>
+            <a:xfrm flipV="1">
+              <a:off x="7380312" y="4869160"/>
+              <a:ext cx="648072" cy="754381"/>
+            </a:xfrm>
+            <a:prstGeom prst="straightConnector1">
+              <a:avLst/>
+            </a:prstGeom>
+            <a:ln>
+              <a:tailEnd type="arrow"/>
+            </a:ln>
+          </p:spPr>
+          <p:style>
+            <a:lnRef idx="3">
+              <a:schemeClr val="accent6"/>
+            </a:lnRef>
+            <a:fillRef idx="0">
+              <a:schemeClr val="accent6"/>
+            </a:fillRef>
+            <a:effectRef idx="2">
+              <a:schemeClr val="accent6"/>
+            </a:effectRef>
+            <a:fontRef idx="minor">
+              <a:schemeClr val="tx1"/>
+            </a:fontRef>
+          </p:style>
+        </p:cxnSp>
+        <p:sp>
+          <p:nvSpPr>
+            <p:cNvPr id="12" name="TextBox 11"/>
+            <p:cNvSpPr txBox="1"/>
+            <p:nvPr/>
+          </p:nvSpPr>
+          <p:spPr>
+            <a:xfrm>
+              <a:off x="7308304" y="4897517"/>
+              <a:ext cx="612068" cy="369332"/>
+            </a:xfrm>
+            <a:prstGeom prst="rect">
+              <a:avLst/>
+            </a:prstGeom>
+            <a:noFill/>
+          </p:spPr>
+          <p:txBody>
+            <a:bodyPr wrap="square" rtlCol="1">
+              <a:spAutoFit/>
+            </a:bodyPr>
+            <a:lstStyle/>
+            <a:p>
+              <a:r>
+                <a:rPr lang="en-US" dirty="0" err="1" smtClean="0">
+                  <a:solidFill>
+                    <a:srgbClr val="FFFF00"/>
+                  </a:solidFill>
+                </a:rPr>
+                <a:t>ack</a:t>
+              </a:r>
+              <a:endParaRPr lang="he-IL" dirty="0">
+                <a:solidFill>
+                  <a:srgbClr val="FFFF00"/>
+                </a:solidFill>
+              </a:endParaRPr>
+            </a:p>
+          </p:txBody>
+        </p:sp>
+      </p:grpSp>
+      <p:sp>
+        <p:nvSpPr>
+          <p:cNvPr id="17" name="Rectangle 16"/>
+          <p:cNvSpPr/>
+          <p:nvPr/>
+        </p:nvSpPr>
+        <p:spPr>
+          <a:xfrm>
+            <a:off x="4644008" y="1988840"/>
+            <a:ext cx="4104456" cy="3888719"/>
+          </a:xfrm>
+          <a:prstGeom prst="rect">
+            <a:avLst/>
+          </a:prstGeom>
+          <a:noFill/>
+          <a:ln>
+            <a:solidFill>
+              <a:srgbClr val="FF0000"/>
+            </a:solidFill>
+          </a:ln>
+        </p:spPr>
+        <p:style>
+          <a:lnRef idx="2">
+            <a:schemeClr val="accent1">
+              <a:shade val="50000"/>
+            </a:schemeClr>
+          </a:lnRef>
+          <a:fillRef idx="1">
+            <a:schemeClr val="accent1"/>
+          </a:fillRef>
+          <a:effectRef idx="0">
+            <a:schemeClr val="accent1"/>
+          </a:effectRef>
+          <a:fontRef idx="minor">
+            <a:schemeClr val="lt1"/>
+          </a:fontRef>
+        </p:style>
+        <p:txBody>
+          <a:bodyPr rtlCol="1" anchor="ctr"/>
+          <a:lstStyle/>
+          <a:p>
+            <a:pPr algn="ctr"/>
+            <a:endParaRPr lang="he-IL"/>
+          </a:p>
+        </p:txBody>
+      </p:sp>
+    </p:spTree>
+    <p:extLst>
+      <p:ext uri="{BB962C8B-B14F-4D97-AF65-F5344CB8AC3E}">
+        <p14:creationId xmlns:p14="http://schemas.microsoft.com/office/powerpoint/2010/main" val="2628898583"/>
       </p:ext>
     </p:extLst>
   </p:cSld>

</xml_diff>

<commit_message>
removed summery after image manipulation complete write back is  in debug mode add enable display port in img_man_manager.vhd and connected it to vesa_gen_ctrl read in normal mode is always from higher addresses of SDRAM : i.e. addr(20)= 1 in normal  ,0 in debug burst length is defined by constant parameter registers still don't work
</commit_message>
<xml_diff>
--- a/Presentation/top_diagrams.pptx
+++ b/Presentation/top_diagrams.pptx
@@ -201,7 +201,7 @@
           <a:p>
             <a:fld id="{ADBC4376-C3DE-4B1D-AA9F-C7298BE814A9}" type="datetimeFigureOut">
               <a:rPr lang="he-IL" smtClean="0"/>
-              <a:t>י"ד/אייר/תשע"ג</a:t>
+              <a:t>י"ט/אייר/תשע"ג</a:t>
             </a:fld>
             <a:endParaRPr lang="he-IL"/>
           </a:p>
@@ -979,7 +979,7 @@
           <a:p>
             <a:fld id="{AC424652-B047-4066-943C-BED71DEDE269}" type="datetimeFigureOut">
               <a:rPr lang="he-IL" smtClean="0"/>
-              <a:t>י"ד/אייר/תשע"ג</a:t>
+              <a:t>י"ט/אייר/תשע"ג</a:t>
             </a:fld>
             <a:endParaRPr lang="he-IL"/>
           </a:p>
@@ -1144,7 +1144,7 @@
           <a:p>
             <a:fld id="{AC424652-B047-4066-943C-BED71DEDE269}" type="datetimeFigureOut">
               <a:rPr lang="he-IL" smtClean="0"/>
-              <a:t>י"ד/אייר/תשע"ג</a:t>
+              <a:t>י"ט/אייר/תשע"ג</a:t>
             </a:fld>
             <a:endParaRPr lang="he-IL"/>
           </a:p>
@@ -1319,7 +1319,7 @@
           <a:p>
             <a:fld id="{AC424652-B047-4066-943C-BED71DEDE269}" type="datetimeFigureOut">
               <a:rPr lang="he-IL" smtClean="0"/>
-              <a:t>י"ד/אייר/תשע"ג</a:t>
+              <a:t>י"ט/אייר/תשע"ג</a:t>
             </a:fld>
             <a:endParaRPr lang="he-IL"/>
           </a:p>
@@ -1484,7 +1484,7 @@
           <a:p>
             <a:fld id="{AC424652-B047-4066-943C-BED71DEDE269}" type="datetimeFigureOut">
               <a:rPr lang="he-IL" smtClean="0"/>
-              <a:t>י"ד/אייר/תשע"ג</a:t>
+              <a:t>י"ט/אייר/תשע"ג</a:t>
             </a:fld>
             <a:endParaRPr lang="he-IL"/>
           </a:p>
@@ -1725,7 +1725,7 @@
           <a:p>
             <a:fld id="{AC424652-B047-4066-943C-BED71DEDE269}" type="datetimeFigureOut">
               <a:rPr lang="he-IL" smtClean="0"/>
-              <a:t>י"ד/אייר/תשע"ג</a:t>
+              <a:t>י"ט/אייר/תשע"ג</a:t>
             </a:fld>
             <a:endParaRPr lang="he-IL"/>
           </a:p>
@@ -2008,7 +2008,7 @@
           <a:p>
             <a:fld id="{AC424652-B047-4066-943C-BED71DEDE269}" type="datetimeFigureOut">
               <a:rPr lang="he-IL" smtClean="0"/>
-              <a:t>י"ד/אייר/תשע"ג</a:t>
+              <a:t>י"ט/אייר/תשע"ג</a:t>
             </a:fld>
             <a:endParaRPr lang="he-IL"/>
           </a:p>
@@ -2425,7 +2425,7 @@
           <a:p>
             <a:fld id="{AC424652-B047-4066-943C-BED71DEDE269}" type="datetimeFigureOut">
               <a:rPr lang="he-IL" smtClean="0"/>
-              <a:t>י"ד/אייר/תשע"ג</a:t>
+              <a:t>י"ט/אייר/תשע"ג</a:t>
             </a:fld>
             <a:endParaRPr lang="he-IL"/>
           </a:p>
@@ -2538,7 +2538,7 @@
           <a:p>
             <a:fld id="{AC424652-B047-4066-943C-BED71DEDE269}" type="datetimeFigureOut">
               <a:rPr lang="he-IL" smtClean="0"/>
-              <a:t>י"ד/אייר/תשע"ג</a:t>
+              <a:t>י"ט/אייר/תשע"ג</a:t>
             </a:fld>
             <a:endParaRPr lang="he-IL"/>
           </a:p>
@@ -2628,7 +2628,7 @@
           <a:p>
             <a:fld id="{AC424652-B047-4066-943C-BED71DEDE269}" type="datetimeFigureOut">
               <a:rPr lang="he-IL" smtClean="0"/>
-              <a:t>י"ד/אייר/תשע"ג</a:t>
+              <a:t>י"ט/אייר/תשע"ג</a:t>
             </a:fld>
             <a:endParaRPr lang="he-IL"/>
           </a:p>
@@ -2900,7 +2900,7 @@
           <a:p>
             <a:fld id="{AC424652-B047-4066-943C-BED71DEDE269}" type="datetimeFigureOut">
               <a:rPr lang="he-IL" smtClean="0"/>
-              <a:t>י"ד/אייר/תשע"ג</a:t>
+              <a:t>י"ט/אייר/תשע"ג</a:t>
             </a:fld>
             <a:endParaRPr lang="he-IL"/>
           </a:p>
@@ -3148,7 +3148,7 @@
           <a:p>
             <a:fld id="{AC424652-B047-4066-943C-BED71DEDE269}" type="datetimeFigureOut">
               <a:rPr lang="he-IL" smtClean="0"/>
-              <a:t>י"ד/אייר/תשע"ג</a:t>
+              <a:t>י"ט/אייר/תשע"ג</a:t>
             </a:fld>
             <a:endParaRPr lang="he-IL"/>
           </a:p>
@@ -3356,7 +3356,7 @@
           <a:p>
             <a:fld id="{AC424652-B047-4066-943C-BED71DEDE269}" type="datetimeFigureOut">
               <a:rPr lang="he-IL" smtClean="0"/>
-              <a:t>י"ד/אייר/תשע"ג</a:t>
+              <a:t>י"ט/אייר/תשע"ג</a:t>
             </a:fld>
             <a:endParaRPr lang="he-IL"/>
           </a:p>
@@ -15939,11 +15939,7 @@
               </a:r>
               <a:r>
                 <a:rPr lang="en-US" sz="1600" dirty="0" smtClean="0"/>
-                <a:t> </a:t>
-              </a:r>
-              <a:r>
-                <a:rPr lang="en-US" sz="1600" dirty="0" smtClean="0"/>
-                <a:t>Manger</a:t>
+                <a:t> Manger</a:t>
               </a:r>
               <a:br>
                 <a:rPr lang="en-US" sz="1600" dirty="0" smtClean="0"/>
@@ -16346,6 +16342,41 @@
             <a:schemeClr val="dk1"/>
           </a:fillRef>
           <a:effectRef idx="1">
+            <a:schemeClr val="dk1"/>
+          </a:effectRef>
+          <a:fontRef idx="minor">
+            <a:schemeClr val="tx1"/>
+          </a:fontRef>
+        </p:style>
+      </p:cxnSp>
+      <p:cxnSp>
+        <p:nvCxnSpPr>
+          <p:cNvPr id="182" name="Shape 194"/>
+          <p:cNvCxnSpPr>
+            <a:stCxn id="181" idx="3"/>
+          </p:cNvCxnSpPr>
+          <p:nvPr/>
+        </p:nvCxnSpPr>
+        <p:spPr>
+          <a:xfrm flipV="1">
+            <a:off x="7734060" y="4134556"/>
+            <a:ext cx="2565000" cy="2950303"/>
+          </a:xfrm>
+          <a:prstGeom prst="bentConnector2">
+            <a:avLst/>
+          </a:prstGeom>
+          <a:ln>
+            <a:tailEnd type="arrow"/>
+          </a:ln>
+        </p:spPr>
+        <p:style>
+          <a:lnRef idx="1">
+            <a:schemeClr val="dk1"/>
+          </a:lnRef>
+          <a:fillRef idx="0">
+            <a:schemeClr val="dk1"/>
+          </a:fillRef>
+          <a:effectRef idx="0">
             <a:schemeClr val="dk1"/>
           </a:effectRef>
           <a:fontRef idx="minor">
@@ -20549,7 +20580,7 @@
               <a:graphicData uri="http://schemas.openxmlformats.org/presentationml/2006/ole">
                 <mc:AlternateContent xmlns:mc="http://schemas.openxmlformats.org/markup-compatibility/2006">
                   <mc:Choice xmlns:v="urn:schemas-microsoft-com:vml" Requires="v">
-                    <p:oleObj spid="_x0000_s1146" name="Equation" r:id="rId6" imgW="622080" imgH="253800" progId="Equation.DSMT4">
+                    <p:oleObj spid="_x0000_s1152" name="Equation" r:id="rId6" imgW="622080" imgH="253800" progId="Equation.DSMT4">
                       <p:embed/>
                     </p:oleObj>
                   </mc:Choice>
@@ -20648,7 +20679,7 @@
               <a:graphicData uri="http://schemas.openxmlformats.org/presentationml/2006/ole">
                 <mc:AlternateContent xmlns:mc="http://schemas.openxmlformats.org/markup-compatibility/2006">
                   <mc:Choice xmlns:v="urn:schemas-microsoft-com:vml" Requires="v">
-                    <p:oleObj spid="_x0000_s1147" name="Equation" r:id="rId8" imgW="622080" imgH="253800" progId="Equation.DSMT4">
+                    <p:oleObj spid="_x0000_s1153" name="Equation" r:id="rId8" imgW="622080" imgH="253800" progId="Equation.DSMT4">
                       <p:embed/>
                     </p:oleObj>
                   </mc:Choice>
@@ -20747,7 +20778,7 @@
               <a:graphicData uri="http://schemas.openxmlformats.org/presentationml/2006/ole">
                 <mc:AlternateContent xmlns:mc="http://schemas.openxmlformats.org/markup-compatibility/2006">
                   <mc:Choice xmlns:v="urn:schemas-microsoft-com:vml" Requires="v">
-                    <p:oleObj spid="_x0000_s1148" name="Equation" r:id="rId10" imgW="622080" imgH="253800" progId="Equation.DSMT4">
+                    <p:oleObj spid="_x0000_s1154" name="Equation" r:id="rId10" imgW="622080" imgH="253800" progId="Equation.DSMT4">
                       <p:embed/>
                     </p:oleObj>
                   </mc:Choice>
@@ -20846,7 +20877,7 @@
               <a:graphicData uri="http://schemas.openxmlformats.org/presentationml/2006/ole">
                 <mc:AlternateContent xmlns:mc="http://schemas.openxmlformats.org/markup-compatibility/2006">
                   <mc:Choice xmlns:v="urn:schemas-microsoft-com:vml" Requires="v">
-                    <p:oleObj spid="_x0000_s1149" name="Equation" r:id="rId12" imgW="622080" imgH="253800" progId="Equation.DSMT4">
+                    <p:oleObj spid="_x0000_s1155" name="Equation" r:id="rId12" imgW="622080" imgH="253800" progId="Equation.DSMT4">
                       <p:embed/>
                     </p:oleObj>
                   </mc:Choice>
@@ -21242,7 +21273,7 @@
               <a:graphicData uri="http://schemas.openxmlformats.org/presentationml/2006/ole">
                 <mc:AlternateContent xmlns:mc="http://schemas.openxmlformats.org/markup-compatibility/2006">
                   <mc:Choice xmlns:v="urn:schemas-microsoft-com:vml" Requires="v">
-                    <p:oleObj spid="_x0000_s1150" name="Equation" r:id="rId14" imgW="291960" imgH="190440" progId="Equation.DSMT4">
+                    <p:oleObj spid="_x0000_s1156" name="Equation" r:id="rId14" imgW="291960" imgH="190440" progId="Equation.DSMT4">
                       <p:embed/>
                     </p:oleObj>
                   </mc:Choice>
@@ -21379,7 +21410,7 @@
               <a:graphicData uri="http://schemas.openxmlformats.org/presentationml/2006/ole">
                 <mc:AlternateContent xmlns:mc="http://schemas.openxmlformats.org/markup-compatibility/2006">
                   <mc:Choice xmlns:v="urn:schemas-microsoft-com:vml" Requires="v">
-                    <p:oleObj spid="_x0000_s1151" name="Equation" r:id="rId16" imgW="317160" imgH="190440" progId="Equation.DSMT4">
+                    <p:oleObj spid="_x0000_s1157" name="Equation" r:id="rId16" imgW="317160" imgH="190440" progId="Equation.DSMT4">
                       <p:embed/>
                     </p:oleObj>
                   </mc:Choice>
@@ -21979,7 +22010,7 @@
               <a:graphicData uri="http://schemas.openxmlformats.org/presentationml/2006/ole">
                 <mc:AlternateContent xmlns:mc="http://schemas.openxmlformats.org/markup-compatibility/2006">
                   <mc:Choice xmlns:v="urn:schemas-microsoft-com:vml" Requires="v">
-                    <p:oleObj spid="_x0000_s2104" name="Equation" r:id="rId3" imgW="583920" imgH="203040" progId="Equation.DSMT4">
+                    <p:oleObj spid="_x0000_s2110" name="Equation" r:id="rId3" imgW="583920" imgH="203040" progId="Equation.DSMT4">
                       <p:embed/>
                     </p:oleObj>
                   </mc:Choice>
@@ -22072,7 +22103,7 @@
               <a:graphicData uri="http://schemas.openxmlformats.org/presentationml/2006/ole">
                 <mc:AlternateContent xmlns:mc="http://schemas.openxmlformats.org/markup-compatibility/2006">
                   <mc:Choice xmlns:v="urn:schemas-microsoft-com:vml" Requires="v">
-                    <p:oleObj spid="_x0000_s2105" name="Equation" r:id="rId5" imgW="672840" imgH="203040" progId="Equation.DSMT4">
+                    <p:oleObj spid="_x0000_s2111" name="Equation" r:id="rId5" imgW="672840" imgH="203040" progId="Equation.DSMT4">
                       <p:embed/>
                     </p:oleObj>
                   </mc:Choice>
@@ -22165,7 +22196,7 @@
               <a:graphicData uri="http://schemas.openxmlformats.org/presentationml/2006/ole">
                 <mc:AlternateContent xmlns:mc="http://schemas.openxmlformats.org/markup-compatibility/2006">
                   <mc:Choice xmlns:v="urn:schemas-microsoft-com:vml" Requires="v">
-                    <p:oleObj spid="_x0000_s2106" name="Equation" r:id="rId7" imgW="787320" imgH="177480" progId="Equation.DSMT4">
+                    <p:oleObj spid="_x0000_s2112" name="Equation" r:id="rId7" imgW="787320" imgH="177480" progId="Equation.DSMT4">
                       <p:embed/>
                     </p:oleObj>
                   </mc:Choice>
@@ -22258,7 +22289,7 @@
               <a:graphicData uri="http://schemas.openxmlformats.org/presentationml/2006/ole">
                 <mc:AlternateContent xmlns:mc="http://schemas.openxmlformats.org/markup-compatibility/2006">
                   <mc:Choice xmlns:v="urn:schemas-microsoft-com:vml" Requires="v">
-                    <p:oleObj spid="_x0000_s2107" name="Equation" r:id="rId9" imgW="876240" imgH="203040" progId="Equation.DSMT4">
+                    <p:oleObj spid="_x0000_s2113" name="Equation" r:id="rId9" imgW="876240" imgH="203040" progId="Equation.DSMT4">
                       <p:embed/>
                     </p:oleObj>
                   </mc:Choice>
@@ -22648,7 +22679,7 @@
               <a:graphicData uri="http://schemas.openxmlformats.org/presentationml/2006/ole">
                 <mc:AlternateContent xmlns:mc="http://schemas.openxmlformats.org/markup-compatibility/2006">
                   <mc:Choice xmlns:v="urn:schemas-microsoft-com:vml" Requires="v">
-                    <p:oleObj spid="_x0000_s2108" name="Equation" r:id="rId11" imgW="444240" imgH="190440" progId="Equation.DSMT4">
+                    <p:oleObj spid="_x0000_s2114" name="Equation" r:id="rId11" imgW="444240" imgH="190440" progId="Equation.DSMT4">
                       <p:embed/>
                     </p:oleObj>
                   </mc:Choice>
@@ -22779,7 +22810,7 @@
               <a:graphicData uri="http://schemas.openxmlformats.org/presentationml/2006/ole">
                 <mc:AlternateContent xmlns:mc="http://schemas.openxmlformats.org/markup-compatibility/2006">
                   <mc:Choice xmlns:v="urn:schemas-microsoft-com:vml" Requires="v">
-                    <p:oleObj spid="_x0000_s2109" name="Equation" r:id="rId13" imgW="393480" imgH="203040" progId="Equation.DSMT4">
+                    <p:oleObj spid="_x0000_s2115" name="Equation" r:id="rId13" imgW="393480" imgH="203040" progId="Equation.DSMT4">
                       <p:embed/>
                     </p:oleObj>
                   </mc:Choice>

</xml_diff>

<commit_message>
image_manipulation disabled image problems pixel manager changed
</commit_message>
<xml_diff>
--- a/Presentation/top_diagrams.pptx
+++ b/Presentation/top_diagrams.pptx
@@ -5,7 +5,7 @@
     <p:sldMasterId id="2147483648" r:id="rId1"/>
   </p:sldMasterIdLst>
   <p:notesMasterIdLst>
-    <p:notesMasterId r:id="rId12"/>
+    <p:notesMasterId r:id="rId14"/>
   </p:notesMasterIdLst>
   <p:sldIdLst>
     <p:sldId id="265" r:id="rId2"/>
@@ -18,6 +18,8 @@
     <p:sldId id="263" r:id="rId9"/>
     <p:sldId id="264" r:id="rId10"/>
     <p:sldId id="268" r:id="rId11"/>
+    <p:sldId id="269" r:id="rId12"/>
+    <p:sldId id="270" r:id="rId13"/>
   </p:sldIdLst>
   <p:sldSz cx="9144000" cy="6858000" type="screen4x3"/>
   <p:notesSz cx="6858000" cy="9144000"/>
@@ -201,7 +203,7 @@
           <a:p>
             <a:fld id="{ADBC4376-C3DE-4B1D-AA9F-C7298BE814A9}" type="datetimeFigureOut">
               <a:rPr lang="he-IL" smtClean="0"/>
-              <a:t>י"ט/אייר/תשע"ג</a:t>
+              <a:t>י"ב/סיון/תשע"ג</a:t>
             </a:fld>
             <a:endParaRPr lang="he-IL"/>
           </a:p>
@@ -979,7 +981,7 @@
           <a:p>
             <a:fld id="{AC424652-B047-4066-943C-BED71DEDE269}" type="datetimeFigureOut">
               <a:rPr lang="he-IL" smtClean="0"/>
-              <a:t>י"ט/אייר/תשע"ג</a:t>
+              <a:t>י"ב/סיון/תשע"ג</a:t>
             </a:fld>
             <a:endParaRPr lang="he-IL"/>
           </a:p>
@@ -1144,7 +1146,7 @@
           <a:p>
             <a:fld id="{AC424652-B047-4066-943C-BED71DEDE269}" type="datetimeFigureOut">
               <a:rPr lang="he-IL" smtClean="0"/>
-              <a:t>י"ט/אייר/תשע"ג</a:t>
+              <a:t>י"ב/סיון/תשע"ג</a:t>
             </a:fld>
             <a:endParaRPr lang="he-IL"/>
           </a:p>
@@ -1319,7 +1321,7 @@
           <a:p>
             <a:fld id="{AC424652-B047-4066-943C-BED71DEDE269}" type="datetimeFigureOut">
               <a:rPr lang="he-IL" smtClean="0"/>
-              <a:t>י"ט/אייר/תשע"ג</a:t>
+              <a:t>י"ב/סיון/תשע"ג</a:t>
             </a:fld>
             <a:endParaRPr lang="he-IL"/>
           </a:p>
@@ -1484,7 +1486,7 @@
           <a:p>
             <a:fld id="{AC424652-B047-4066-943C-BED71DEDE269}" type="datetimeFigureOut">
               <a:rPr lang="he-IL" smtClean="0"/>
-              <a:t>י"ט/אייר/תשע"ג</a:t>
+              <a:t>י"ב/סיון/תשע"ג</a:t>
             </a:fld>
             <a:endParaRPr lang="he-IL"/>
           </a:p>
@@ -1725,7 +1727,7 @@
           <a:p>
             <a:fld id="{AC424652-B047-4066-943C-BED71DEDE269}" type="datetimeFigureOut">
               <a:rPr lang="he-IL" smtClean="0"/>
-              <a:t>י"ט/אייר/תשע"ג</a:t>
+              <a:t>י"ב/סיון/תשע"ג</a:t>
             </a:fld>
             <a:endParaRPr lang="he-IL"/>
           </a:p>
@@ -2008,7 +2010,7 @@
           <a:p>
             <a:fld id="{AC424652-B047-4066-943C-BED71DEDE269}" type="datetimeFigureOut">
               <a:rPr lang="he-IL" smtClean="0"/>
-              <a:t>י"ט/אייר/תשע"ג</a:t>
+              <a:t>י"ב/סיון/תשע"ג</a:t>
             </a:fld>
             <a:endParaRPr lang="he-IL"/>
           </a:p>
@@ -2425,7 +2427,7 @@
           <a:p>
             <a:fld id="{AC424652-B047-4066-943C-BED71DEDE269}" type="datetimeFigureOut">
               <a:rPr lang="he-IL" smtClean="0"/>
-              <a:t>י"ט/אייר/תשע"ג</a:t>
+              <a:t>י"ב/סיון/תשע"ג</a:t>
             </a:fld>
             <a:endParaRPr lang="he-IL"/>
           </a:p>
@@ -2538,7 +2540,7 @@
           <a:p>
             <a:fld id="{AC424652-B047-4066-943C-BED71DEDE269}" type="datetimeFigureOut">
               <a:rPr lang="he-IL" smtClean="0"/>
-              <a:t>י"ט/אייר/תשע"ג</a:t>
+              <a:t>י"ב/סיון/תשע"ג</a:t>
             </a:fld>
             <a:endParaRPr lang="he-IL"/>
           </a:p>
@@ -2628,7 +2630,7 @@
           <a:p>
             <a:fld id="{AC424652-B047-4066-943C-BED71DEDE269}" type="datetimeFigureOut">
               <a:rPr lang="he-IL" smtClean="0"/>
-              <a:t>י"ט/אייר/תשע"ג</a:t>
+              <a:t>י"ב/סיון/תשע"ג</a:t>
             </a:fld>
             <a:endParaRPr lang="he-IL"/>
           </a:p>
@@ -2900,7 +2902,7 @@
           <a:p>
             <a:fld id="{AC424652-B047-4066-943C-BED71DEDE269}" type="datetimeFigureOut">
               <a:rPr lang="he-IL" smtClean="0"/>
-              <a:t>י"ט/אייר/תשע"ג</a:t>
+              <a:t>י"ב/סיון/תשע"ג</a:t>
             </a:fld>
             <a:endParaRPr lang="he-IL"/>
           </a:p>
@@ -3148,7 +3150,7 @@
           <a:p>
             <a:fld id="{AC424652-B047-4066-943C-BED71DEDE269}" type="datetimeFigureOut">
               <a:rPr lang="he-IL" smtClean="0"/>
-              <a:t>י"ט/אייר/תשע"ג</a:t>
+              <a:t>י"ב/סיון/תשע"ג</a:t>
             </a:fld>
             <a:endParaRPr lang="he-IL"/>
           </a:p>
@@ -3356,7 +3358,7 @@
           <a:p>
             <a:fld id="{AC424652-B047-4066-943C-BED71DEDE269}" type="datetimeFigureOut">
               <a:rPr lang="he-IL" smtClean="0"/>
-              <a:t>י"ט/אייר/תשע"ג</a:t>
+              <a:t>י"ב/סיון/תשע"ג</a:t>
             </a:fld>
             <a:endParaRPr lang="he-IL"/>
           </a:p>
@@ -15332,398 +15334,24 @@
           </a:p>
         </p:txBody>
       </p:sp>
-      <p:grpSp>
-        <p:nvGrpSpPr>
-          <p:cNvPr id="231" name="Group 230"/>
-          <p:cNvGrpSpPr/>
-          <p:nvPr/>
-        </p:nvGrpSpPr>
-        <p:grpSpPr>
-          <a:xfrm>
-            <a:off x="5000629" y="4850959"/>
-            <a:ext cx="4516566" cy="2967240"/>
-            <a:chOff x="5123810" y="5203257"/>
-            <a:chExt cx="4516566" cy="2967240"/>
-          </a:xfrm>
-        </p:grpSpPr>
-        <p:sp>
-          <p:nvSpPr>
-            <p:cNvPr id="215" name="Rectangle 214"/>
-            <p:cNvSpPr/>
-            <p:nvPr/>
-          </p:nvSpPr>
-          <p:spPr>
-            <a:xfrm>
-              <a:off x="5369839" y="5538779"/>
-              <a:ext cx="4250036" cy="2631718"/>
-            </a:xfrm>
-            <a:prstGeom prst="rect">
-              <a:avLst/>
-            </a:prstGeom>
-            <a:solidFill>
-              <a:schemeClr val="accent1">
-                <a:alpha val="19000"/>
-              </a:schemeClr>
-            </a:solidFill>
-          </p:spPr>
-          <p:style>
-            <a:lnRef idx="2">
-              <a:schemeClr val="accent1">
-                <a:shade val="50000"/>
-              </a:schemeClr>
-            </a:lnRef>
-            <a:fillRef idx="1">
-              <a:schemeClr val="accent1"/>
-            </a:fillRef>
-            <a:effectRef idx="0">
-              <a:schemeClr val="accent1"/>
-            </a:effectRef>
-            <a:fontRef idx="minor">
-              <a:schemeClr val="lt1"/>
-            </a:fontRef>
-          </p:style>
-          <p:txBody>
-            <a:bodyPr rtlCol="1" anchor="ctr"/>
-            <a:lstStyle/>
-            <a:p>
-              <a:pPr algn="ctr"/>
-              <a:endParaRPr lang="he-IL"/>
-            </a:p>
-          </p:txBody>
-        </p:sp>
-        <p:sp>
-          <p:nvSpPr>
-            <p:cNvPr id="217" name="TextBox 216"/>
-            <p:cNvSpPr txBox="1"/>
-            <p:nvPr/>
-          </p:nvSpPr>
-          <p:spPr>
-            <a:xfrm rot="16200000">
-              <a:off x="4813352" y="7552261"/>
-              <a:ext cx="928694" cy="307777"/>
-            </a:xfrm>
-            <a:prstGeom prst="rect">
-              <a:avLst/>
-            </a:prstGeom>
-          </p:spPr>
-          <p:style>
-            <a:lnRef idx="0">
-              <a:schemeClr val="dk1"/>
-            </a:lnRef>
-            <a:fillRef idx="3">
-              <a:schemeClr val="dk1"/>
-            </a:fillRef>
-            <a:effectRef idx="3">
-              <a:schemeClr val="dk1"/>
-            </a:effectRef>
-            <a:fontRef idx="minor">
-              <a:schemeClr val="lt1"/>
-            </a:fontRef>
-          </p:style>
-          <p:txBody>
-            <a:bodyPr wrap="square" rtlCol="1">
-              <a:spAutoFit/>
-            </a:bodyPr>
-            <a:lstStyle/>
-            <a:p>
-              <a:pPr algn="ctr"/>
-              <a:r>
-                <a:rPr lang="en-US" sz="1400" b="1" dirty="0" smtClean="0"/>
-                <a:t>WBM</a:t>
-              </a:r>
-              <a:endParaRPr lang="he-IL" sz="1400" b="1" dirty="0"/>
-            </a:p>
-          </p:txBody>
-        </p:sp>
-        <p:sp>
-          <p:nvSpPr>
-            <p:cNvPr id="221" name="Rounded Rectangle 220"/>
-            <p:cNvSpPr/>
-            <p:nvPr/>
-          </p:nvSpPr>
-          <p:spPr>
-            <a:xfrm>
-              <a:off x="8116379" y="5203257"/>
-              <a:ext cx="1523997" cy="500066"/>
-            </a:xfrm>
-            <a:prstGeom prst="roundRect">
-              <a:avLst/>
-            </a:prstGeom>
-          </p:spPr>
-          <p:style>
-            <a:lnRef idx="0">
-              <a:schemeClr val="accent2"/>
-            </a:lnRef>
-            <a:fillRef idx="3">
-              <a:schemeClr val="accent2"/>
-            </a:fillRef>
-            <a:effectRef idx="3">
-              <a:schemeClr val="accent2"/>
-            </a:effectRef>
-            <a:fontRef idx="minor">
-              <a:schemeClr val="lt1"/>
-            </a:fontRef>
-          </p:style>
-          <p:txBody>
-            <a:bodyPr rtlCol="1" anchor="ctr"/>
-            <a:lstStyle/>
-            <a:p>
-              <a:pPr algn="ctr"/>
-              <a:r>
-                <a:rPr lang="en-US" dirty="0" smtClean="0"/>
-                <a:t>Image Manipulation</a:t>
-              </a:r>
-            </a:p>
-          </p:txBody>
-        </p:sp>
-        <p:sp>
-          <p:nvSpPr>
-            <p:cNvPr id="225" name="TextBox 224"/>
-            <p:cNvSpPr txBox="1"/>
-            <p:nvPr/>
-          </p:nvSpPr>
-          <p:spPr>
-            <a:xfrm>
-              <a:off x="5839764" y="5716803"/>
-              <a:ext cx="1087665" cy="584775"/>
-            </a:xfrm>
-            <a:prstGeom prst="rect">
-              <a:avLst/>
-            </a:prstGeom>
-          </p:spPr>
-          <p:style>
-            <a:lnRef idx="0">
-              <a:schemeClr val="accent6"/>
-            </a:lnRef>
-            <a:fillRef idx="3">
-              <a:schemeClr val="accent6"/>
-            </a:fillRef>
-            <a:effectRef idx="3">
-              <a:schemeClr val="accent6"/>
-            </a:effectRef>
-            <a:fontRef idx="minor">
-              <a:schemeClr val="lt1"/>
-            </a:fontRef>
-          </p:style>
-          <p:txBody>
-            <a:bodyPr wrap="square" rtlCol="1">
-              <a:spAutoFit/>
-            </a:bodyPr>
-            <a:lstStyle/>
-            <a:p>
-              <a:pPr algn="ctr" rtl="0"/>
-              <a:r>
-                <a:rPr lang="en-US" sz="1600" dirty="0" err="1" smtClean="0"/>
-                <a:t>Addr</a:t>
-              </a:r>
-              <a:r>
-                <a:rPr lang="en-US" sz="1600" dirty="0" smtClean="0"/>
-                <a:t> Calculator</a:t>
-              </a:r>
-              <a:endParaRPr lang="he-IL" sz="1600" dirty="0"/>
-            </a:p>
-          </p:txBody>
-        </p:sp>
-        <p:sp>
-          <p:nvSpPr>
-            <p:cNvPr id="226" name="TextBox 225"/>
-            <p:cNvSpPr txBox="1"/>
-            <p:nvPr/>
-          </p:nvSpPr>
-          <p:spPr>
-            <a:xfrm>
-              <a:off x="8235363" y="5930472"/>
-              <a:ext cx="1372877" cy="276999"/>
-            </a:xfrm>
-            <a:prstGeom prst="rect">
-              <a:avLst/>
-            </a:prstGeom>
-          </p:spPr>
-          <p:style>
-            <a:lnRef idx="0">
-              <a:schemeClr val="accent3"/>
-            </a:lnRef>
-            <a:fillRef idx="3">
-              <a:schemeClr val="accent3"/>
-            </a:fillRef>
-            <a:effectRef idx="3">
-              <a:schemeClr val="accent3"/>
-            </a:effectRef>
-            <a:fontRef idx="minor">
-              <a:schemeClr val="lt1"/>
-            </a:fontRef>
-          </p:style>
-          <p:txBody>
-            <a:bodyPr wrap="square" rtlCol="1">
-              <a:spAutoFit/>
-            </a:bodyPr>
-            <a:lstStyle/>
-            <a:p>
-              <a:pPr algn="ctr" rtl="0"/>
-              <a:r>
-                <a:rPr lang="en-US" sz="1200" b="1" dirty="0" err="1" smtClean="0">
-                  <a:solidFill>
-                    <a:schemeClr val="tx1"/>
-                  </a:solidFill>
-                </a:rPr>
-                <a:t>Param</a:t>
-              </a:r>
-              <a:r>
-                <a:rPr lang="en-US" sz="1200" b="1" dirty="0" smtClean="0">
-                  <a:solidFill>
-                    <a:schemeClr val="tx1"/>
-                  </a:solidFill>
-                </a:rPr>
-                <a:t> Registers</a:t>
-              </a:r>
-            </a:p>
-          </p:txBody>
-        </p:sp>
-        <p:sp>
-          <p:nvSpPr>
-            <p:cNvPr id="227" name="TextBox 226"/>
-            <p:cNvSpPr txBox="1"/>
-            <p:nvPr/>
-          </p:nvSpPr>
-          <p:spPr>
-            <a:xfrm>
-              <a:off x="6253416" y="5300688"/>
-              <a:ext cx="928694" cy="307777"/>
-            </a:xfrm>
-            <a:prstGeom prst="rect">
-              <a:avLst/>
-            </a:prstGeom>
-            <a:ln/>
-          </p:spPr>
-          <p:style>
-            <a:lnRef idx="0">
-              <a:schemeClr val="accent1"/>
-            </a:lnRef>
-            <a:fillRef idx="3">
-              <a:schemeClr val="accent1"/>
-            </a:fillRef>
-            <a:effectRef idx="3">
-              <a:schemeClr val="accent1"/>
-            </a:effectRef>
-            <a:fontRef idx="minor">
-              <a:schemeClr val="lt1"/>
-            </a:fontRef>
-          </p:style>
-          <p:txBody>
-            <a:bodyPr wrap="square" rtlCol="1">
-              <a:spAutoFit/>
-            </a:bodyPr>
-            <a:lstStyle/>
-            <a:p>
-              <a:pPr algn="ctr"/>
-              <a:r>
-                <a:rPr lang="en-US" sz="1400" dirty="0" smtClean="0"/>
-                <a:t>WBS</a:t>
-              </a:r>
-              <a:endParaRPr lang="he-IL" sz="1400" dirty="0"/>
-            </a:p>
-          </p:txBody>
-        </p:sp>
-      </p:grpSp>
-      <p:cxnSp>
-        <p:nvCxnSpPr>
-          <p:cNvPr id="210" name="Shape 194"/>
-          <p:cNvCxnSpPr>
-            <a:endCxn id="226" idx="1"/>
-          </p:cNvCxnSpPr>
-          <p:nvPr/>
-        </p:nvCxnSpPr>
-        <p:spPr>
-          <a:xfrm>
-            <a:off x="7068828" y="5041853"/>
-            <a:ext cx="1043354" cy="674821"/>
-          </a:xfrm>
-          <a:prstGeom prst="bentConnector3">
-            <a:avLst>
-              <a:gd name="adj1" fmla="val 86517"/>
-            </a:avLst>
-          </a:prstGeom>
-          <a:ln>
-            <a:tailEnd type="arrow"/>
-          </a:ln>
-        </p:spPr>
-        <p:style>
-          <a:lnRef idx="1">
-            <a:schemeClr val="dk1"/>
-          </a:lnRef>
-          <a:fillRef idx="0">
-            <a:schemeClr val="dk1"/>
-          </a:fillRef>
-          <a:effectRef idx="0">
-            <a:schemeClr val="dk1"/>
-          </a:effectRef>
-          <a:fontRef idx="minor">
-            <a:schemeClr val="tx1"/>
-          </a:fontRef>
-        </p:style>
-      </p:cxnSp>
-      <p:sp>
-        <p:nvSpPr>
-          <p:cNvPr id="211" name="TextBox 210"/>
-          <p:cNvSpPr txBox="1"/>
-          <p:nvPr/>
-        </p:nvSpPr>
-        <p:spPr>
-          <a:xfrm rot="16200000">
-            <a:off x="4673844" y="5547068"/>
-            <a:ext cx="928694" cy="307777"/>
-          </a:xfrm>
-          <a:prstGeom prst="rect">
-            <a:avLst/>
-          </a:prstGeom>
-        </p:spPr>
-        <p:style>
-          <a:lnRef idx="0">
-            <a:schemeClr val="dk1"/>
-          </a:lnRef>
-          <a:fillRef idx="3">
-            <a:schemeClr val="dk1"/>
-          </a:fillRef>
-          <a:effectRef idx="3">
-            <a:schemeClr val="dk1"/>
-          </a:effectRef>
-          <a:fontRef idx="minor">
-            <a:schemeClr val="lt1"/>
-          </a:fontRef>
-        </p:style>
-        <p:txBody>
-          <a:bodyPr wrap="square" rtlCol="1">
-            <a:spAutoFit/>
-          </a:bodyPr>
-          <a:lstStyle/>
-          <a:p>
-            <a:pPr algn="ctr"/>
-            <a:r>
-              <a:rPr lang="en-US" sz="1400" b="1" dirty="0" smtClean="0"/>
-              <a:t>WBM</a:t>
-            </a:r>
-            <a:endParaRPr lang="he-IL" sz="1400" b="1" dirty="0"/>
-          </a:p>
-        </p:txBody>
-      </p:sp>
       <p:cxnSp>
         <p:nvCxnSpPr>
           <p:cNvPr id="212" name="Shape 121"/>
           <p:cNvCxnSpPr>
-            <a:stCxn id="154" idx="0"/>
-            <a:endCxn id="211" idx="3"/>
+            <a:stCxn id="154" idx="3"/>
+            <a:endCxn id="211" idx="0"/>
           </p:cNvCxnSpPr>
           <p:nvPr/>
         </p:nvCxnSpPr>
         <p:spPr>
-          <a:xfrm>
-            <a:off x="4798456" y="2920208"/>
-            <a:ext cx="339736" cy="2316402"/>
+          <a:xfrm rot="16200000" flipH="1">
+            <a:off x="3660156" y="4454641"/>
+            <a:ext cx="2091935" cy="184667"/>
           </a:xfrm>
           <a:prstGeom prst="bentConnector4">
             <a:avLst>
-              <a:gd name="adj1" fmla="val 67288"/>
-              <a:gd name="adj2" fmla="val 60687"/>
+              <a:gd name="adj1" fmla="val 55790"/>
+              <a:gd name="adj2" fmla="val -23790"/>
             </a:avLst>
           </a:prstGeom>
           <a:ln>
@@ -15757,8 +15385,8 @@
         </p:nvCxnSpPr>
         <p:spPr>
           <a:xfrm rot="16200000" flipV="1">
-            <a:off x="2678030" y="1031838"/>
-            <a:ext cx="3192112" cy="4640992"/>
+            <a:off x="2740489" y="969380"/>
+            <a:ext cx="2877113" cy="4450909"/>
           </a:xfrm>
           <a:prstGeom prst="bentConnector2">
             <a:avLst/>
@@ -15777,533 +15405,6 @@
           </a:fillRef>
           <a:effectRef idx="1">
             <a:schemeClr val="dk1"/>
-          </a:effectRef>
-          <a:fontRef idx="minor">
-            <a:schemeClr val="tx1"/>
-          </a:fontRef>
-        </p:style>
-      </p:cxnSp>
-      <p:sp>
-        <p:nvSpPr>
-          <p:cNvPr id="214" name="TextBox 213"/>
-          <p:cNvSpPr txBox="1"/>
-          <p:nvPr/>
-        </p:nvSpPr>
-        <p:spPr>
-          <a:xfrm>
-            <a:off x="9042128" y="5802159"/>
-            <a:ext cx="428627" cy="338554"/>
-          </a:xfrm>
-          <a:prstGeom prst="rect">
-            <a:avLst/>
-          </a:prstGeom>
-        </p:spPr>
-        <p:style>
-          <a:lnRef idx="0">
-            <a:schemeClr val="accent3"/>
-          </a:lnRef>
-          <a:fillRef idx="3">
-            <a:schemeClr val="accent3"/>
-          </a:fillRef>
-          <a:effectRef idx="3">
-            <a:schemeClr val="accent3"/>
-          </a:effectRef>
-          <a:fontRef idx="minor">
-            <a:schemeClr val="lt1"/>
-          </a:fontRef>
-        </p:style>
-        <p:txBody>
-          <a:bodyPr wrap="square" rtlCol="1">
-            <a:spAutoFit/>
-          </a:bodyPr>
-          <a:lstStyle/>
-          <a:p>
-            <a:pPr algn="ctr" rtl="0"/>
-            <a:r>
-              <a:rPr lang="en-US" sz="800" dirty="0" smtClean="0">
-                <a:solidFill>
-                  <a:schemeClr val="tx1"/>
-                </a:solidFill>
-              </a:rPr>
-              <a:t>TYPE</a:t>
-            </a:r>
-          </a:p>
-          <a:p>
-            <a:pPr algn="ctr" rtl="0"/>
-            <a:r>
-              <a:rPr lang="en-US" sz="800" dirty="0" err="1" smtClean="0">
-                <a:solidFill>
-                  <a:schemeClr val="tx1"/>
-                </a:solidFill>
-              </a:rPr>
-              <a:t>Reg</a:t>
-            </a:r>
-            <a:endParaRPr lang="he-IL" sz="800" dirty="0">
-              <a:solidFill>
-                <a:schemeClr val="tx1"/>
-              </a:solidFill>
-            </a:endParaRPr>
-          </a:p>
-        </p:txBody>
-      </p:sp>
-      <p:cxnSp>
-        <p:nvCxnSpPr>
-          <p:cNvPr id="216" name="Shape 194"/>
-          <p:cNvCxnSpPr>
-            <a:endCxn id="214" idx="1"/>
-          </p:cNvCxnSpPr>
-          <p:nvPr/>
-        </p:nvCxnSpPr>
-        <p:spPr>
-          <a:xfrm>
-            <a:off x="7023925" y="5072202"/>
-            <a:ext cx="2018203" cy="899234"/>
-          </a:xfrm>
-          <a:prstGeom prst="bentConnector3">
-            <a:avLst>
-              <a:gd name="adj1" fmla="val 42071"/>
-            </a:avLst>
-          </a:prstGeom>
-          <a:ln>
-            <a:tailEnd type="arrow"/>
-          </a:ln>
-        </p:spPr>
-        <p:style>
-          <a:lnRef idx="1">
-            <a:schemeClr val="dk1"/>
-          </a:lnRef>
-          <a:fillRef idx="0">
-            <a:schemeClr val="dk1"/>
-          </a:fillRef>
-          <a:effectRef idx="0">
-            <a:schemeClr val="dk1"/>
-          </a:effectRef>
-          <a:fontRef idx="minor">
-            <a:schemeClr val="tx1"/>
-          </a:fontRef>
-        </p:style>
-      </p:cxnSp>
-      <p:grpSp>
-        <p:nvGrpSpPr>
-          <p:cNvPr id="9" name="Group 8"/>
-          <p:cNvGrpSpPr/>
-          <p:nvPr/>
-        </p:nvGrpSpPr>
-        <p:grpSpPr>
-          <a:xfrm>
-            <a:off x="5580112" y="6669360"/>
-            <a:ext cx="2160240" cy="842857"/>
-            <a:chOff x="2555776" y="5610479"/>
-            <a:chExt cx="2160240" cy="842857"/>
-          </a:xfrm>
-        </p:grpSpPr>
-        <p:sp>
-          <p:nvSpPr>
-            <p:cNvPr id="181" name="TextBox 180"/>
-            <p:cNvSpPr txBox="1"/>
-            <p:nvPr/>
-          </p:nvSpPr>
-          <p:spPr>
-            <a:xfrm>
-              <a:off x="2555776" y="5610479"/>
-              <a:ext cx="2153948" cy="830997"/>
-            </a:xfrm>
-            <a:prstGeom prst="rect">
-              <a:avLst/>
-            </a:prstGeom>
-          </p:spPr>
-          <p:style>
-            <a:lnRef idx="0">
-              <a:schemeClr val="accent6"/>
-            </a:lnRef>
-            <a:fillRef idx="3">
-              <a:schemeClr val="accent6"/>
-            </a:fillRef>
-            <a:effectRef idx="3">
-              <a:schemeClr val="accent6"/>
-            </a:effectRef>
-            <a:fontRef idx="minor">
-              <a:schemeClr val="lt1"/>
-            </a:fontRef>
-          </p:style>
-          <p:txBody>
-            <a:bodyPr wrap="square" rtlCol="1">
-              <a:spAutoFit/>
-            </a:bodyPr>
-            <a:lstStyle/>
-            <a:p>
-              <a:pPr algn="ctr" rtl="0"/>
-              <a:r>
-                <a:rPr lang="en-US" sz="1600" dirty="0" err="1" smtClean="0"/>
-                <a:t>ImgMan</a:t>
-              </a:r>
-              <a:r>
-                <a:rPr lang="en-US" sz="1600" dirty="0" smtClean="0"/>
-                <a:t> Manger</a:t>
-              </a:r>
-              <a:br>
-                <a:rPr lang="en-US" sz="1600" dirty="0" smtClean="0"/>
-              </a:br>
-              <a:endParaRPr lang="en-US" sz="1600" dirty="0" smtClean="0"/>
-            </a:p>
-            <a:p>
-              <a:pPr algn="ctr" rtl="0"/>
-              <a:endParaRPr lang="he-IL" sz="1600" dirty="0"/>
-            </a:p>
-          </p:txBody>
-        </p:sp>
-        <p:sp>
-          <p:nvSpPr>
-            <p:cNvPr id="222" name="Rounded Rectangle 221"/>
-            <p:cNvSpPr/>
-            <p:nvPr/>
-          </p:nvSpPr>
-          <p:spPr>
-            <a:xfrm>
-              <a:off x="4288712" y="6239022"/>
-              <a:ext cx="427304" cy="214314"/>
-            </a:xfrm>
-            <a:prstGeom prst="roundRect">
-              <a:avLst/>
-            </a:prstGeom>
-          </p:spPr>
-          <p:style>
-            <a:lnRef idx="2">
-              <a:schemeClr val="dk1"/>
-            </a:lnRef>
-            <a:fillRef idx="1">
-              <a:schemeClr val="lt1"/>
-            </a:fillRef>
-            <a:effectRef idx="0">
-              <a:schemeClr val="dk1"/>
-            </a:effectRef>
-            <a:fontRef idx="minor">
-              <a:schemeClr val="dk1"/>
-            </a:fontRef>
-          </p:style>
-          <p:txBody>
-            <a:bodyPr rtlCol="1" anchor="ctr"/>
-            <a:lstStyle/>
-            <a:p>
-              <a:pPr algn="ctr"/>
-              <a:r>
-                <a:rPr lang="en-US" sz="800" dirty="0" smtClean="0"/>
-                <a:t>RAM</a:t>
-              </a:r>
-              <a:endParaRPr lang="he-IL" sz="800" dirty="0"/>
-            </a:p>
-          </p:txBody>
-        </p:sp>
-        <p:sp>
-          <p:nvSpPr>
-            <p:cNvPr id="230" name="TextBox 229"/>
-            <p:cNvSpPr txBox="1"/>
-            <p:nvPr/>
-          </p:nvSpPr>
-          <p:spPr>
-            <a:xfrm>
-              <a:off x="2786448" y="5975702"/>
-              <a:ext cx="728084" cy="261610"/>
-            </a:xfrm>
-            <a:prstGeom prst="rect">
-              <a:avLst/>
-            </a:prstGeom>
-          </p:spPr>
-          <p:style>
-            <a:lnRef idx="1">
-              <a:schemeClr val="dk1"/>
-            </a:lnRef>
-            <a:fillRef idx="2">
-              <a:schemeClr val="dk1"/>
-            </a:fillRef>
-            <a:effectRef idx="1">
-              <a:schemeClr val="dk1"/>
-            </a:effectRef>
-            <a:fontRef idx="minor">
-              <a:schemeClr val="dk1"/>
-            </a:fontRef>
-          </p:style>
-          <p:txBody>
-            <a:bodyPr wrap="none" rtlCol="1">
-              <a:spAutoFit/>
-            </a:bodyPr>
-            <a:lstStyle/>
-            <a:p>
-              <a:r>
-                <a:rPr lang="en-US" sz="1100" dirty="0" err="1" smtClean="0"/>
-                <a:t>ReadProc</a:t>
-              </a:r>
-              <a:endParaRPr lang="he-IL" sz="1100" dirty="0"/>
-            </a:p>
-          </p:txBody>
-        </p:sp>
-        <p:sp>
-          <p:nvSpPr>
-            <p:cNvPr id="232" name="TextBox 231"/>
-            <p:cNvSpPr txBox="1"/>
-            <p:nvPr/>
-          </p:nvSpPr>
-          <p:spPr>
-            <a:xfrm>
-              <a:off x="3762367" y="5975702"/>
-              <a:ext cx="763351" cy="261610"/>
-            </a:xfrm>
-            <a:prstGeom prst="rect">
-              <a:avLst/>
-            </a:prstGeom>
-          </p:spPr>
-          <p:style>
-            <a:lnRef idx="1">
-              <a:schemeClr val="dk1"/>
-            </a:lnRef>
-            <a:fillRef idx="2">
-              <a:schemeClr val="dk1"/>
-            </a:fillRef>
-            <a:effectRef idx="1">
-              <a:schemeClr val="dk1"/>
-            </a:effectRef>
-            <a:fontRef idx="minor">
-              <a:schemeClr val="dk1"/>
-            </a:fontRef>
-          </p:style>
-          <p:txBody>
-            <a:bodyPr wrap="none" rtlCol="1">
-              <a:spAutoFit/>
-            </a:bodyPr>
-            <a:lstStyle/>
-            <a:p>
-              <a:r>
-                <a:rPr lang="en-US" sz="1100" dirty="0" err="1" smtClean="0"/>
-                <a:t>WriteProc</a:t>
-              </a:r>
-              <a:endParaRPr lang="he-IL" sz="1100" dirty="0"/>
-            </a:p>
-          </p:txBody>
-        </p:sp>
-      </p:grpSp>
-      <p:cxnSp>
-        <p:nvCxnSpPr>
-          <p:cNvPr id="233" name="Elbow Connector 232"/>
-          <p:cNvCxnSpPr>
-            <a:stCxn id="230" idx="1"/>
-            <a:endCxn id="211" idx="2"/>
-          </p:cNvCxnSpPr>
-          <p:nvPr/>
-        </p:nvCxnSpPr>
-        <p:spPr>
-          <a:xfrm rot="10800000">
-            <a:off x="5292080" y="5700958"/>
-            <a:ext cx="518704" cy="1464431"/>
-          </a:xfrm>
-          <a:prstGeom prst="bentConnector3">
-            <a:avLst>
-              <a:gd name="adj1" fmla="val 50000"/>
-            </a:avLst>
-          </a:prstGeom>
-          <a:ln>
-            <a:tailEnd type="arrow"/>
-          </a:ln>
-        </p:spPr>
-        <p:style>
-          <a:lnRef idx="2">
-            <a:schemeClr val="accent4"/>
-          </a:lnRef>
-          <a:fillRef idx="0">
-            <a:schemeClr val="accent4"/>
-          </a:fillRef>
-          <a:effectRef idx="1">
-            <a:schemeClr val="accent4"/>
-          </a:effectRef>
-          <a:fontRef idx="minor">
-            <a:schemeClr val="tx1"/>
-          </a:fontRef>
-        </p:style>
-      </p:cxnSp>
-      <p:sp>
-        <p:nvSpPr>
-          <p:cNvPr id="235" name="TextBox 234"/>
-          <p:cNvSpPr txBox="1"/>
-          <p:nvPr/>
-        </p:nvSpPr>
-        <p:spPr>
-          <a:xfrm>
-            <a:off x="6892652" y="5996027"/>
-            <a:ext cx="1026337" cy="338554"/>
-          </a:xfrm>
-          <a:prstGeom prst="rect">
-            <a:avLst/>
-          </a:prstGeom>
-        </p:spPr>
-        <p:style>
-          <a:lnRef idx="0">
-            <a:schemeClr val="accent6"/>
-          </a:lnRef>
-          <a:fillRef idx="3">
-            <a:schemeClr val="accent6"/>
-          </a:fillRef>
-          <a:effectRef idx="3">
-            <a:schemeClr val="accent6"/>
-          </a:effectRef>
-          <a:fontRef idx="minor">
-            <a:schemeClr val="lt1"/>
-          </a:fontRef>
-        </p:style>
-        <p:txBody>
-          <a:bodyPr wrap="square" rtlCol="1">
-            <a:spAutoFit/>
-          </a:bodyPr>
-          <a:lstStyle/>
-          <a:p>
-            <a:pPr algn="ctr" rtl="0"/>
-            <a:r>
-              <a:rPr lang="en-US" sz="1600" dirty="0" err="1" smtClean="0"/>
-              <a:t>Biliniar</a:t>
-            </a:r>
-            <a:endParaRPr lang="he-IL" sz="1600" dirty="0"/>
-          </a:p>
-        </p:txBody>
-      </p:sp>
-      <p:cxnSp>
-        <p:nvCxnSpPr>
-          <p:cNvPr id="239" name="Elbow Connector 238"/>
-          <p:cNvCxnSpPr>
-            <a:stCxn id="181" idx="0"/>
-            <a:endCxn id="225" idx="2"/>
-          </p:cNvCxnSpPr>
-          <p:nvPr/>
-        </p:nvCxnSpPr>
-        <p:spPr>
-          <a:xfrm rot="16200000" flipV="1">
-            <a:off x="6098711" y="6110985"/>
-            <a:ext cx="720080" cy="396670"/>
-          </a:xfrm>
-          <a:prstGeom prst="bentConnector3">
-            <a:avLst>
-              <a:gd name="adj1" fmla="val 50000"/>
-            </a:avLst>
-          </a:prstGeom>
-          <a:ln>
-            <a:tailEnd type="arrow"/>
-          </a:ln>
-        </p:spPr>
-        <p:style>
-          <a:lnRef idx="2">
-            <a:schemeClr val="accent4"/>
-          </a:lnRef>
-          <a:fillRef idx="0">
-            <a:schemeClr val="accent4"/>
-          </a:fillRef>
-          <a:effectRef idx="1">
-            <a:schemeClr val="accent4"/>
-          </a:effectRef>
-          <a:fontRef idx="minor">
-            <a:schemeClr val="tx1"/>
-          </a:fontRef>
-        </p:style>
-      </p:cxnSp>
-      <p:cxnSp>
-        <p:nvCxnSpPr>
-          <p:cNvPr id="240" name="Elbow Connector 239"/>
-          <p:cNvCxnSpPr>
-            <a:endCxn id="235" idx="1"/>
-          </p:cNvCxnSpPr>
-          <p:nvPr/>
-        </p:nvCxnSpPr>
-        <p:spPr>
-          <a:xfrm rot="5400000" flipH="1" flipV="1">
-            <a:off x="6538233" y="6289811"/>
-            <a:ext cx="478926" cy="229912"/>
-          </a:xfrm>
-          <a:prstGeom prst="bentConnector2">
-            <a:avLst/>
-          </a:prstGeom>
-          <a:ln>
-            <a:tailEnd type="arrow"/>
-          </a:ln>
-        </p:spPr>
-        <p:style>
-          <a:lnRef idx="2">
-            <a:schemeClr val="accent4"/>
-          </a:lnRef>
-          <a:fillRef idx="0">
-            <a:schemeClr val="accent4"/>
-          </a:fillRef>
-          <a:effectRef idx="1">
-            <a:schemeClr val="accent4"/>
-          </a:effectRef>
-          <a:fontRef idx="minor">
-            <a:schemeClr val="tx1"/>
-          </a:fontRef>
-        </p:style>
-      </p:cxnSp>
-      <p:cxnSp>
-        <p:nvCxnSpPr>
-          <p:cNvPr id="241" name="Elbow Connector 240"/>
-          <p:cNvCxnSpPr>
-            <a:stCxn id="235" idx="3"/>
-            <a:endCxn id="222" idx="3"/>
-          </p:cNvCxnSpPr>
-          <p:nvPr/>
-        </p:nvCxnSpPr>
-        <p:spPr>
-          <a:xfrm flipH="1">
-            <a:off x="7740352" y="6165304"/>
-            <a:ext cx="178637" cy="1239756"/>
-          </a:xfrm>
-          <a:prstGeom prst="bentConnector3">
-            <a:avLst>
-              <a:gd name="adj1" fmla="val -127969"/>
-            </a:avLst>
-          </a:prstGeom>
-          <a:ln>
-            <a:tailEnd type="arrow"/>
-          </a:ln>
-        </p:spPr>
-        <p:style>
-          <a:lnRef idx="2">
-            <a:schemeClr val="accent4"/>
-          </a:lnRef>
-          <a:fillRef idx="0">
-            <a:schemeClr val="accent4"/>
-          </a:fillRef>
-          <a:effectRef idx="1">
-            <a:schemeClr val="accent4"/>
-          </a:effectRef>
-          <a:fontRef idx="minor">
-            <a:schemeClr val="tx1"/>
-          </a:fontRef>
-        </p:style>
-      </p:cxnSp>
-      <p:cxnSp>
-        <p:nvCxnSpPr>
-          <p:cNvPr id="242" name="Elbow Connector 241"/>
-          <p:cNvCxnSpPr>
-            <a:stCxn id="232" idx="2"/>
-            <a:endCxn id="217" idx="2"/>
-          </p:cNvCxnSpPr>
-          <p:nvPr/>
-        </p:nvCxnSpPr>
-        <p:spPr>
-          <a:xfrm rot="5400000">
-            <a:off x="6209564" y="6395036"/>
-            <a:ext cx="57659" cy="1859972"/>
-          </a:xfrm>
-          <a:prstGeom prst="bentConnector2">
-            <a:avLst/>
-          </a:prstGeom>
-          <a:ln>
-            <a:tailEnd type="arrow"/>
-          </a:ln>
-        </p:spPr>
-        <p:style>
-          <a:lnRef idx="2">
-            <a:schemeClr val="accent4"/>
-          </a:lnRef>
-          <a:fillRef idx="0">
-            <a:schemeClr val="accent4"/>
-          </a:fillRef>
-          <a:effectRef idx="1">
-            <a:schemeClr val="accent4"/>
           </a:effectRef>
           <a:fontRef idx="minor">
             <a:schemeClr val="tx1"/>
@@ -16321,12 +15422,12 @@
         </p:nvCxnSpPr>
         <p:spPr>
           <a:xfrm rot="10800000">
-            <a:off x="791990" y="1756278"/>
-            <a:ext cx="4208640" cy="5597574"/>
+            <a:off x="791991" y="1756279"/>
+            <a:ext cx="4068043" cy="5540825"/>
           </a:xfrm>
           <a:prstGeom prst="bentConnector3">
             <a:avLst>
-              <a:gd name="adj1" fmla="val 132235"/>
+              <a:gd name="adj1" fmla="val 105619"/>
             </a:avLst>
           </a:prstGeom>
           <a:ln>
@@ -16359,7 +15460,7 @@
         </p:nvCxnSpPr>
         <p:spPr>
           <a:xfrm flipV="1">
-            <a:off x="7734060" y="4134556"/>
+            <a:off x="7998685" y="3642470"/>
             <a:ext cx="2565000" cy="2950303"/>
           </a:xfrm>
           <a:prstGeom prst="bentConnector2">
@@ -16377,6 +15478,1473 @@
             <a:schemeClr val="dk1"/>
           </a:fillRef>
           <a:effectRef idx="0">
+            <a:schemeClr val="dk1"/>
+          </a:effectRef>
+          <a:fontRef idx="minor">
+            <a:schemeClr val="tx1"/>
+          </a:fontRef>
+        </p:style>
+      </p:cxnSp>
+      <p:grpSp>
+        <p:nvGrpSpPr>
+          <p:cNvPr id="26" name="Group 25"/>
+          <p:cNvGrpSpPr/>
+          <p:nvPr/>
+        </p:nvGrpSpPr>
+        <p:grpSpPr>
+          <a:xfrm>
+            <a:off x="4798456" y="4633391"/>
+            <a:ext cx="4983364" cy="3128059"/>
+            <a:chOff x="4798456" y="4633391"/>
+            <a:chExt cx="4983364" cy="3128059"/>
+          </a:xfrm>
+        </p:grpSpPr>
+        <p:grpSp>
+          <p:nvGrpSpPr>
+            <p:cNvPr id="11" name="Group 10"/>
+            <p:cNvGrpSpPr/>
+            <p:nvPr/>
+          </p:nvGrpSpPr>
+          <p:grpSpPr>
+            <a:xfrm>
+              <a:off x="4798456" y="4633391"/>
+              <a:ext cx="4983364" cy="3128059"/>
+              <a:chOff x="4701204" y="4693429"/>
+              <a:chExt cx="4983364" cy="3128059"/>
+            </a:xfrm>
+          </p:grpSpPr>
+          <p:grpSp>
+            <p:nvGrpSpPr>
+              <p:cNvPr id="10" name="Group 9"/>
+              <p:cNvGrpSpPr/>
+              <p:nvPr/>
+            </p:nvGrpSpPr>
+            <p:grpSpPr>
+              <a:xfrm>
+                <a:off x="4701204" y="4693429"/>
+                <a:ext cx="4983364" cy="3128059"/>
+                <a:chOff x="4701204" y="4693429"/>
+                <a:chExt cx="4983364" cy="3128059"/>
+              </a:xfrm>
+            </p:grpSpPr>
+            <p:grpSp>
+              <p:nvGrpSpPr>
+                <p:cNvPr id="2" name="Group 1"/>
+                <p:cNvGrpSpPr/>
+                <p:nvPr/>
+              </p:nvGrpSpPr>
+              <p:grpSpPr>
+                <a:xfrm>
+                  <a:off x="4762780" y="4693429"/>
+                  <a:ext cx="4921788" cy="3128059"/>
+                  <a:chOff x="4595407" y="4762148"/>
+                  <a:chExt cx="4921788" cy="3128059"/>
+                </a:xfrm>
+              </p:grpSpPr>
+              <p:grpSp>
+                <p:nvGrpSpPr>
+                  <p:cNvPr id="231" name="Group 230"/>
+                  <p:cNvGrpSpPr/>
+                  <p:nvPr/>
+                </p:nvGrpSpPr>
+                <p:grpSpPr>
+                  <a:xfrm>
+                    <a:off x="4595407" y="4762148"/>
+                    <a:ext cx="4921788" cy="3128059"/>
+                    <a:chOff x="4718588" y="5114446"/>
+                    <a:chExt cx="4921788" cy="3128059"/>
+                  </a:xfrm>
+                </p:grpSpPr>
+                <p:sp>
+                  <p:nvSpPr>
+                    <p:cNvPr id="215" name="Rectangle 214"/>
+                    <p:cNvSpPr/>
+                    <p:nvPr/>
+                  </p:nvSpPr>
+                  <p:spPr>
+                    <a:xfrm>
+                      <a:off x="4817888" y="5203745"/>
+                      <a:ext cx="4250036" cy="2919750"/>
+                    </a:xfrm>
+                    <a:prstGeom prst="rect">
+                      <a:avLst/>
+                    </a:prstGeom>
+                    <a:solidFill>
+                      <a:schemeClr val="accent1">
+                        <a:alpha val="19000"/>
+                      </a:schemeClr>
+                    </a:solidFill>
+                  </p:spPr>
+                  <p:style>
+                    <a:lnRef idx="2">
+                      <a:schemeClr val="accent1">
+                        <a:shade val="50000"/>
+                      </a:schemeClr>
+                    </a:lnRef>
+                    <a:fillRef idx="1">
+                      <a:schemeClr val="accent1"/>
+                    </a:fillRef>
+                    <a:effectRef idx="0">
+                      <a:schemeClr val="accent1"/>
+                    </a:effectRef>
+                    <a:fontRef idx="minor">
+                      <a:schemeClr val="lt1"/>
+                    </a:fontRef>
+                  </p:style>
+                  <p:txBody>
+                    <a:bodyPr rtlCol="1" anchor="ctr"/>
+                    <a:lstStyle/>
+                    <a:p>
+                      <a:pPr algn="ctr"/>
+                      <a:endParaRPr lang="he-IL"/>
+                    </a:p>
+                  </p:txBody>
+                </p:sp>
+                <p:sp>
+                  <p:nvSpPr>
+                    <p:cNvPr id="217" name="TextBox 216"/>
+                    <p:cNvSpPr txBox="1"/>
+                    <p:nvPr/>
+                  </p:nvSpPr>
+                  <p:spPr>
+                    <a:xfrm rot="16200000">
+                      <a:off x="4408130" y="7624269"/>
+                      <a:ext cx="928694" cy="307777"/>
+                    </a:xfrm>
+                    <a:prstGeom prst="rect">
+                      <a:avLst/>
+                    </a:prstGeom>
+                  </p:spPr>
+                  <p:style>
+                    <a:lnRef idx="0">
+                      <a:schemeClr val="dk1"/>
+                    </a:lnRef>
+                    <a:fillRef idx="3">
+                      <a:schemeClr val="dk1"/>
+                    </a:fillRef>
+                    <a:effectRef idx="3">
+                      <a:schemeClr val="dk1"/>
+                    </a:effectRef>
+                    <a:fontRef idx="minor">
+                      <a:schemeClr val="lt1"/>
+                    </a:fontRef>
+                  </p:style>
+                  <p:txBody>
+                    <a:bodyPr wrap="square" rtlCol="1">
+                      <a:spAutoFit/>
+                    </a:bodyPr>
+                    <a:lstStyle/>
+                    <a:p>
+                      <a:pPr algn="ctr"/>
+                      <a:r>
+                        <a:rPr lang="en-US" sz="1400" b="1" dirty="0" smtClean="0"/>
+                        <a:t>WBM</a:t>
+                      </a:r>
+                      <a:endParaRPr lang="he-IL" sz="1400" b="1" dirty="0"/>
+                    </a:p>
+                  </p:txBody>
+                </p:sp>
+                <p:sp>
+                  <p:nvSpPr>
+                    <p:cNvPr id="221" name="Rounded Rectangle 220"/>
+                    <p:cNvSpPr/>
+                    <p:nvPr/>
+                  </p:nvSpPr>
+                  <p:spPr>
+                    <a:xfrm>
+                      <a:off x="8116379" y="5203257"/>
+                      <a:ext cx="1523997" cy="500066"/>
+                    </a:xfrm>
+                    <a:prstGeom prst="roundRect">
+                      <a:avLst/>
+                    </a:prstGeom>
+                  </p:spPr>
+                  <p:style>
+                    <a:lnRef idx="0">
+                      <a:schemeClr val="accent2"/>
+                    </a:lnRef>
+                    <a:fillRef idx="3">
+                      <a:schemeClr val="accent2"/>
+                    </a:fillRef>
+                    <a:effectRef idx="3">
+                      <a:schemeClr val="accent2"/>
+                    </a:effectRef>
+                    <a:fontRef idx="minor">
+                      <a:schemeClr val="lt1"/>
+                    </a:fontRef>
+                  </p:style>
+                  <p:txBody>
+                    <a:bodyPr rtlCol="1" anchor="ctr"/>
+                    <a:lstStyle/>
+                    <a:p>
+                      <a:pPr algn="ctr"/>
+                      <a:r>
+                        <a:rPr lang="en-US" dirty="0" smtClean="0"/>
+                        <a:t>Image Manipulation</a:t>
+                      </a:r>
+                    </a:p>
+                  </p:txBody>
+                </p:sp>
+                <p:sp>
+                  <p:nvSpPr>
+                    <p:cNvPr id="225" name="TextBox 224"/>
+                    <p:cNvSpPr txBox="1"/>
+                    <p:nvPr/>
+                  </p:nvSpPr>
+                  <p:spPr>
+                    <a:xfrm>
+                      <a:off x="5839764" y="5506201"/>
+                      <a:ext cx="1087665" cy="584775"/>
+                    </a:xfrm>
+                    <a:prstGeom prst="rect">
+                      <a:avLst/>
+                    </a:prstGeom>
+                  </p:spPr>
+                  <p:style>
+                    <a:lnRef idx="0">
+                      <a:schemeClr val="accent6"/>
+                    </a:lnRef>
+                    <a:fillRef idx="3">
+                      <a:schemeClr val="accent6"/>
+                    </a:fillRef>
+                    <a:effectRef idx="3">
+                      <a:schemeClr val="accent6"/>
+                    </a:effectRef>
+                    <a:fontRef idx="minor">
+                      <a:schemeClr val="lt1"/>
+                    </a:fontRef>
+                  </p:style>
+                  <p:txBody>
+                    <a:bodyPr wrap="square" rtlCol="1">
+                      <a:spAutoFit/>
+                    </a:bodyPr>
+                    <a:lstStyle/>
+                    <a:p>
+                      <a:pPr algn="ctr" rtl="0"/>
+                      <a:r>
+                        <a:rPr lang="en-US" sz="1600" dirty="0" err="1" smtClean="0"/>
+                        <a:t>Addr</a:t>
+                      </a:r>
+                      <a:r>
+                        <a:rPr lang="en-US" sz="1600" dirty="0" smtClean="0"/>
+                        <a:t> Calculator</a:t>
+                      </a:r>
+                      <a:endParaRPr lang="he-IL" sz="1600" dirty="0"/>
+                    </a:p>
+                  </p:txBody>
+                </p:sp>
+                <p:sp>
+                  <p:nvSpPr>
+                    <p:cNvPr id="226" name="TextBox 225"/>
+                    <p:cNvSpPr txBox="1"/>
+                    <p:nvPr/>
+                  </p:nvSpPr>
+                  <p:spPr>
+                    <a:xfrm>
+                      <a:off x="8235363" y="5733258"/>
+                      <a:ext cx="1372877" cy="276999"/>
+                    </a:xfrm>
+                    <a:prstGeom prst="rect">
+                      <a:avLst/>
+                    </a:prstGeom>
+                  </p:spPr>
+                  <p:style>
+                    <a:lnRef idx="0">
+                      <a:schemeClr val="accent3"/>
+                    </a:lnRef>
+                    <a:fillRef idx="3">
+                      <a:schemeClr val="accent3"/>
+                    </a:fillRef>
+                    <a:effectRef idx="3">
+                      <a:schemeClr val="accent3"/>
+                    </a:effectRef>
+                    <a:fontRef idx="minor">
+                      <a:schemeClr val="lt1"/>
+                    </a:fontRef>
+                  </p:style>
+                  <p:txBody>
+                    <a:bodyPr wrap="square" rtlCol="1">
+                      <a:spAutoFit/>
+                    </a:bodyPr>
+                    <a:lstStyle/>
+                    <a:p>
+                      <a:pPr algn="ctr" rtl="0"/>
+                      <a:r>
+                        <a:rPr lang="en-US" sz="1200" b="1" dirty="0" err="1" smtClean="0">
+                          <a:solidFill>
+                            <a:schemeClr val="tx1"/>
+                          </a:solidFill>
+                        </a:rPr>
+                        <a:t>Param</a:t>
+                      </a:r>
+                      <a:r>
+                        <a:rPr lang="en-US" sz="1200" b="1" dirty="0" smtClean="0">
+                          <a:solidFill>
+                            <a:schemeClr val="tx1"/>
+                          </a:solidFill>
+                        </a:rPr>
+                        <a:t> Registers</a:t>
+                      </a:r>
+                    </a:p>
+                  </p:txBody>
+                </p:sp>
+                <p:sp>
+                  <p:nvSpPr>
+                    <p:cNvPr id="227" name="TextBox 226"/>
+                    <p:cNvSpPr txBox="1"/>
+                    <p:nvPr/>
+                  </p:nvSpPr>
+                  <p:spPr>
+                    <a:xfrm>
+                      <a:off x="5798708" y="5114446"/>
+                      <a:ext cx="928694" cy="307777"/>
+                    </a:xfrm>
+                    <a:prstGeom prst="rect">
+                      <a:avLst/>
+                    </a:prstGeom>
+                    <a:ln/>
+                  </p:spPr>
+                  <p:style>
+                    <a:lnRef idx="0">
+                      <a:schemeClr val="accent1"/>
+                    </a:lnRef>
+                    <a:fillRef idx="3">
+                      <a:schemeClr val="accent1"/>
+                    </a:fillRef>
+                    <a:effectRef idx="3">
+                      <a:schemeClr val="accent1"/>
+                    </a:effectRef>
+                    <a:fontRef idx="minor">
+                      <a:schemeClr val="lt1"/>
+                    </a:fontRef>
+                  </p:style>
+                  <p:txBody>
+                    <a:bodyPr wrap="square" rtlCol="1">
+                      <a:spAutoFit/>
+                    </a:bodyPr>
+                    <a:lstStyle/>
+                    <a:p>
+                      <a:pPr algn="ctr"/>
+                      <a:r>
+                        <a:rPr lang="en-US" sz="1400" dirty="0" smtClean="0"/>
+                        <a:t>WBS</a:t>
+                      </a:r>
+                      <a:endParaRPr lang="he-IL" sz="1400" dirty="0"/>
+                    </a:p>
+                  </p:txBody>
+                </p:sp>
+              </p:grpSp>
+              <p:grpSp>
+                <p:nvGrpSpPr>
+                  <p:cNvPr id="9" name="Group 8"/>
+                  <p:cNvGrpSpPr/>
+                  <p:nvPr/>
+                </p:nvGrpSpPr>
+                <p:grpSpPr>
+                  <a:xfrm>
+                    <a:off x="5580112" y="6306031"/>
+                    <a:ext cx="2160240" cy="1206186"/>
+                    <a:chOff x="2555776" y="5247150"/>
+                    <a:chExt cx="2160240" cy="1206186"/>
+                  </a:xfrm>
+                </p:grpSpPr>
+                <p:sp>
+                  <p:nvSpPr>
+                    <p:cNvPr id="181" name="TextBox 180"/>
+                    <p:cNvSpPr txBox="1"/>
+                    <p:nvPr/>
+                  </p:nvSpPr>
+                  <p:spPr>
+                    <a:xfrm>
+                      <a:off x="2555776" y="5247150"/>
+                      <a:ext cx="2153948" cy="830997"/>
+                    </a:xfrm>
+                    <a:prstGeom prst="rect">
+                      <a:avLst/>
+                    </a:prstGeom>
+                  </p:spPr>
+                  <p:style>
+                    <a:lnRef idx="0">
+                      <a:schemeClr val="accent6"/>
+                    </a:lnRef>
+                    <a:fillRef idx="3">
+                      <a:schemeClr val="accent6"/>
+                    </a:fillRef>
+                    <a:effectRef idx="3">
+                      <a:schemeClr val="accent6"/>
+                    </a:effectRef>
+                    <a:fontRef idx="minor">
+                      <a:schemeClr val="lt1"/>
+                    </a:fontRef>
+                  </p:style>
+                  <p:txBody>
+                    <a:bodyPr wrap="square" rtlCol="1">
+                      <a:spAutoFit/>
+                    </a:bodyPr>
+                    <a:lstStyle/>
+                    <a:p>
+                      <a:pPr algn="ctr" rtl="0"/>
+                      <a:r>
+                        <a:rPr lang="en-US" sz="1600" dirty="0" err="1" smtClean="0"/>
+                        <a:t>ImgMan</a:t>
+                      </a:r>
+                      <a:r>
+                        <a:rPr lang="en-US" sz="1600" dirty="0" smtClean="0"/>
+                        <a:t> Manger</a:t>
+                      </a:r>
+                      <a:br>
+                        <a:rPr lang="en-US" sz="1600" dirty="0" smtClean="0"/>
+                      </a:br>
+                      <a:endParaRPr lang="en-US" sz="1600" dirty="0" smtClean="0"/>
+                    </a:p>
+                    <a:p>
+                      <a:pPr algn="ctr" rtl="0"/>
+                      <a:endParaRPr lang="he-IL" sz="1600" dirty="0"/>
+                    </a:p>
+                  </p:txBody>
+                </p:sp>
+                <p:sp>
+                  <p:nvSpPr>
+                    <p:cNvPr id="222" name="Rounded Rectangle 221"/>
+                    <p:cNvSpPr/>
+                    <p:nvPr/>
+                  </p:nvSpPr>
+                  <p:spPr>
+                    <a:xfrm>
+                      <a:off x="4288712" y="6239022"/>
+                      <a:ext cx="427304" cy="214314"/>
+                    </a:xfrm>
+                    <a:prstGeom prst="roundRect">
+                      <a:avLst/>
+                    </a:prstGeom>
+                  </p:spPr>
+                  <p:style>
+                    <a:lnRef idx="2">
+                      <a:schemeClr val="dk1"/>
+                    </a:lnRef>
+                    <a:fillRef idx="1">
+                      <a:schemeClr val="lt1"/>
+                    </a:fillRef>
+                    <a:effectRef idx="0">
+                      <a:schemeClr val="dk1"/>
+                    </a:effectRef>
+                    <a:fontRef idx="minor">
+                      <a:schemeClr val="dk1"/>
+                    </a:fontRef>
+                  </p:style>
+                  <p:txBody>
+                    <a:bodyPr rtlCol="1" anchor="ctr"/>
+                    <a:lstStyle/>
+                    <a:p>
+                      <a:pPr algn="ctr"/>
+                      <a:r>
+                        <a:rPr lang="en-US" sz="800" dirty="0" smtClean="0"/>
+                        <a:t>RAM</a:t>
+                      </a:r>
+                      <a:endParaRPr lang="he-IL" sz="800" dirty="0"/>
+                    </a:p>
+                  </p:txBody>
+                </p:sp>
+                <p:sp>
+                  <p:nvSpPr>
+                    <p:cNvPr id="230" name="TextBox 229"/>
+                    <p:cNvSpPr txBox="1"/>
+                    <p:nvPr/>
+                  </p:nvSpPr>
+                  <p:spPr>
+                    <a:xfrm>
+                      <a:off x="2786448" y="5975702"/>
+                      <a:ext cx="728084" cy="261610"/>
+                    </a:xfrm>
+                    <a:prstGeom prst="rect">
+                      <a:avLst/>
+                    </a:prstGeom>
+                  </p:spPr>
+                  <p:style>
+                    <a:lnRef idx="1">
+                      <a:schemeClr val="dk1"/>
+                    </a:lnRef>
+                    <a:fillRef idx="2">
+                      <a:schemeClr val="dk1"/>
+                    </a:fillRef>
+                    <a:effectRef idx="1">
+                      <a:schemeClr val="dk1"/>
+                    </a:effectRef>
+                    <a:fontRef idx="minor">
+                      <a:schemeClr val="dk1"/>
+                    </a:fontRef>
+                  </p:style>
+                  <p:txBody>
+                    <a:bodyPr wrap="none" rtlCol="1">
+                      <a:spAutoFit/>
+                    </a:bodyPr>
+                    <a:lstStyle/>
+                    <a:p>
+                      <a:r>
+                        <a:rPr lang="en-US" sz="1100" dirty="0" err="1" smtClean="0"/>
+                        <a:t>ReadProc</a:t>
+                      </a:r>
+                      <a:endParaRPr lang="he-IL" sz="1100" dirty="0"/>
+                    </a:p>
+                  </p:txBody>
+                </p:sp>
+                <p:sp>
+                  <p:nvSpPr>
+                    <p:cNvPr id="232" name="TextBox 231"/>
+                    <p:cNvSpPr txBox="1"/>
+                    <p:nvPr/>
+                  </p:nvSpPr>
+                  <p:spPr>
+                    <a:xfrm>
+                      <a:off x="3762367" y="5975702"/>
+                      <a:ext cx="763351" cy="261610"/>
+                    </a:xfrm>
+                    <a:prstGeom prst="rect">
+                      <a:avLst/>
+                    </a:prstGeom>
+                  </p:spPr>
+                  <p:style>
+                    <a:lnRef idx="1">
+                      <a:schemeClr val="dk1"/>
+                    </a:lnRef>
+                    <a:fillRef idx="2">
+                      <a:schemeClr val="dk1"/>
+                    </a:fillRef>
+                    <a:effectRef idx="1">
+                      <a:schemeClr val="dk1"/>
+                    </a:effectRef>
+                    <a:fontRef idx="minor">
+                      <a:schemeClr val="dk1"/>
+                    </a:fontRef>
+                  </p:style>
+                  <p:txBody>
+                    <a:bodyPr wrap="none" rtlCol="1">
+                      <a:spAutoFit/>
+                    </a:bodyPr>
+                    <a:lstStyle/>
+                    <a:p>
+                      <a:r>
+                        <a:rPr lang="en-US" sz="1100" dirty="0" err="1" smtClean="0"/>
+                        <a:t>WriteProc</a:t>
+                      </a:r>
+                      <a:endParaRPr lang="he-IL" sz="1100" dirty="0"/>
+                    </a:p>
+                  </p:txBody>
+                </p:sp>
+              </p:grpSp>
+              <p:cxnSp>
+                <p:nvCxnSpPr>
+                  <p:cNvPr id="233" name="Elbow Connector 232"/>
+                  <p:cNvCxnSpPr>
+                    <a:stCxn id="230" idx="1"/>
+                    <a:endCxn id="211" idx="2"/>
+                  </p:cNvCxnSpPr>
+                  <p:nvPr/>
+                </p:nvCxnSpPr>
+                <p:spPr>
+                  <a:xfrm rot="10800000">
+                    <a:off x="4841610" y="5721700"/>
+                    <a:ext cx="969175" cy="1443688"/>
+                  </a:xfrm>
+                  <a:prstGeom prst="bentConnector3">
+                    <a:avLst>
+                      <a:gd name="adj1" fmla="val 50000"/>
+                    </a:avLst>
+                  </a:prstGeom>
+                  <a:ln>
+                    <a:tailEnd type="arrow"/>
+                  </a:ln>
+                </p:spPr>
+                <p:style>
+                  <a:lnRef idx="2">
+                    <a:schemeClr val="accent4"/>
+                  </a:lnRef>
+                  <a:fillRef idx="0">
+                    <a:schemeClr val="accent4"/>
+                  </a:fillRef>
+                  <a:effectRef idx="1">
+                    <a:schemeClr val="accent4"/>
+                  </a:effectRef>
+                  <a:fontRef idx="minor">
+                    <a:schemeClr val="tx1"/>
+                  </a:fontRef>
+                </p:style>
+              </p:cxnSp>
+              <p:sp>
+                <p:nvSpPr>
+                  <p:cNvPr id="235" name="TextBox 234"/>
+                  <p:cNvSpPr txBox="1"/>
+                  <p:nvPr/>
+                </p:nvSpPr>
+                <p:spPr>
+                  <a:xfrm>
+                    <a:off x="6892652" y="5679445"/>
+                    <a:ext cx="1026337" cy="338554"/>
+                  </a:xfrm>
+                  <a:prstGeom prst="rect">
+                    <a:avLst/>
+                  </a:prstGeom>
+                </p:spPr>
+                <p:style>
+                  <a:lnRef idx="0">
+                    <a:schemeClr val="accent6"/>
+                  </a:lnRef>
+                  <a:fillRef idx="3">
+                    <a:schemeClr val="accent6"/>
+                  </a:fillRef>
+                  <a:effectRef idx="3">
+                    <a:schemeClr val="accent6"/>
+                  </a:effectRef>
+                  <a:fontRef idx="minor">
+                    <a:schemeClr val="lt1"/>
+                  </a:fontRef>
+                </p:style>
+                <p:txBody>
+                  <a:bodyPr wrap="square" rtlCol="1">
+                    <a:spAutoFit/>
+                  </a:bodyPr>
+                  <a:lstStyle/>
+                  <a:p>
+                    <a:pPr algn="ctr" rtl="0"/>
+                    <a:r>
+                      <a:rPr lang="en-US" sz="1600" dirty="0" err="1" smtClean="0"/>
+                      <a:t>Biliniar</a:t>
+                    </a:r>
+                    <a:endParaRPr lang="he-IL" sz="1600" dirty="0"/>
+                  </a:p>
+                </p:txBody>
+              </p:sp>
+              <p:cxnSp>
+                <p:nvCxnSpPr>
+                  <p:cNvPr id="239" name="Elbow Connector 238"/>
+                  <p:cNvCxnSpPr>
+                    <a:stCxn id="181" idx="0"/>
+                    <a:endCxn id="225" idx="2"/>
+                  </p:cNvCxnSpPr>
+                  <p:nvPr/>
+                </p:nvCxnSpPr>
+                <p:spPr>
+                  <a:xfrm rot="16200000" flipV="1">
+                    <a:off x="6175075" y="5824020"/>
+                    <a:ext cx="567353" cy="396670"/>
+                  </a:xfrm>
+                  <a:prstGeom prst="bentConnector3">
+                    <a:avLst>
+                      <a:gd name="adj1" fmla="val 50000"/>
+                    </a:avLst>
+                  </a:prstGeom>
+                  <a:ln>
+                    <a:tailEnd type="arrow"/>
+                  </a:ln>
+                </p:spPr>
+                <p:style>
+                  <a:lnRef idx="2">
+                    <a:schemeClr val="accent4"/>
+                  </a:lnRef>
+                  <a:fillRef idx="0">
+                    <a:schemeClr val="accent4"/>
+                  </a:fillRef>
+                  <a:effectRef idx="1">
+                    <a:schemeClr val="accent4"/>
+                  </a:effectRef>
+                  <a:fontRef idx="minor">
+                    <a:schemeClr val="tx1"/>
+                  </a:fontRef>
+                </p:style>
+              </p:cxnSp>
+              <p:cxnSp>
+                <p:nvCxnSpPr>
+                  <p:cNvPr id="240" name="Elbow Connector 239"/>
+                  <p:cNvCxnSpPr>
+                    <a:endCxn id="235" idx="1"/>
+                  </p:cNvCxnSpPr>
+                  <p:nvPr/>
+                </p:nvCxnSpPr>
+                <p:spPr>
+                  <a:xfrm rot="5400000" flipH="1" flipV="1">
+                    <a:off x="6538233" y="5973229"/>
+                    <a:ext cx="478926" cy="229912"/>
+                  </a:xfrm>
+                  <a:prstGeom prst="bentConnector2">
+                    <a:avLst/>
+                  </a:prstGeom>
+                  <a:ln>
+                    <a:tailEnd type="arrow"/>
+                  </a:ln>
+                </p:spPr>
+                <p:style>
+                  <a:lnRef idx="2">
+                    <a:schemeClr val="accent4"/>
+                  </a:lnRef>
+                  <a:fillRef idx="0">
+                    <a:schemeClr val="accent4"/>
+                  </a:fillRef>
+                  <a:effectRef idx="1">
+                    <a:schemeClr val="accent4"/>
+                  </a:effectRef>
+                  <a:fontRef idx="minor">
+                    <a:schemeClr val="tx1"/>
+                  </a:fontRef>
+                </p:style>
+              </p:cxnSp>
+              <p:cxnSp>
+                <p:nvCxnSpPr>
+                  <p:cNvPr id="241" name="Elbow Connector 240"/>
+                  <p:cNvCxnSpPr>
+                    <a:stCxn id="235" idx="3"/>
+                    <a:endCxn id="222" idx="3"/>
+                  </p:cNvCxnSpPr>
+                  <p:nvPr/>
+                </p:nvCxnSpPr>
+                <p:spPr>
+                  <a:xfrm flipH="1">
+                    <a:off x="7740352" y="5848722"/>
+                    <a:ext cx="178637" cy="1556338"/>
+                  </a:xfrm>
+                  <a:prstGeom prst="bentConnector3">
+                    <a:avLst>
+                      <a:gd name="adj1" fmla="val -127969"/>
+                    </a:avLst>
+                  </a:prstGeom>
+                  <a:ln>
+                    <a:tailEnd type="arrow"/>
+                  </a:ln>
+                </p:spPr>
+                <p:style>
+                  <a:lnRef idx="2">
+                    <a:schemeClr val="accent4"/>
+                  </a:lnRef>
+                  <a:fillRef idx="0">
+                    <a:schemeClr val="accent4"/>
+                  </a:fillRef>
+                  <a:effectRef idx="1">
+                    <a:schemeClr val="accent4"/>
+                  </a:effectRef>
+                  <a:fontRef idx="minor">
+                    <a:schemeClr val="tx1"/>
+                  </a:fontRef>
+                </p:style>
+              </p:cxnSp>
+              <p:cxnSp>
+                <p:nvCxnSpPr>
+                  <p:cNvPr id="242" name="Elbow Connector 241"/>
+                  <p:cNvCxnSpPr>
+                    <a:stCxn id="232" idx="2"/>
+                    <a:endCxn id="217" idx="2"/>
+                  </p:cNvCxnSpPr>
+                  <p:nvPr/>
+                </p:nvCxnSpPr>
+                <p:spPr>
+                  <a:xfrm rot="5400000">
+                    <a:off x="5970949" y="6228429"/>
+                    <a:ext cx="129667" cy="2265194"/>
+                  </a:xfrm>
+                  <a:prstGeom prst="bentConnector2">
+                    <a:avLst/>
+                  </a:prstGeom>
+                  <a:ln>
+                    <a:tailEnd type="arrow"/>
+                  </a:ln>
+                </p:spPr>
+                <p:style>
+                  <a:lnRef idx="2">
+                    <a:schemeClr val="accent4"/>
+                  </a:lnRef>
+                  <a:fillRef idx="0">
+                    <a:schemeClr val="accent4"/>
+                  </a:fillRef>
+                  <a:effectRef idx="1">
+                    <a:schemeClr val="accent4"/>
+                  </a:effectRef>
+                  <a:fontRef idx="minor">
+                    <a:schemeClr val="tx1"/>
+                  </a:fontRef>
+                </p:style>
+              </p:cxnSp>
+            </p:grpSp>
+            <p:sp>
+              <p:nvSpPr>
+                <p:cNvPr id="211" name="TextBox 210"/>
+                <p:cNvSpPr txBox="1"/>
+                <p:nvPr/>
+              </p:nvSpPr>
+              <p:spPr>
+                <a:xfrm rot="16200000">
+                  <a:off x="4390746" y="5499092"/>
+                  <a:ext cx="928694" cy="307777"/>
+                </a:xfrm>
+                <a:prstGeom prst="rect">
+                  <a:avLst/>
+                </a:prstGeom>
+              </p:spPr>
+              <p:style>
+                <a:lnRef idx="0">
+                  <a:schemeClr val="dk1"/>
+                </a:lnRef>
+                <a:fillRef idx="3">
+                  <a:schemeClr val="dk1"/>
+                </a:fillRef>
+                <a:effectRef idx="3">
+                  <a:schemeClr val="dk1"/>
+                </a:effectRef>
+                <a:fontRef idx="minor">
+                  <a:schemeClr val="lt1"/>
+                </a:fontRef>
+              </p:style>
+              <p:txBody>
+                <a:bodyPr wrap="square" rtlCol="1">
+                  <a:spAutoFit/>
+                </a:bodyPr>
+                <a:lstStyle/>
+                <a:p>
+                  <a:pPr algn="ctr"/>
+                  <a:r>
+                    <a:rPr lang="en-US" sz="1400" b="1" dirty="0" smtClean="0"/>
+                    <a:t>WBM</a:t>
+                  </a:r>
+                  <a:endParaRPr lang="he-IL" sz="1400" b="1" dirty="0"/>
+                </a:p>
+              </p:txBody>
+            </p:sp>
+          </p:grpSp>
+          <p:sp>
+            <p:nvSpPr>
+              <p:cNvPr id="214" name="TextBox 213"/>
+              <p:cNvSpPr txBox="1"/>
+              <p:nvPr/>
+            </p:nvSpPr>
+            <p:spPr>
+              <a:xfrm>
+                <a:off x="9042128" y="5733256"/>
+                <a:ext cx="428627" cy="338554"/>
+              </a:xfrm>
+              <a:prstGeom prst="rect">
+                <a:avLst/>
+              </a:prstGeom>
+            </p:spPr>
+            <p:style>
+              <a:lnRef idx="0">
+                <a:schemeClr val="accent3"/>
+              </a:lnRef>
+              <a:fillRef idx="3">
+                <a:schemeClr val="accent3"/>
+              </a:fillRef>
+              <a:effectRef idx="3">
+                <a:schemeClr val="accent3"/>
+              </a:effectRef>
+              <a:fontRef idx="minor">
+                <a:schemeClr val="lt1"/>
+              </a:fontRef>
+            </p:style>
+            <p:txBody>
+              <a:bodyPr wrap="square" rtlCol="1">
+                <a:spAutoFit/>
+              </a:bodyPr>
+              <a:lstStyle/>
+              <a:p>
+                <a:pPr algn="ctr" rtl="0"/>
+                <a:r>
+                  <a:rPr lang="en-US" sz="800" dirty="0" smtClean="0">
+                    <a:solidFill>
+                      <a:schemeClr val="tx1"/>
+                    </a:solidFill>
+                  </a:rPr>
+                  <a:t>TYPE</a:t>
+                </a:r>
+              </a:p>
+              <a:p>
+                <a:pPr algn="ctr" rtl="0"/>
+                <a:r>
+                  <a:rPr lang="en-US" sz="800" dirty="0" err="1" smtClean="0">
+                    <a:solidFill>
+                      <a:schemeClr val="tx1"/>
+                    </a:solidFill>
+                  </a:rPr>
+                  <a:t>Reg</a:t>
+                </a:r>
+                <a:endParaRPr lang="he-IL" sz="800" dirty="0">
+                  <a:solidFill>
+                    <a:schemeClr val="tx1"/>
+                  </a:solidFill>
+                </a:endParaRPr>
+              </a:p>
+            </p:txBody>
+          </p:sp>
+        </p:grpSp>
+        <p:grpSp>
+          <p:nvGrpSpPr>
+            <p:cNvPr id="22" name="Group 21"/>
+            <p:cNvGrpSpPr/>
+            <p:nvPr/>
+          </p:nvGrpSpPr>
+          <p:grpSpPr>
+            <a:xfrm>
+              <a:off x="6868846" y="4787280"/>
+              <a:ext cx="2270534" cy="1055215"/>
+              <a:chOff x="6868846" y="4787280"/>
+              <a:chExt cx="2270534" cy="1055215"/>
+            </a:xfrm>
+          </p:grpSpPr>
+          <p:cxnSp>
+            <p:nvCxnSpPr>
+              <p:cNvPr id="216" name="Shape 194"/>
+              <p:cNvCxnSpPr>
+                <a:stCxn id="227" idx="3"/>
+                <a:endCxn id="214" idx="1"/>
+              </p:cNvCxnSpPr>
+              <p:nvPr/>
+            </p:nvCxnSpPr>
+            <p:spPr>
+              <a:xfrm>
+                <a:off x="6868846" y="4787280"/>
+                <a:ext cx="2270534" cy="1055215"/>
+              </a:xfrm>
+              <a:prstGeom prst="bentConnector3">
+                <a:avLst>
+                  <a:gd name="adj1" fmla="val 60068"/>
+                </a:avLst>
+              </a:prstGeom>
+              <a:ln>
+                <a:tailEnd type="arrow"/>
+              </a:ln>
+            </p:spPr>
+            <p:style>
+              <a:lnRef idx="1">
+                <a:schemeClr val="dk1"/>
+              </a:lnRef>
+              <a:fillRef idx="0">
+                <a:schemeClr val="dk1"/>
+              </a:fillRef>
+              <a:effectRef idx="0">
+                <a:schemeClr val="dk1"/>
+              </a:effectRef>
+              <a:fontRef idx="minor">
+                <a:schemeClr val="tx1"/>
+              </a:fontRef>
+            </p:style>
+          </p:cxnSp>
+          <p:cxnSp>
+            <p:nvCxnSpPr>
+              <p:cNvPr id="218" name="Shape 194"/>
+              <p:cNvCxnSpPr>
+                <a:stCxn id="227" idx="3"/>
+                <a:endCxn id="226" idx="1"/>
+              </p:cNvCxnSpPr>
+              <p:nvPr/>
+            </p:nvCxnSpPr>
+            <p:spPr>
+              <a:xfrm>
+                <a:off x="6868846" y="4787280"/>
+                <a:ext cx="1507961" cy="603423"/>
+              </a:xfrm>
+              <a:prstGeom prst="bentConnector3">
+                <a:avLst>
+                  <a:gd name="adj1" fmla="val 75266"/>
+                </a:avLst>
+              </a:prstGeom>
+              <a:ln>
+                <a:tailEnd type="arrow"/>
+              </a:ln>
+            </p:spPr>
+            <p:style>
+              <a:lnRef idx="1">
+                <a:schemeClr val="dk1"/>
+              </a:lnRef>
+              <a:fillRef idx="0">
+                <a:schemeClr val="dk1"/>
+              </a:fillRef>
+              <a:effectRef idx="0">
+                <a:schemeClr val="dk1"/>
+              </a:effectRef>
+              <a:fontRef idx="minor">
+                <a:schemeClr val="tx1"/>
+              </a:fontRef>
+            </p:style>
+          </p:cxnSp>
+        </p:grpSp>
+      </p:grpSp>
+    </p:spTree>
+    <p:extLst>
+      <p:ext uri="{BB962C8B-B14F-4D97-AF65-F5344CB8AC3E}">
+        <p14:creationId xmlns:p14="http://schemas.microsoft.com/office/powerpoint/2010/main" val="1906871029"/>
+      </p:ext>
+    </p:extLst>
+  </p:cSld>
+  <p:clrMapOvr>
+    <a:masterClrMapping/>
+  </p:clrMapOvr>
+</p:sld>
+</file>
+
+<file path=ppt/slides/slide11.xml><?xml version="1.0" encoding="utf-8"?>
+<p:sld xmlns:a="http://schemas.openxmlformats.org/drawingml/2006/main" xmlns:r="http://schemas.openxmlformats.org/officeDocument/2006/relationships" xmlns:p="http://schemas.openxmlformats.org/presentationml/2006/main">
+  <p:cSld>
+    <p:spTree>
+      <p:nvGrpSpPr>
+        <p:cNvPr id="1" name=""/>
+        <p:cNvGrpSpPr/>
+        <p:nvPr/>
+      </p:nvGrpSpPr>
+      <p:grpSpPr>
+        <a:xfrm>
+          <a:off x="0" y="0"/>
+          <a:ext cx="0" cy="0"/>
+          <a:chOff x="0" y="0"/>
+          <a:chExt cx="0" cy="0"/>
+        </a:xfrm>
+      </p:grpSpPr>
+      <p:sp>
+        <p:nvSpPr>
+          <p:cNvPr id="4" name="Rounded Rectangle 3"/>
+          <p:cNvSpPr/>
+          <p:nvPr/>
+        </p:nvSpPr>
+        <p:spPr>
+          <a:xfrm>
+            <a:off x="3142272" y="404664"/>
+            <a:ext cx="1816674" cy="792088"/>
+          </a:xfrm>
+          <a:prstGeom prst="roundRect">
+            <a:avLst/>
+          </a:prstGeom>
+          <a:ln/>
+        </p:spPr>
+        <p:style>
+          <a:lnRef idx="0">
+            <a:schemeClr val="accent4"/>
+          </a:lnRef>
+          <a:fillRef idx="3">
+            <a:schemeClr val="accent4"/>
+          </a:fillRef>
+          <a:effectRef idx="3">
+            <a:schemeClr val="accent4"/>
+          </a:effectRef>
+          <a:fontRef idx="minor">
+            <a:schemeClr val="lt1"/>
+          </a:fontRef>
+        </p:style>
+        <p:txBody>
+          <a:bodyPr rtlCol="1" anchor="ctr"/>
+          <a:lstStyle/>
+          <a:p>
+            <a:pPr algn="ctr"/>
+            <a:r>
+              <a:rPr lang="en-US" dirty="0" smtClean="0"/>
+              <a:t>TOP FSM</a:t>
+            </a:r>
+            <a:endParaRPr lang="he-IL" dirty="0"/>
+          </a:p>
+        </p:txBody>
+      </p:sp>
+      <p:sp>
+        <p:nvSpPr>
+          <p:cNvPr id="5" name="Rounded Rectangle 4"/>
+          <p:cNvSpPr/>
+          <p:nvPr/>
+        </p:nvSpPr>
+        <p:spPr>
+          <a:xfrm>
+            <a:off x="2151364" y="1825395"/>
+            <a:ext cx="1512168" cy="576064"/>
+          </a:xfrm>
+          <a:prstGeom prst="roundRect">
+            <a:avLst/>
+          </a:prstGeom>
+          <a:ln/>
+        </p:spPr>
+        <p:style>
+          <a:lnRef idx="0">
+            <a:schemeClr val="accent6"/>
+          </a:lnRef>
+          <a:fillRef idx="3">
+            <a:schemeClr val="accent6"/>
+          </a:fillRef>
+          <a:effectRef idx="3">
+            <a:schemeClr val="accent6"/>
+          </a:effectRef>
+          <a:fontRef idx="minor">
+            <a:schemeClr val="lt1"/>
+          </a:fontRef>
+        </p:style>
+        <p:txBody>
+          <a:bodyPr rtlCol="1" anchor="ctr"/>
+          <a:lstStyle/>
+          <a:p>
+            <a:pPr algn="ctr"/>
+            <a:r>
+              <a:rPr lang="en-US" dirty="0" smtClean="0"/>
+              <a:t>Read FSM</a:t>
+            </a:r>
+            <a:endParaRPr lang="he-IL" dirty="0"/>
+          </a:p>
+        </p:txBody>
+      </p:sp>
+      <p:sp>
+        <p:nvSpPr>
+          <p:cNvPr id="6" name="Rounded Rectangle 5"/>
+          <p:cNvSpPr/>
+          <p:nvPr/>
+        </p:nvSpPr>
+        <p:spPr>
+          <a:xfrm>
+            <a:off x="4438416" y="1827765"/>
+            <a:ext cx="1512168" cy="576064"/>
+          </a:xfrm>
+          <a:prstGeom prst="roundRect">
+            <a:avLst/>
+          </a:prstGeom>
+          <a:ln/>
+        </p:spPr>
+        <p:style>
+          <a:lnRef idx="0">
+            <a:schemeClr val="accent6"/>
+          </a:lnRef>
+          <a:fillRef idx="3">
+            <a:schemeClr val="accent6"/>
+          </a:fillRef>
+          <a:effectRef idx="3">
+            <a:schemeClr val="accent6"/>
+          </a:effectRef>
+          <a:fontRef idx="minor">
+            <a:schemeClr val="lt1"/>
+          </a:fontRef>
+        </p:style>
+        <p:txBody>
+          <a:bodyPr rtlCol="1" anchor="ctr"/>
+          <a:lstStyle/>
+          <a:p>
+            <a:pPr algn="ctr"/>
+            <a:r>
+              <a:rPr lang="en-US" dirty="0" smtClean="0"/>
+              <a:t>Write FSM</a:t>
+            </a:r>
+            <a:endParaRPr lang="he-IL" dirty="0"/>
+          </a:p>
+        </p:txBody>
+      </p:sp>
+      <p:sp>
+        <p:nvSpPr>
+          <p:cNvPr id="7" name="Rounded Rectangle 6"/>
+          <p:cNvSpPr/>
+          <p:nvPr/>
+        </p:nvSpPr>
+        <p:spPr>
+          <a:xfrm>
+            <a:off x="3059832" y="2924944"/>
+            <a:ext cx="1944216" cy="1351093"/>
+          </a:xfrm>
+          <a:prstGeom prst="roundRect">
+            <a:avLst/>
+          </a:prstGeom>
+          <a:ln/>
+        </p:spPr>
+        <p:style>
+          <a:lnRef idx="1">
+            <a:schemeClr val="accent2"/>
+          </a:lnRef>
+          <a:fillRef idx="2">
+            <a:schemeClr val="accent2"/>
+          </a:fillRef>
+          <a:effectRef idx="1">
+            <a:schemeClr val="accent2"/>
+          </a:effectRef>
+          <a:fontRef idx="minor">
+            <a:schemeClr val="dk1"/>
+          </a:fontRef>
+        </p:style>
+        <p:txBody>
+          <a:bodyPr rtlCol="1" anchor="ctr"/>
+          <a:lstStyle/>
+          <a:p>
+            <a:pPr algn="ctr"/>
+            <a:r>
+              <a:rPr lang="en-US" dirty="0" smtClean="0"/>
+              <a:t>Generic RAM </a:t>
+            </a:r>
+          </a:p>
+          <a:p>
+            <a:pPr algn="ctr"/>
+            <a:r>
+              <a:rPr lang="en-US" dirty="0" smtClean="0"/>
+              <a:t>(1024 Bytes)</a:t>
+            </a:r>
+            <a:endParaRPr lang="he-IL" dirty="0"/>
+          </a:p>
+        </p:txBody>
+      </p:sp>
+      <p:sp>
+        <p:nvSpPr>
+          <p:cNvPr id="8" name="Rounded Rectangle 7"/>
+          <p:cNvSpPr/>
+          <p:nvPr/>
+        </p:nvSpPr>
+        <p:spPr>
+          <a:xfrm>
+            <a:off x="6912260" y="368659"/>
+            <a:ext cx="2016224" cy="864096"/>
+          </a:xfrm>
+          <a:prstGeom prst="roundRect">
+            <a:avLst/>
+          </a:prstGeom>
+        </p:spPr>
+        <p:style>
+          <a:lnRef idx="2">
+            <a:schemeClr val="accent3">
+              <a:shade val="50000"/>
+            </a:schemeClr>
+          </a:lnRef>
+          <a:fillRef idx="1">
+            <a:schemeClr val="accent3"/>
+          </a:fillRef>
+          <a:effectRef idx="0">
+            <a:schemeClr val="accent3"/>
+          </a:effectRef>
+          <a:fontRef idx="minor">
+            <a:schemeClr val="lt1"/>
+          </a:fontRef>
+        </p:style>
+        <p:txBody>
+          <a:bodyPr rtlCol="1" anchor="ctr"/>
+          <a:lstStyle/>
+          <a:p>
+            <a:pPr algn="ctr"/>
+            <a:r>
+              <a:rPr lang="en-US" dirty="0" smtClean="0"/>
+              <a:t>Coordinate Process</a:t>
+            </a:r>
+            <a:endParaRPr lang="he-IL" dirty="0"/>
+          </a:p>
+        </p:txBody>
+      </p:sp>
+      <p:sp>
+        <p:nvSpPr>
+          <p:cNvPr id="9" name="Rounded Rectangle 8"/>
+          <p:cNvSpPr/>
+          <p:nvPr/>
+        </p:nvSpPr>
+        <p:spPr>
+          <a:xfrm>
+            <a:off x="6899432" y="1537363"/>
+            <a:ext cx="2016224" cy="864096"/>
+          </a:xfrm>
+          <a:prstGeom prst="roundRect">
+            <a:avLst/>
+          </a:prstGeom>
+        </p:spPr>
+        <p:style>
+          <a:lnRef idx="2">
+            <a:schemeClr val="accent3">
+              <a:shade val="50000"/>
+            </a:schemeClr>
+          </a:lnRef>
+          <a:fillRef idx="1">
+            <a:schemeClr val="accent3"/>
+          </a:fillRef>
+          <a:effectRef idx="0">
+            <a:schemeClr val="accent3"/>
+          </a:effectRef>
+          <a:fontRef idx="minor">
+            <a:schemeClr val="lt1"/>
+          </a:fontRef>
+        </p:style>
+        <p:txBody>
+          <a:bodyPr rtlCol="1" anchor="ctr"/>
+          <a:lstStyle/>
+          <a:p>
+            <a:pPr algn="ctr"/>
+            <a:r>
+              <a:rPr lang="en-US" dirty="0" smtClean="0"/>
+              <a:t>Address Calculator Process</a:t>
+            </a:r>
+            <a:endParaRPr lang="he-IL" dirty="0"/>
+          </a:p>
+        </p:txBody>
+      </p:sp>
+      <p:sp>
+        <p:nvSpPr>
+          <p:cNvPr id="10" name="Rounded Rectangle 9"/>
+          <p:cNvSpPr/>
+          <p:nvPr/>
+        </p:nvSpPr>
+        <p:spPr>
+          <a:xfrm>
+            <a:off x="6876256" y="2708920"/>
+            <a:ext cx="2016224" cy="864096"/>
+          </a:xfrm>
+          <a:prstGeom prst="roundRect">
+            <a:avLst/>
+          </a:prstGeom>
+        </p:spPr>
+        <p:style>
+          <a:lnRef idx="2">
+            <a:schemeClr val="accent3">
+              <a:shade val="50000"/>
+            </a:schemeClr>
+          </a:lnRef>
+          <a:fillRef idx="1">
+            <a:schemeClr val="accent3"/>
+          </a:fillRef>
+          <a:effectRef idx="0">
+            <a:schemeClr val="accent3"/>
+          </a:effectRef>
+          <a:fontRef idx="minor">
+            <a:schemeClr val="lt1"/>
+          </a:fontRef>
+        </p:style>
+        <p:txBody>
+          <a:bodyPr rtlCol="1" anchor="ctr"/>
+          <a:lstStyle/>
+          <a:p>
+            <a:pPr algn="ctr"/>
+            <a:r>
+              <a:rPr lang="en-US" dirty="0" smtClean="0"/>
+              <a:t>Bilinear Process</a:t>
+            </a:r>
+            <a:endParaRPr lang="he-IL" dirty="0"/>
+          </a:p>
+        </p:txBody>
+      </p:sp>
+      <p:cxnSp>
+        <p:nvCxnSpPr>
+          <p:cNvPr id="15" name="Elbow Connector 14"/>
+          <p:cNvCxnSpPr>
+            <a:stCxn id="4" idx="1"/>
+            <a:endCxn id="5" idx="0"/>
+          </p:cNvCxnSpPr>
+          <p:nvPr/>
+        </p:nvCxnSpPr>
+        <p:spPr>
+          <a:xfrm rot="10800000" flipV="1">
+            <a:off x="2907448" y="800707"/>
+            <a:ext cx="234824" cy="1024687"/>
+          </a:xfrm>
+          <a:prstGeom prst="bentConnector2">
+            <a:avLst/>
+          </a:prstGeom>
+          <a:ln>
+            <a:headEnd type="arrow"/>
+            <a:tailEnd type="arrow"/>
+          </a:ln>
+        </p:spPr>
+        <p:style>
+          <a:lnRef idx="2">
+            <a:schemeClr val="dk1"/>
+          </a:lnRef>
+          <a:fillRef idx="0">
+            <a:schemeClr val="dk1"/>
+          </a:fillRef>
+          <a:effectRef idx="1">
+            <a:schemeClr val="dk1"/>
+          </a:effectRef>
+          <a:fontRef idx="minor">
+            <a:schemeClr val="tx1"/>
+          </a:fontRef>
+        </p:style>
+      </p:cxnSp>
+      <p:cxnSp>
+        <p:nvCxnSpPr>
+          <p:cNvPr id="16" name="Elbow Connector 15"/>
+          <p:cNvCxnSpPr>
+            <a:stCxn id="4" idx="3"/>
+            <a:endCxn id="6" idx="0"/>
+          </p:cNvCxnSpPr>
+          <p:nvPr/>
+        </p:nvCxnSpPr>
+        <p:spPr>
+          <a:xfrm>
+            <a:off x="4958946" y="800708"/>
+            <a:ext cx="235554" cy="1027057"/>
+          </a:xfrm>
+          <a:prstGeom prst="bentConnector2">
+            <a:avLst/>
+          </a:prstGeom>
+          <a:ln>
+            <a:headEnd type="arrow"/>
+            <a:tailEnd type="arrow"/>
+          </a:ln>
+        </p:spPr>
+        <p:style>
+          <a:lnRef idx="2">
+            <a:schemeClr val="dk1"/>
+          </a:lnRef>
+          <a:fillRef idx="0">
+            <a:schemeClr val="dk1"/>
+          </a:fillRef>
+          <a:effectRef idx="1">
+            <a:schemeClr val="dk1"/>
+          </a:effectRef>
+          <a:fontRef idx="minor">
+            <a:schemeClr val="tx1"/>
+          </a:fontRef>
+        </p:style>
+      </p:cxnSp>
+      <p:cxnSp>
+        <p:nvCxnSpPr>
+          <p:cNvPr id="29" name="Elbow Connector 28"/>
+          <p:cNvCxnSpPr>
+            <a:stCxn id="5" idx="2"/>
+            <a:endCxn id="7" idx="1"/>
+          </p:cNvCxnSpPr>
+          <p:nvPr/>
+        </p:nvCxnSpPr>
+        <p:spPr>
+          <a:xfrm rot="16200000" flipH="1">
+            <a:off x="2384124" y="2924783"/>
+            <a:ext cx="1199032" cy="152384"/>
+          </a:xfrm>
+          <a:prstGeom prst="bentConnector2">
+            <a:avLst/>
+          </a:prstGeom>
+          <a:ln>
+            <a:prstDash val="lgDash"/>
+            <a:tailEnd type="arrow"/>
+          </a:ln>
+        </p:spPr>
+        <p:style>
+          <a:lnRef idx="2">
+            <a:schemeClr val="dk1"/>
+          </a:lnRef>
+          <a:fillRef idx="0">
+            <a:schemeClr val="dk1"/>
+          </a:fillRef>
+          <a:effectRef idx="1">
+            <a:schemeClr val="dk1"/>
+          </a:effectRef>
+          <a:fontRef idx="minor">
+            <a:schemeClr val="tx1"/>
+          </a:fontRef>
+        </p:style>
+      </p:cxnSp>
+      <p:cxnSp>
+        <p:nvCxnSpPr>
+          <p:cNvPr id="31" name="Elbow Connector 30"/>
+          <p:cNvCxnSpPr>
+            <a:stCxn id="6" idx="2"/>
+            <a:endCxn id="7" idx="3"/>
+          </p:cNvCxnSpPr>
+          <p:nvPr/>
+        </p:nvCxnSpPr>
+        <p:spPr>
+          <a:xfrm rot="5400000">
+            <a:off x="4500943" y="2906934"/>
+            <a:ext cx="1196662" cy="190452"/>
+          </a:xfrm>
+          <a:prstGeom prst="bentConnector2">
+            <a:avLst/>
+          </a:prstGeom>
+          <a:ln>
+            <a:prstDash val="lgDash"/>
+            <a:tailEnd type="arrow"/>
+          </a:ln>
+        </p:spPr>
+        <p:style>
+          <a:lnRef idx="2">
+            <a:schemeClr val="dk1"/>
+          </a:lnRef>
+          <a:fillRef idx="0">
+            <a:schemeClr val="dk1"/>
+          </a:fillRef>
+          <a:effectRef idx="1">
             <a:schemeClr val="dk1"/>
           </a:effectRef>
           <a:fontRef idx="minor">
@@ -16387,7 +16955,142 @@
     </p:spTree>
     <p:extLst>
       <p:ext uri="{BB962C8B-B14F-4D97-AF65-F5344CB8AC3E}">
-        <p14:creationId xmlns:p14="http://schemas.microsoft.com/office/powerpoint/2010/main" val="1906871029"/>
+        <p14:creationId xmlns:p14="http://schemas.microsoft.com/office/powerpoint/2010/main" val="1293019286"/>
+      </p:ext>
+    </p:extLst>
+  </p:cSld>
+  <p:clrMapOvr>
+    <a:masterClrMapping/>
+  </p:clrMapOvr>
+</p:sld>
+</file>
+
+<file path=ppt/slides/slide12.xml><?xml version="1.0" encoding="utf-8"?>
+<p:sld xmlns:a="http://schemas.openxmlformats.org/drawingml/2006/main" xmlns:r="http://schemas.openxmlformats.org/officeDocument/2006/relationships" xmlns:p="http://schemas.openxmlformats.org/presentationml/2006/main">
+  <p:cSld>
+    <p:spTree>
+      <p:nvGrpSpPr>
+        <p:cNvPr id="1" name=""/>
+        <p:cNvGrpSpPr/>
+        <p:nvPr/>
+      </p:nvGrpSpPr>
+      <p:grpSpPr>
+        <a:xfrm>
+          <a:off x="0" y="0"/>
+          <a:ext cx="0" cy="0"/>
+          <a:chOff x="0" y="0"/>
+          <a:chExt cx="0" cy="0"/>
+        </a:xfrm>
+      </p:grpSpPr>
+      <p:sp>
+        <p:nvSpPr>
+          <p:cNvPr id="4" name="Rectangle 3"/>
+          <p:cNvSpPr/>
+          <p:nvPr/>
+        </p:nvSpPr>
+        <p:spPr>
+          <a:xfrm>
+            <a:off x="2411760" y="548680"/>
+            <a:ext cx="4320480" cy="4320480"/>
+          </a:xfrm>
+          <a:prstGeom prst="rect">
+            <a:avLst/>
+          </a:prstGeom>
+        </p:spPr>
+        <p:style>
+          <a:lnRef idx="2">
+            <a:schemeClr val="accent1"/>
+          </a:lnRef>
+          <a:fillRef idx="1">
+            <a:schemeClr val="lt1"/>
+          </a:fillRef>
+          <a:effectRef idx="0">
+            <a:schemeClr val="accent1"/>
+          </a:effectRef>
+          <a:fontRef idx="minor">
+            <a:schemeClr val="dk1"/>
+          </a:fontRef>
+        </p:style>
+        <p:txBody>
+          <a:bodyPr rtlCol="1" anchor="ctr"/>
+          <a:lstStyle/>
+          <a:p>
+            <a:pPr algn="ctr"/>
+            <a:endParaRPr lang="he-IL" dirty="0"/>
+          </a:p>
+        </p:txBody>
+      </p:sp>
+      <p:cxnSp>
+        <p:nvCxnSpPr>
+          <p:cNvPr id="6" name="Straight Connector 5"/>
+          <p:cNvCxnSpPr/>
+          <p:nvPr/>
+        </p:nvCxnSpPr>
+        <p:spPr>
+          <a:xfrm>
+            <a:off x="4572000" y="548680"/>
+            <a:ext cx="0" cy="4320480"/>
+          </a:xfrm>
+          <a:prstGeom prst="line">
+            <a:avLst/>
+          </a:prstGeom>
+          <a:ln w="76200" cmpd="thinThick"/>
+        </p:spPr>
+        <p:style>
+          <a:lnRef idx="3">
+            <a:schemeClr val="dk1"/>
+          </a:lnRef>
+          <a:fillRef idx="0">
+            <a:schemeClr val="dk1"/>
+          </a:fillRef>
+          <a:effectRef idx="2">
+            <a:schemeClr val="dk1"/>
+          </a:effectRef>
+          <a:fontRef idx="minor">
+            <a:schemeClr val="tx1"/>
+          </a:fontRef>
+        </p:style>
+      </p:cxnSp>
+      <p:cxnSp>
+        <p:nvCxnSpPr>
+          <p:cNvPr id="7" name="Straight Connector 6"/>
+          <p:cNvCxnSpPr>
+            <a:stCxn id="4" idx="1"/>
+            <a:endCxn id="4" idx="3"/>
+          </p:cNvCxnSpPr>
+          <p:nvPr/>
+        </p:nvCxnSpPr>
+        <p:spPr>
+          <a:xfrm>
+            <a:off x="2411760" y="2708920"/>
+            <a:ext cx="4320480" cy="0"/>
+          </a:xfrm>
+          <a:prstGeom prst="line">
+            <a:avLst/>
+          </a:prstGeom>
+          <a:ln>
+            <a:prstDash val="solid"/>
+          </a:ln>
+        </p:spPr>
+        <p:style>
+          <a:lnRef idx="2">
+            <a:schemeClr val="dk1"/>
+          </a:lnRef>
+          <a:fillRef idx="0">
+            <a:schemeClr val="dk1"/>
+          </a:fillRef>
+          <a:effectRef idx="1">
+            <a:schemeClr val="dk1"/>
+          </a:effectRef>
+          <a:fontRef idx="minor">
+            <a:schemeClr val="tx1"/>
+          </a:fontRef>
+        </p:style>
+      </p:cxnSp>
+    </p:spTree>
+    <p:extLst>
+      <p:ext uri="{BB962C8B-B14F-4D97-AF65-F5344CB8AC3E}">
+        <p14:creationId xmlns:p14="http://schemas.microsoft.com/office/powerpoint/2010/main" val="2648457710"/>
       </p:ext>
     </p:extLst>
   </p:cSld>
@@ -20580,7 +21283,7 @@
               <a:graphicData uri="http://schemas.openxmlformats.org/presentationml/2006/ole">
                 <mc:AlternateContent xmlns:mc="http://schemas.openxmlformats.org/markup-compatibility/2006">
                   <mc:Choice xmlns:v="urn:schemas-microsoft-com:vml" Requires="v">
-                    <p:oleObj spid="_x0000_s1152" name="Equation" r:id="rId6" imgW="622080" imgH="253800" progId="Equation.DSMT4">
+                    <p:oleObj spid="_x0000_s1206" name="Equation" r:id="rId6" imgW="622080" imgH="253800" progId="Equation.DSMT4">
                       <p:embed/>
                     </p:oleObj>
                   </mc:Choice>
@@ -20679,7 +21382,7 @@
               <a:graphicData uri="http://schemas.openxmlformats.org/presentationml/2006/ole">
                 <mc:AlternateContent xmlns:mc="http://schemas.openxmlformats.org/markup-compatibility/2006">
                   <mc:Choice xmlns:v="urn:schemas-microsoft-com:vml" Requires="v">
-                    <p:oleObj spid="_x0000_s1153" name="Equation" r:id="rId8" imgW="622080" imgH="253800" progId="Equation.DSMT4">
+                    <p:oleObj spid="_x0000_s1207" name="Equation" r:id="rId8" imgW="622080" imgH="253800" progId="Equation.DSMT4">
                       <p:embed/>
                     </p:oleObj>
                   </mc:Choice>
@@ -20778,7 +21481,7 @@
               <a:graphicData uri="http://schemas.openxmlformats.org/presentationml/2006/ole">
                 <mc:AlternateContent xmlns:mc="http://schemas.openxmlformats.org/markup-compatibility/2006">
                   <mc:Choice xmlns:v="urn:schemas-microsoft-com:vml" Requires="v">
-                    <p:oleObj spid="_x0000_s1154" name="Equation" r:id="rId10" imgW="622080" imgH="253800" progId="Equation.DSMT4">
+                    <p:oleObj spid="_x0000_s1208" name="Equation" r:id="rId10" imgW="622080" imgH="253800" progId="Equation.DSMT4">
                       <p:embed/>
                     </p:oleObj>
                   </mc:Choice>
@@ -20877,7 +21580,7 @@
               <a:graphicData uri="http://schemas.openxmlformats.org/presentationml/2006/ole">
                 <mc:AlternateContent xmlns:mc="http://schemas.openxmlformats.org/markup-compatibility/2006">
                   <mc:Choice xmlns:v="urn:schemas-microsoft-com:vml" Requires="v">
-                    <p:oleObj spid="_x0000_s1155" name="Equation" r:id="rId12" imgW="622080" imgH="253800" progId="Equation.DSMT4">
+                    <p:oleObj spid="_x0000_s1209" name="Equation" r:id="rId12" imgW="622080" imgH="253800" progId="Equation.DSMT4">
                       <p:embed/>
                     </p:oleObj>
                   </mc:Choice>
@@ -21273,7 +21976,7 @@
               <a:graphicData uri="http://schemas.openxmlformats.org/presentationml/2006/ole">
                 <mc:AlternateContent xmlns:mc="http://schemas.openxmlformats.org/markup-compatibility/2006">
                   <mc:Choice xmlns:v="urn:schemas-microsoft-com:vml" Requires="v">
-                    <p:oleObj spid="_x0000_s1156" name="Equation" r:id="rId14" imgW="291960" imgH="190440" progId="Equation.DSMT4">
+                    <p:oleObj spid="_x0000_s1210" name="Equation" r:id="rId14" imgW="291960" imgH="190440" progId="Equation.DSMT4">
                       <p:embed/>
                     </p:oleObj>
                   </mc:Choice>
@@ -21410,7 +22113,7 @@
               <a:graphicData uri="http://schemas.openxmlformats.org/presentationml/2006/ole">
                 <mc:AlternateContent xmlns:mc="http://schemas.openxmlformats.org/markup-compatibility/2006">
                   <mc:Choice xmlns:v="urn:schemas-microsoft-com:vml" Requires="v">
-                    <p:oleObj spid="_x0000_s1157" name="Equation" r:id="rId16" imgW="317160" imgH="190440" progId="Equation.DSMT4">
+                    <p:oleObj spid="_x0000_s1211" name="Equation" r:id="rId16" imgW="317160" imgH="190440" progId="Equation.DSMT4">
                       <p:embed/>
                     </p:oleObj>
                   </mc:Choice>
@@ -22010,7 +22713,7 @@
               <a:graphicData uri="http://schemas.openxmlformats.org/presentationml/2006/ole">
                 <mc:AlternateContent xmlns:mc="http://schemas.openxmlformats.org/markup-compatibility/2006">
                   <mc:Choice xmlns:v="urn:schemas-microsoft-com:vml" Requires="v">
-                    <p:oleObj spid="_x0000_s2110" name="Equation" r:id="rId3" imgW="583920" imgH="203040" progId="Equation.DSMT4">
+                    <p:oleObj spid="_x0000_s2164" name="Equation" r:id="rId3" imgW="583920" imgH="203040" progId="Equation.DSMT4">
                       <p:embed/>
                     </p:oleObj>
                   </mc:Choice>
@@ -22103,7 +22806,7 @@
               <a:graphicData uri="http://schemas.openxmlformats.org/presentationml/2006/ole">
                 <mc:AlternateContent xmlns:mc="http://schemas.openxmlformats.org/markup-compatibility/2006">
                   <mc:Choice xmlns:v="urn:schemas-microsoft-com:vml" Requires="v">
-                    <p:oleObj spid="_x0000_s2111" name="Equation" r:id="rId5" imgW="672840" imgH="203040" progId="Equation.DSMT4">
+                    <p:oleObj spid="_x0000_s2165" name="Equation" r:id="rId5" imgW="672840" imgH="203040" progId="Equation.DSMT4">
                       <p:embed/>
                     </p:oleObj>
                   </mc:Choice>
@@ -22196,7 +22899,7 @@
               <a:graphicData uri="http://schemas.openxmlformats.org/presentationml/2006/ole">
                 <mc:AlternateContent xmlns:mc="http://schemas.openxmlformats.org/markup-compatibility/2006">
                   <mc:Choice xmlns:v="urn:schemas-microsoft-com:vml" Requires="v">
-                    <p:oleObj spid="_x0000_s2112" name="Equation" r:id="rId7" imgW="787320" imgH="177480" progId="Equation.DSMT4">
+                    <p:oleObj spid="_x0000_s2166" name="Equation" r:id="rId7" imgW="787320" imgH="177480" progId="Equation.DSMT4">
                       <p:embed/>
                     </p:oleObj>
                   </mc:Choice>
@@ -22289,7 +22992,7 @@
               <a:graphicData uri="http://schemas.openxmlformats.org/presentationml/2006/ole">
                 <mc:AlternateContent xmlns:mc="http://schemas.openxmlformats.org/markup-compatibility/2006">
                   <mc:Choice xmlns:v="urn:schemas-microsoft-com:vml" Requires="v">
-                    <p:oleObj spid="_x0000_s2113" name="Equation" r:id="rId9" imgW="876240" imgH="203040" progId="Equation.DSMT4">
+                    <p:oleObj spid="_x0000_s2167" name="Equation" r:id="rId9" imgW="876240" imgH="203040" progId="Equation.DSMT4">
                       <p:embed/>
                     </p:oleObj>
                   </mc:Choice>
@@ -22679,7 +23382,7 @@
               <a:graphicData uri="http://schemas.openxmlformats.org/presentationml/2006/ole">
                 <mc:AlternateContent xmlns:mc="http://schemas.openxmlformats.org/markup-compatibility/2006">
                   <mc:Choice xmlns:v="urn:schemas-microsoft-com:vml" Requires="v">
-                    <p:oleObj spid="_x0000_s2114" name="Equation" r:id="rId11" imgW="444240" imgH="190440" progId="Equation.DSMT4">
+                    <p:oleObj spid="_x0000_s2168" name="Equation" r:id="rId11" imgW="444240" imgH="190440" progId="Equation.DSMT4">
                       <p:embed/>
                     </p:oleObj>
                   </mc:Choice>
@@ -22810,7 +23513,7 @@
               <a:graphicData uri="http://schemas.openxmlformats.org/presentationml/2006/ole">
                 <mc:AlternateContent xmlns:mc="http://schemas.openxmlformats.org/markup-compatibility/2006">
                   <mc:Choice xmlns:v="urn:schemas-microsoft-com:vml" Requires="v">
-                    <p:oleObj spid="_x0000_s2115" name="Equation" r:id="rId13" imgW="393480" imgH="203040" progId="Equation.DSMT4">
+                    <p:oleObj spid="_x0000_s2169" name="Equation" r:id="rId13" imgW="393480" imgH="203040" progId="Equation.DSMT4">
                       <p:embed/>
                     </p:oleObj>
                   </mc:Choice>

</xml_diff>